<commit_message>
Atualização inicial para modificações
Primeira atualização feita após ajustes do menu e outras ações de correção, pré verificação dos arquivos CSV
</commit_message>
<xml_diff>
--- a/Source/Assets/Repetea_Figuras/Avisos.pptx
+++ b/Source/Assets/Repetea_Figuras/Avisos.pptx
@@ -4,20 +4,25 @@
   <p:sldMasterIdLst>
     <p:sldMasterId id="2147483648" r:id="rId1"/>
   </p:sldMasterIdLst>
+  <p:notesMasterIdLst>
+    <p:notesMasterId r:id="rId17"/>
+  </p:notesMasterIdLst>
   <p:sldIdLst>
     <p:sldId id="256" r:id="rId2"/>
-    <p:sldId id="257" r:id="rId3"/>
-    <p:sldId id="258" r:id="rId4"/>
-    <p:sldId id="261" r:id="rId5"/>
-    <p:sldId id="264" r:id="rId6"/>
-    <p:sldId id="263" r:id="rId7"/>
-    <p:sldId id="267" r:id="rId8"/>
-    <p:sldId id="265" r:id="rId9"/>
-    <p:sldId id="266" r:id="rId10"/>
-    <p:sldId id="262" r:id="rId11"/>
-    <p:sldId id="259" r:id="rId12"/>
-    <p:sldId id="260" r:id="rId13"/>
-    <p:sldId id="268" r:id="rId14"/>
+    <p:sldId id="270" r:id="rId3"/>
+    <p:sldId id="257" r:id="rId4"/>
+    <p:sldId id="269" r:id="rId5"/>
+    <p:sldId id="258" r:id="rId6"/>
+    <p:sldId id="261" r:id="rId7"/>
+    <p:sldId id="264" r:id="rId8"/>
+    <p:sldId id="263" r:id="rId9"/>
+    <p:sldId id="267" r:id="rId10"/>
+    <p:sldId id="265" r:id="rId11"/>
+    <p:sldId id="266" r:id="rId12"/>
+    <p:sldId id="262" r:id="rId13"/>
+    <p:sldId id="259" r:id="rId14"/>
+    <p:sldId id="260" r:id="rId15"/>
+    <p:sldId id="268" r:id="rId16"/>
   </p:sldIdLst>
   <p:sldSz cx="12192000" cy="6858000"/>
   <p:notesSz cx="6858000" cy="9144000"/>
@@ -530,6 +535,529 @@
 </inkml:ink>
 </file>
 
+<file path=ppt/notesMasters/notesMaster1.xml><?xml version="1.0" encoding="utf-8"?>
+<p:notesMaster xmlns:a="http://schemas.openxmlformats.org/drawingml/2006/main" xmlns:r="http://schemas.openxmlformats.org/officeDocument/2006/relationships" xmlns:p="http://schemas.openxmlformats.org/presentationml/2006/main">
+  <p:cSld>
+    <p:bg>
+      <p:bgRef idx="1001">
+        <a:schemeClr val="bg1"/>
+      </p:bgRef>
+    </p:bg>
+    <p:spTree>
+      <p:nvGrpSpPr>
+        <p:cNvPr id="1" name=""/>
+        <p:cNvGrpSpPr/>
+        <p:nvPr/>
+      </p:nvGrpSpPr>
+      <p:grpSpPr>
+        <a:xfrm>
+          <a:off x="0" y="0"/>
+          <a:ext cx="0" cy="0"/>
+          <a:chOff x="0" y="0"/>
+          <a:chExt cx="0" cy="0"/>
+        </a:xfrm>
+      </p:grpSpPr>
+      <p:sp>
+        <p:nvSpPr>
+          <p:cNvPr id="2" name="Espaço Reservado para Cabeçalho 1"/>
+          <p:cNvSpPr>
+            <a:spLocks noGrp="1"/>
+          </p:cNvSpPr>
+          <p:nvPr>
+            <p:ph type="hdr" sz="quarter"/>
+          </p:nvPr>
+        </p:nvSpPr>
+        <p:spPr>
+          <a:xfrm>
+            <a:off x="0" y="0"/>
+            <a:ext cx="2971800" cy="458788"/>
+          </a:xfrm>
+          <a:prstGeom prst="rect">
+            <a:avLst/>
+          </a:prstGeom>
+        </p:spPr>
+        <p:txBody>
+          <a:bodyPr vert="horz" lIns="91440" tIns="45720" rIns="91440" bIns="45720" rtlCol="0"/>
+          <a:lstStyle>
+            <a:lvl1pPr algn="l">
+              <a:defRPr sz="1200"/>
+            </a:lvl1pPr>
+          </a:lstStyle>
+          <a:p>
+            <a:endParaRPr lang="pt-BR"/>
+          </a:p>
+        </p:txBody>
+      </p:sp>
+      <p:sp>
+        <p:nvSpPr>
+          <p:cNvPr id="3" name="Espaço Reservado para Data 2"/>
+          <p:cNvSpPr>
+            <a:spLocks noGrp="1"/>
+          </p:cNvSpPr>
+          <p:nvPr>
+            <p:ph type="dt" idx="1"/>
+          </p:nvPr>
+        </p:nvSpPr>
+        <p:spPr>
+          <a:xfrm>
+            <a:off x="3884613" y="0"/>
+            <a:ext cx="2971800" cy="458788"/>
+          </a:xfrm>
+          <a:prstGeom prst="rect">
+            <a:avLst/>
+          </a:prstGeom>
+        </p:spPr>
+        <p:txBody>
+          <a:bodyPr vert="horz" lIns="91440" tIns="45720" rIns="91440" bIns="45720" rtlCol="0"/>
+          <a:lstStyle>
+            <a:lvl1pPr algn="r">
+              <a:defRPr sz="1200"/>
+            </a:lvl1pPr>
+          </a:lstStyle>
+          <a:p>
+            <a:fld id="{AE1650F6-AD51-43A5-BD94-AF8C5A9C0302}" type="datetimeFigureOut">
+              <a:rPr lang="pt-BR" smtClean="0"/>
+              <a:t>30/06/2023</a:t>
+            </a:fld>
+            <a:endParaRPr lang="pt-BR"/>
+          </a:p>
+        </p:txBody>
+      </p:sp>
+      <p:sp>
+        <p:nvSpPr>
+          <p:cNvPr id="4" name="Espaço Reservado para Imagem de Slide 3"/>
+          <p:cNvSpPr>
+            <a:spLocks noGrp="1" noRot="1" noChangeAspect="1"/>
+          </p:cNvSpPr>
+          <p:nvPr>
+            <p:ph type="sldImg" idx="2"/>
+          </p:nvPr>
+        </p:nvSpPr>
+        <p:spPr>
+          <a:xfrm>
+            <a:off x="685800" y="1143000"/>
+            <a:ext cx="5486400" cy="3086100"/>
+          </a:xfrm>
+          <a:prstGeom prst="rect">
+            <a:avLst/>
+          </a:prstGeom>
+          <a:noFill/>
+          <a:ln w="12700">
+            <a:solidFill>
+              <a:prstClr val="black"/>
+            </a:solidFill>
+          </a:ln>
+        </p:spPr>
+        <p:txBody>
+          <a:bodyPr vert="horz" lIns="91440" tIns="45720" rIns="91440" bIns="45720" rtlCol="0" anchor="ctr"/>
+          <a:lstStyle/>
+          <a:p>
+            <a:endParaRPr lang="pt-BR"/>
+          </a:p>
+        </p:txBody>
+      </p:sp>
+      <p:sp>
+        <p:nvSpPr>
+          <p:cNvPr id="5" name="Espaço Reservado para Anotações 4"/>
+          <p:cNvSpPr>
+            <a:spLocks noGrp="1"/>
+          </p:cNvSpPr>
+          <p:nvPr>
+            <p:ph type="body" sz="quarter" idx="3"/>
+          </p:nvPr>
+        </p:nvSpPr>
+        <p:spPr>
+          <a:xfrm>
+            <a:off x="685800" y="4400550"/>
+            <a:ext cx="5486400" cy="3600450"/>
+          </a:xfrm>
+          <a:prstGeom prst="rect">
+            <a:avLst/>
+          </a:prstGeom>
+        </p:spPr>
+        <p:txBody>
+          <a:bodyPr vert="horz" lIns="91440" tIns="45720" rIns="91440" bIns="45720" rtlCol="0"/>
+          <a:lstStyle/>
+          <a:p>
+            <a:pPr lvl="0"/>
+            <a:r>
+              <a:rPr lang="pt-BR"/>
+              <a:t>Clique para editar os estilos de texto Mestres</a:t>
+            </a:r>
+          </a:p>
+          <a:p>
+            <a:pPr lvl="1"/>
+            <a:r>
+              <a:rPr lang="pt-BR"/>
+              <a:t>Segundo nível</a:t>
+            </a:r>
+          </a:p>
+          <a:p>
+            <a:pPr lvl="2"/>
+            <a:r>
+              <a:rPr lang="pt-BR"/>
+              <a:t>Terceiro nível</a:t>
+            </a:r>
+          </a:p>
+          <a:p>
+            <a:pPr lvl="3"/>
+            <a:r>
+              <a:rPr lang="pt-BR"/>
+              <a:t>Quarto nível</a:t>
+            </a:r>
+          </a:p>
+          <a:p>
+            <a:pPr lvl="4"/>
+            <a:r>
+              <a:rPr lang="pt-BR"/>
+              <a:t>Quinto nível</a:t>
+            </a:r>
+          </a:p>
+        </p:txBody>
+      </p:sp>
+      <p:sp>
+        <p:nvSpPr>
+          <p:cNvPr id="6" name="Espaço Reservado para Rodapé 5"/>
+          <p:cNvSpPr>
+            <a:spLocks noGrp="1"/>
+          </p:cNvSpPr>
+          <p:nvPr>
+            <p:ph type="ftr" sz="quarter" idx="4"/>
+          </p:nvPr>
+        </p:nvSpPr>
+        <p:spPr>
+          <a:xfrm>
+            <a:off x="0" y="8685213"/>
+            <a:ext cx="2971800" cy="458787"/>
+          </a:xfrm>
+          <a:prstGeom prst="rect">
+            <a:avLst/>
+          </a:prstGeom>
+        </p:spPr>
+        <p:txBody>
+          <a:bodyPr vert="horz" lIns="91440" tIns="45720" rIns="91440" bIns="45720" rtlCol="0" anchor="b"/>
+          <a:lstStyle>
+            <a:lvl1pPr algn="l">
+              <a:defRPr sz="1200"/>
+            </a:lvl1pPr>
+          </a:lstStyle>
+          <a:p>
+            <a:endParaRPr lang="pt-BR"/>
+          </a:p>
+        </p:txBody>
+      </p:sp>
+      <p:sp>
+        <p:nvSpPr>
+          <p:cNvPr id="7" name="Espaço Reservado para Número de Slide 6"/>
+          <p:cNvSpPr>
+            <a:spLocks noGrp="1"/>
+          </p:cNvSpPr>
+          <p:nvPr>
+            <p:ph type="sldNum" sz="quarter" idx="5"/>
+          </p:nvPr>
+        </p:nvSpPr>
+        <p:spPr>
+          <a:xfrm>
+            <a:off x="3884613" y="8685213"/>
+            <a:ext cx="2971800" cy="458787"/>
+          </a:xfrm>
+          <a:prstGeom prst="rect">
+            <a:avLst/>
+          </a:prstGeom>
+        </p:spPr>
+        <p:txBody>
+          <a:bodyPr vert="horz" lIns="91440" tIns="45720" rIns="91440" bIns="45720" rtlCol="0" anchor="b"/>
+          <a:lstStyle>
+            <a:lvl1pPr algn="r">
+              <a:defRPr sz="1200"/>
+            </a:lvl1pPr>
+          </a:lstStyle>
+          <a:p>
+            <a:fld id="{4992AE91-B890-479E-8258-4C2ADA44E29B}" type="slidenum">
+              <a:rPr lang="pt-BR" smtClean="0"/>
+              <a:t>‹nº›</a:t>
+            </a:fld>
+            <a:endParaRPr lang="pt-BR"/>
+          </a:p>
+        </p:txBody>
+      </p:sp>
+    </p:spTree>
+    <p:extLst>
+      <p:ext uri="{BB962C8B-B14F-4D97-AF65-F5344CB8AC3E}">
+        <p14:creationId xmlns:p14="http://schemas.microsoft.com/office/powerpoint/2010/main" val="3927203196"/>
+      </p:ext>
+    </p:extLst>
+  </p:cSld>
+  <p:clrMap bg1="lt1" tx1="dk1" bg2="lt2" tx2="dk2" accent1="accent1" accent2="accent2" accent3="accent3" accent4="accent4" accent5="accent5" accent6="accent6" hlink="hlink" folHlink="folHlink"/>
+  <p:notesStyle>
+    <a:lvl1pPr marL="0" algn="l" defTabSz="914400" rtl="0" eaLnBrk="1" latinLnBrk="0" hangingPunct="1">
+      <a:defRPr sz="1200" kern="1200">
+        <a:solidFill>
+          <a:schemeClr val="tx1"/>
+        </a:solidFill>
+        <a:latin typeface="+mn-lt"/>
+        <a:ea typeface="+mn-ea"/>
+        <a:cs typeface="+mn-cs"/>
+      </a:defRPr>
+    </a:lvl1pPr>
+    <a:lvl2pPr marL="457200" algn="l" defTabSz="914400" rtl="0" eaLnBrk="1" latinLnBrk="0" hangingPunct="1">
+      <a:defRPr sz="1200" kern="1200">
+        <a:solidFill>
+          <a:schemeClr val="tx1"/>
+        </a:solidFill>
+        <a:latin typeface="+mn-lt"/>
+        <a:ea typeface="+mn-ea"/>
+        <a:cs typeface="+mn-cs"/>
+      </a:defRPr>
+    </a:lvl2pPr>
+    <a:lvl3pPr marL="914400" algn="l" defTabSz="914400" rtl="0" eaLnBrk="1" latinLnBrk="0" hangingPunct="1">
+      <a:defRPr sz="1200" kern="1200">
+        <a:solidFill>
+          <a:schemeClr val="tx1"/>
+        </a:solidFill>
+        <a:latin typeface="+mn-lt"/>
+        <a:ea typeface="+mn-ea"/>
+        <a:cs typeface="+mn-cs"/>
+      </a:defRPr>
+    </a:lvl3pPr>
+    <a:lvl4pPr marL="1371600" algn="l" defTabSz="914400" rtl="0" eaLnBrk="1" latinLnBrk="0" hangingPunct="1">
+      <a:defRPr sz="1200" kern="1200">
+        <a:solidFill>
+          <a:schemeClr val="tx1"/>
+        </a:solidFill>
+        <a:latin typeface="+mn-lt"/>
+        <a:ea typeface="+mn-ea"/>
+        <a:cs typeface="+mn-cs"/>
+      </a:defRPr>
+    </a:lvl4pPr>
+    <a:lvl5pPr marL="1828800" algn="l" defTabSz="914400" rtl="0" eaLnBrk="1" latinLnBrk="0" hangingPunct="1">
+      <a:defRPr sz="1200" kern="1200">
+        <a:solidFill>
+          <a:schemeClr val="tx1"/>
+        </a:solidFill>
+        <a:latin typeface="+mn-lt"/>
+        <a:ea typeface="+mn-ea"/>
+        <a:cs typeface="+mn-cs"/>
+      </a:defRPr>
+    </a:lvl5pPr>
+    <a:lvl6pPr marL="2286000" algn="l" defTabSz="914400" rtl="0" eaLnBrk="1" latinLnBrk="0" hangingPunct="1">
+      <a:defRPr sz="1200" kern="1200">
+        <a:solidFill>
+          <a:schemeClr val="tx1"/>
+        </a:solidFill>
+        <a:latin typeface="+mn-lt"/>
+        <a:ea typeface="+mn-ea"/>
+        <a:cs typeface="+mn-cs"/>
+      </a:defRPr>
+    </a:lvl6pPr>
+    <a:lvl7pPr marL="2743200" algn="l" defTabSz="914400" rtl="0" eaLnBrk="1" latinLnBrk="0" hangingPunct="1">
+      <a:defRPr sz="1200" kern="1200">
+        <a:solidFill>
+          <a:schemeClr val="tx1"/>
+        </a:solidFill>
+        <a:latin typeface="+mn-lt"/>
+        <a:ea typeface="+mn-ea"/>
+        <a:cs typeface="+mn-cs"/>
+      </a:defRPr>
+    </a:lvl7pPr>
+    <a:lvl8pPr marL="3200400" algn="l" defTabSz="914400" rtl="0" eaLnBrk="1" latinLnBrk="0" hangingPunct="1">
+      <a:defRPr sz="1200" kern="1200">
+        <a:solidFill>
+          <a:schemeClr val="tx1"/>
+        </a:solidFill>
+        <a:latin typeface="+mn-lt"/>
+        <a:ea typeface="+mn-ea"/>
+        <a:cs typeface="+mn-cs"/>
+      </a:defRPr>
+    </a:lvl8pPr>
+    <a:lvl9pPr marL="3657600" algn="l" defTabSz="914400" rtl="0" eaLnBrk="1" latinLnBrk="0" hangingPunct="1">
+      <a:defRPr sz="1200" kern="1200">
+        <a:solidFill>
+          <a:schemeClr val="tx1"/>
+        </a:solidFill>
+        <a:latin typeface="+mn-lt"/>
+        <a:ea typeface="+mn-ea"/>
+        <a:cs typeface="+mn-cs"/>
+      </a:defRPr>
+    </a:lvl9pPr>
+  </p:notesStyle>
+</p:notesMaster>
+</file>
+
+<file path=ppt/notesSlides/notesSlide1.xml><?xml version="1.0" encoding="utf-8"?>
+<p:notes xmlns:a="http://schemas.openxmlformats.org/drawingml/2006/main" xmlns:r="http://schemas.openxmlformats.org/officeDocument/2006/relationships" xmlns:p="http://schemas.openxmlformats.org/presentationml/2006/main">
+  <p:cSld>
+    <p:spTree>
+      <p:nvGrpSpPr>
+        <p:cNvPr id="1" name=""/>
+        <p:cNvGrpSpPr/>
+        <p:nvPr/>
+      </p:nvGrpSpPr>
+      <p:grpSpPr>
+        <a:xfrm>
+          <a:off x="0" y="0"/>
+          <a:ext cx="0" cy="0"/>
+          <a:chOff x="0" y="0"/>
+          <a:chExt cx="0" cy="0"/>
+        </a:xfrm>
+      </p:grpSpPr>
+      <p:sp>
+        <p:nvSpPr>
+          <p:cNvPr id="2" name="Espaço Reservado para Imagem de Slide 1"/>
+          <p:cNvSpPr>
+            <a:spLocks noGrp="1" noRot="1" noChangeAspect="1"/>
+          </p:cNvSpPr>
+          <p:nvPr>
+            <p:ph type="sldImg"/>
+          </p:nvPr>
+        </p:nvSpPr>
+        <p:spPr/>
+      </p:sp>
+      <p:sp>
+        <p:nvSpPr>
+          <p:cNvPr id="3" name="Espaço Reservado para Anotações 2"/>
+          <p:cNvSpPr>
+            <a:spLocks noGrp="1"/>
+          </p:cNvSpPr>
+          <p:nvPr>
+            <p:ph type="body" idx="1"/>
+          </p:nvPr>
+        </p:nvSpPr>
+        <p:spPr/>
+        <p:txBody>
+          <a:bodyPr/>
+          <a:lstStyle/>
+          <a:p>
+            <a:r>
+              <a:rPr lang="pt-BR" dirty="0"/>
+              <a:t>Versão 1</a:t>
+            </a:r>
+          </a:p>
+        </p:txBody>
+      </p:sp>
+      <p:sp>
+        <p:nvSpPr>
+          <p:cNvPr id="4" name="Espaço Reservado para Número de Slide 3"/>
+          <p:cNvSpPr>
+            <a:spLocks noGrp="1"/>
+          </p:cNvSpPr>
+          <p:nvPr>
+            <p:ph type="sldNum" sz="quarter" idx="5"/>
+          </p:nvPr>
+        </p:nvSpPr>
+        <p:spPr/>
+        <p:txBody>
+          <a:bodyPr/>
+          <a:lstStyle/>
+          <a:p>
+            <a:fld id="{4992AE91-B890-479E-8258-4C2ADA44E29B}" type="slidenum">
+              <a:rPr lang="pt-BR" smtClean="0"/>
+              <a:t>3</a:t>
+            </a:fld>
+            <a:endParaRPr lang="pt-BR"/>
+          </a:p>
+        </p:txBody>
+      </p:sp>
+    </p:spTree>
+    <p:extLst>
+      <p:ext uri="{BB962C8B-B14F-4D97-AF65-F5344CB8AC3E}">
+        <p14:creationId xmlns:p14="http://schemas.microsoft.com/office/powerpoint/2010/main" val="1072405569"/>
+      </p:ext>
+    </p:extLst>
+  </p:cSld>
+  <p:clrMapOvr>
+    <a:masterClrMapping/>
+  </p:clrMapOvr>
+</p:notes>
+</file>
+
+<file path=ppt/notesSlides/notesSlide2.xml><?xml version="1.0" encoding="utf-8"?>
+<p:notes xmlns:a="http://schemas.openxmlformats.org/drawingml/2006/main" xmlns:r="http://schemas.openxmlformats.org/officeDocument/2006/relationships" xmlns:p="http://schemas.openxmlformats.org/presentationml/2006/main">
+  <p:cSld>
+    <p:spTree>
+      <p:nvGrpSpPr>
+        <p:cNvPr id="1" name=""/>
+        <p:cNvGrpSpPr/>
+        <p:nvPr/>
+      </p:nvGrpSpPr>
+      <p:grpSpPr>
+        <a:xfrm>
+          <a:off x="0" y="0"/>
+          <a:ext cx="0" cy="0"/>
+          <a:chOff x="0" y="0"/>
+          <a:chExt cx="0" cy="0"/>
+        </a:xfrm>
+      </p:grpSpPr>
+      <p:sp>
+        <p:nvSpPr>
+          <p:cNvPr id="2" name="Espaço Reservado para Imagem de Slide 1"/>
+          <p:cNvSpPr>
+            <a:spLocks noGrp="1" noRot="1" noChangeAspect="1"/>
+          </p:cNvSpPr>
+          <p:nvPr>
+            <p:ph type="sldImg"/>
+          </p:nvPr>
+        </p:nvSpPr>
+        <p:spPr/>
+      </p:sp>
+      <p:sp>
+        <p:nvSpPr>
+          <p:cNvPr id="3" name="Espaço Reservado para Anotações 2"/>
+          <p:cNvSpPr>
+            <a:spLocks noGrp="1"/>
+          </p:cNvSpPr>
+          <p:nvPr>
+            <p:ph type="body" idx="1"/>
+          </p:nvPr>
+        </p:nvSpPr>
+        <p:spPr/>
+        <p:txBody>
+          <a:bodyPr/>
+          <a:lstStyle/>
+          <a:p>
+            <a:r>
+              <a:rPr lang="pt-BR" dirty="0"/>
+              <a:t>Versão 2</a:t>
+            </a:r>
+          </a:p>
+        </p:txBody>
+      </p:sp>
+      <p:sp>
+        <p:nvSpPr>
+          <p:cNvPr id="4" name="Espaço Reservado para Número de Slide 3"/>
+          <p:cNvSpPr>
+            <a:spLocks noGrp="1"/>
+          </p:cNvSpPr>
+          <p:nvPr>
+            <p:ph type="sldNum" sz="quarter" idx="5"/>
+          </p:nvPr>
+        </p:nvSpPr>
+        <p:spPr/>
+        <p:txBody>
+          <a:bodyPr/>
+          <a:lstStyle/>
+          <a:p>
+            <a:fld id="{4992AE91-B890-479E-8258-4C2ADA44E29B}" type="slidenum">
+              <a:rPr lang="pt-BR" smtClean="0"/>
+              <a:t>4</a:t>
+            </a:fld>
+            <a:endParaRPr lang="pt-BR"/>
+          </a:p>
+        </p:txBody>
+      </p:sp>
+    </p:spTree>
+    <p:extLst>
+      <p:ext uri="{BB962C8B-B14F-4D97-AF65-F5344CB8AC3E}">
+        <p14:creationId xmlns:p14="http://schemas.microsoft.com/office/powerpoint/2010/main" val="3687898446"/>
+      </p:ext>
+    </p:extLst>
+  </p:cSld>
+  <p:clrMapOvr>
+    <a:masterClrMapping/>
+  </p:clrMapOvr>
+</p:notes>
+</file>
+
 <file path=ppt/slideLayouts/slideLayout1.xml><?xml version="1.0" encoding="utf-8"?>
 <p:sldLayout xmlns:a="http://schemas.openxmlformats.org/drawingml/2006/main" xmlns:r="http://schemas.openxmlformats.org/officeDocument/2006/relationships" xmlns:p="http://schemas.openxmlformats.org/presentationml/2006/main" type="title" preserve="1">
   <p:cSld name="Slide de Título">
@@ -677,7 +1205,7 @@
           <a:p>
             <a:fld id="{F05CD7A9-91D7-456F-A2CA-A01848C64662}" type="datetimeFigureOut">
               <a:rPr lang="pt-BR" smtClean="0"/>
-              <a:t>29/01/2022</a:t>
+              <a:t>30/06/2023</a:t>
             </a:fld>
             <a:endParaRPr lang="pt-BR"/>
           </a:p>
@@ -875,7 +1403,7 @@
           <a:p>
             <a:fld id="{F05CD7A9-91D7-456F-A2CA-A01848C64662}" type="datetimeFigureOut">
               <a:rPr lang="pt-BR" smtClean="0"/>
-              <a:t>29/01/2022</a:t>
+              <a:t>30/06/2023</a:t>
             </a:fld>
             <a:endParaRPr lang="pt-BR"/>
           </a:p>
@@ -1083,7 +1611,7 @@
           <a:p>
             <a:fld id="{F05CD7A9-91D7-456F-A2CA-A01848C64662}" type="datetimeFigureOut">
               <a:rPr lang="pt-BR" smtClean="0"/>
-              <a:t>29/01/2022</a:t>
+              <a:t>30/06/2023</a:t>
             </a:fld>
             <a:endParaRPr lang="pt-BR"/>
           </a:p>
@@ -1281,7 +1809,7 @@
           <a:p>
             <a:fld id="{F05CD7A9-91D7-456F-A2CA-A01848C64662}" type="datetimeFigureOut">
               <a:rPr lang="pt-BR" smtClean="0"/>
-              <a:t>29/01/2022</a:t>
+              <a:t>30/06/2023</a:t>
             </a:fld>
             <a:endParaRPr lang="pt-BR"/>
           </a:p>
@@ -1556,7 +2084,7 @@
           <a:p>
             <a:fld id="{F05CD7A9-91D7-456F-A2CA-A01848C64662}" type="datetimeFigureOut">
               <a:rPr lang="pt-BR" smtClean="0"/>
-              <a:t>29/01/2022</a:t>
+              <a:t>30/06/2023</a:t>
             </a:fld>
             <a:endParaRPr lang="pt-BR"/>
           </a:p>
@@ -1821,7 +2349,7 @@
           <a:p>
             <a:fld id="{F05CD7A9-91D7-456F-A2CA-A01848C64662}" type="datetimeFigureOut">
               <a:rPr lang="pt-BR" smtClean="0"/>
-              <a:t>29/01/2022</a:t>
+              <a:t>30/06/2023</a:t>
             </a:fld>
             <a:endParaRPr lang="pt-BR"/>
           </a:p>
@@ -2233,7 +2761,7 @@
           <a:p>
             <a:fld id="{F05CD7A9-91D7-456F-A2CA-A01848C64662}" type="datetimeFigureOut">
               <a:rPr lang="pt-BR" smtClean="0"/>
-              <a:t>29/01/2022</a:t>
+              <a:t>30/06/2023</a:t>
             </a:fld>
             <a:endParaRPr lang="pt-BR"/>
           </a:p>
@@ -2374,7 +2902,7 @@
           <a:p>
             <a:fld id="{F05CD7A9-91D7-456F-A2CA-A01848C64662}" type="datetimeFigureOut">
               <a:rPr lang="pt-BR" smtClean="0"/>
-              <a:t>29/01/2022</a:t>
+              <a:t>30/06/2023</a:t>
             </a:fld>
             <a:endParaRPr lang="pt-BR"/>
           </a:p>
@@ -2487,7 +3015,7 @@
           <a:p>
             <a:fld id="{F05CD7A9-91D7-456F-A2CA-A01848C64662}" type="datetimeFigureOut">
               <a:rPr lang="pt-BR" smtClean="0"/>
-              <a:t>29/01/2022</a:t>
+              <a:t>30/06/2023</a:t>
             </a:fld>
             <a:endParaRPr lang="pt-BR"/>
           </a:p>
@@ -2798,7 +3326,7 @@
           <a:p>
             <a:fld id="{F05CD7A9-91D7-456F-A2CA-A01848C64662}" type="datetimeFigureOut">
               <a:rPr lang="pt-BR" smtClean="0"/>
-              <a:t>29/01/2022</a:t>
+              <a:t>30/06/2023</a:t>
             </a:fld>
             <a:endParaRPr lang="pt-BR"/>
           </a:p>
@@ -3086,7 +3614,7 @@
           <a:p>
             <a:fld id="{F05CD7A9-91D7-456F-A2CA-A01848C64662}" type="datetimeFigureOut">
               <a:rPr lang="pt-BR" smtClean="0"/>
-              <a:t>29/01/2022</a:t>
+              <a:t>30/06/2023</a:t>
             </a:fld>
             <a:endParaRPr lang="pt-BR"/>
           </a:p>
@@ -3327,7 +3855,7 @@
           <a:p>
             <a:fld id="{F05CD7A9-91D7-456F-A2CA-A01848C64662}" type="datetimeFigureOut">
               <a:rPr lang="pt-BR" smtClean="0"/>
-              <a:t>29/01/2022</a:t>
+              <a:t>30/06/2023</a:t>
             </a:fld>
             <a:endParaRPr lang="pt-BR"/>
           </a:p>
@@ -3891,6 +4419,606 @@
       </p:grpSpPr>
       <p:grpSp>
         <p:nvGrpSpPr>
+          <p:cNvPr id="3" name="Agrupar 2">
+            <a:extLst>
+              <a:ext uri="{FF2B5EF4-FFF2-40B4-BE49-F238E27FC236}">
+                <a16:creationId xmlns:a16="http://schemas.microsoft.com/office/drawing/2014/main" id="{25CCB410-C71B-4E76-939A-F7512C9A2FF5}"/>
+              </a:ext>
+            </a:extLst>
+          </p:cNvPr>
+          <p:cNvGrpSpPr/>
+          <p:nvPr/>
+        </p:nvGrpSpPr>
+        <p:grpSpPr>
+          <a:xfrm>
+            <a:off x="1541672" y="1371339"/>
+            <a:ext cx="4217821" cy="830997"/>
+            <a:chOff x="1541672" y="1371339"/>
+            <a:chExt cx="4217821" cy="830997"/>
+          </a:xfrm>
+        </p:grpSpPr>
+        <p:sp>
+          <p:nvSpPr>
+            <p:cNvPr id="11" name="CaixaDeTexto 10">
+              <a:extLst>
+                <a:ext uri="{FF2B5EF4-FFF2-40B4-BE49-F238E27FC236}">
+                  <a16:creationId xmlns:a16="http://schemas.microsoft.com/office/drawing/2014/main" id="{04882994-2E24-4060-9428-4813448CD91B}"/>
+                </a:ext>
+              </a:extLst>
+            </p:cNvPr>
+            <p:cNvSpPr txBox="1"/>
+            <p:nvPr/>
+          </p:nvSpPr>
+          <p:spPr>
+            <a:xfrm>
+              <a:off x="1541672" y="1371339"/>
+              <a:ext cx="4217821" cy="830997"/>
+            </a:xfrm>
+            <a:prstGeom prst="rect">
+              <a:avLst/>
+            </a:prstGeom>
+            <a:noFill/>
+          </p:spPr>
+          <p:txBody>
+            <a:bodyPr wrap="none" rtlCol="0">
+              <a:spAutoFit/>
+            </a:bodyPr>
+            <a:lstStyle/>
+            <a:p>
+              <a:r>
+                <a:rPr lang="pt-BR" sz="4800" dirty="0">
+                  <a:solidFill>
+                    <a:srgbClr val="FFFF00"/>
+                  </a:solidFill>
+                  <a:latin typeface="Arial Black" panose="020B0A04020102020204" pitchFamily="34" charset="0"/>
+                </a:rPr>
+                <a:t>F  </a:t>
+              </a:r>
+              <a:r>
+                <a:rPr lang="pt-BR" sz="4800" dirty="0">
+                  <a:solidFill>
+                    <a:srgbClr val="0070C0"/>
+                  </a:solidFill>
+                  <a:latin typeface="Arial Black" panose="020B0A04020102020204" pitchFamily="34" charset="0"/>
+                </a:rPr>
+                <a:t>S</a:t>
+              </a:r>
+              <a:r>
+                <a:rPr lang="pt-BR" sz="4800" dirty="0">
+                  <a:solidFill>
+                    <a:srgbClr val="FF0000"/>
+                  </a:solidFill>
+                  <a:latin typeface="Arial Black" panose="020B0A04020102020204" pitchFamily="34" charset="0"/>
+                </a:rPr>
+                <a:t>E</a:t>
+              </a:r>
+              <a:r>
+                <a:rPr lang="pt-BR" sz="4800" dirty="0">
+                  <a:solidFill>
+                    <a:srgbClr val="FFFF00"/>
+                  </a:solidFill>
+                  <a:latin typeface="Arial Black" panose="020B0A04020102020204" pitchFamily="34" charset="0"/>
+                </a:rPr>
+                <a:t>   </a:t>
+              </a:r>
+              <a:r>
+                <a:rPr lang="pt-BR" sz="4800" dirty="0">
+                  <a:solidFill>
+                    <a:srgbClr val="0070C0"/>
+                  </a:solidFill>
+                  <a:latin typeface="Arial Black" panose="020B0A04020102020204" pitchFamily="34" charset="0"/>
+                </a:rPr>
+                <a:t>C</a:t>
+              </a:r>
+              <a:r>
+                <a:rPr lang="pt-BR" sz="4800" dirty="0">
+                  <a:solidFill>
+                    <a:srgbClr val="FF0000"/>
+                  </a:solidFill>
+                  <a:latin typeface="Arial Black" panose="020B0A04020102020204" pitchFamily="34" charset="0"/>
+                </a:rPr>
+                <a:t>I</a:t>
+              </a:r>
+              <a:r>
+                <a:rPr lang="pt-BR" sz="4800" dirty="0">
+                  <a:solidFill>
+                    <a:srgbClr val="FFFF00"/>
+                  </a:solidFill>
+                  <a:latin typeface="Arial Black" panose="020B0A04020102020204" pitchFamily="34" charset="0"/>
+                </a:rPr>
+                <a:t>M  </a:t>
+              </a:r>
+              <a:endParaRPr lang="pt-BR" sz="4800" dirty="0">
+                <a:solidFill>
+                  <a:srgbClr val="92D050"/>
+                </a:solidFill>
+                <a:latin typeface="Arial Black" panose="020B0A04020102020204" pitchFamily="34" charset="0"/>
+              </a:endParaRPr>
+            </a:p>
+          </p:txBody>
+        </p:sp>
+        <p:sp>
+          <p:nvSpPr>
+            <p:cNvPr id="10" name="Triângulo isósceles 9">
+              <a:extLst>
+                <a:ext uri="{FF2B5EF4-FFF2-40B4-BE49-F238E27FC236}">
+                  <a16:creationId xmlns:a16="http://schemas.microsoft.com/office/drawing/2014/main" id="{CDF2D08B-6C6A-487A-ADCB-8A0B85249939}"/>
+                </a:ext>
+              </a:extLst>
+            </p:cNvPr>
+            <p:cNvSpPr/>
+            <p:nvPr/>
+          </p:nvSpPr>
+          <p:spPr>
+            <a:xfrm>
+              <a:off x="1981377" y="1538514"/>
+              <a:ext cx="471538" cy="480104"/>
+            </a:xfrm>
+            <a:prstGeom prst="triangle">
+              <a:avLst/>
+            </a:prstGeom>
+            <a:solidFill>
+              <a:srgbClr val="92D050"/>
+            </a:solidFill>
+            <a:ln>
+              <a:noFill/>
+            </a:ln>
+          </p:spPr>
+          <p:style>
+            <a:lnRef idx="2">
+              <a:schemeClr val="accent1">
+                <a:shade val="50000"/>
+              </a:schemeClr>
+            </a:lnRef>
+            <a:fillRef idx="1">
+              <a:schemeClr val="accent1"/>
+            </a:fillRef>
+            <a:effectRef idx="0">
+              <a:schemeClr val="accent1"/>
+            </a:effectRef>
+            <a:fontRef idx="minor">
+              <a:schemeClr val="lt1"/>
+            </a:fontRef>
+          </p:style>
+          <p:txBody>
+            <a:bodyPr rtlCol="0" anchor="ctr"/>
+            <a:lstStyle/>
+            <a:p>
+              <a:pPr algn="ctr"/>
+              <a:endParaRPr lang="pt-BR"/>
+            </a:p>
+          </p:txBody>
+        </p:sp>
+        <p:sp>
+          <p:nvSpPr>
+            <p:cNvPr id="9" name="Triângulo isósceles 8">
+              <a:extLst>
+                <a:ext uri="{FF2B5EF4-FFF2-40B4-BE49-F238E27FC236}">
+                  <a16:creationId xmlns:a16="http://schemas.microsoft.com/office/drawing/2014/main" id="{4CD46DAE-5BC0-471B-B76E-F3ADFB447A2D}"/>
+                </a:ext>
+              </a:extLst>
+            </p:cNvPr>
+            <p:cNvSpPr/>
+            <p:nvPr/>
+          </p:nvSpPr>
+          <p:spPr>
+            <a:xfrm>
+              <a:off x="3509294" y="1546785"/>
+              <a:ext cx="471538" cy="480104"/>
+            </a:xfrm>
+            <a:prstGeom prst="triangle">
+              <a:avLst/>
+            </a:prstGeom>
+            <a:solidFill>
+              <a:srgbClr val="92D050"/>
+            </a:solidFill>
+            <a:ln>
+              <a:noFill/>
+            </a:ln>
+          </p:spPr>
+          <p:style>
+            <a:lnRef idx="2">
+              <a:schemeClr val="accent1">
+                <a:shade val="50000"/>
+              </a:schemeClr>
+            </a:lnRef>
+            <a:fillRef idx="1">
+              <a:schemeClr val="accent1"/>
+            </a:fillRef>
+            <a:effectRef idx="0">
+              <a:schemeClr val="accent1"/>
+            </a:effectRef>
+            <a:fontRef idx="minor">
+              <a:schemeClr val="lt1"/>
+            </a:fontRef>
+          </p:style>
+          <p:txBody>
+            <a:bodyPr rtlCol="0" anchor="ctr"/>
+            <a:lstStyle/>
+            <a:p>
+              <a:pPr algn="ctr"/>
+              <a:endParaRPr lang="pt-BR"/>
+            </a:p>
+          </p:txBody>
+        </p:sp>
+        <p:sp>
+          <p:nvSpPr>
+            <p:cNvPr id="12" name="Triângulo isósceles 11">
+              <a:extLst>
+                <a:ext uri="{FF2B5EF4-FFF2-40B4-BE49-F238E27FC236}">
+                  <a16:creationId xmlns:a16="http://schemas.microsoft.com/office/drawing/2014/main" id="{EDCF34A2-6D9E-4C33-BE40-C2505CFC7F95}"/>
+                </a:ext>
+              </a:extLst>
+            </p:cNvPr>
+            <p:cNvSpPr/>
+            <p:nvPr/>
+          </p:nvSpPr>
+          <p:spPr>
+            <a:xfrm>
+              <a:off x="5244413" y="1539646"/>
+              <a:ext cx="471538" cy="480104"/>
+            </a:xfrm>
+            <a:prstGeom prst="triangle">
+              <a:avLst/>
+            </a:prstGeom>
+            <a:solidFill>
+              <a:srgbClr val="92D050"/>
+            </a:solidFill>
+            <a:ln>
+              <a:noFill/>
+            </a:ln>
+          </p:spPr>
+          <p:style>
+            <a:lnRef idx="2">
+              <a:schemeClr val="accent1">
+                <a:shade val="50000"/>
+              </a:schemeClr>
+            </a:lnRef>
+            <a:fillRef idx="1">
+              <a:schemeClr val="accent1"/>
+            </a:fillRef>
+            <a:effectRef idx="0">
+              <a:schemeClr val="accent1"/>
+            </a:effectRef>
+            <a:fontRef idx="minor">
+              <a:schemeClr val="lt1"/>
+            </a:fontRef>
+          </p:style>
+          <p:txBody>
+            <a:bodyPr rtlCol="0" anchor="ctr"/>
+            <a:lstStyle/>
+            <a:p>
+              <a:pPr algn="ctr"/>
+              <a:endParaRPr lang="pt-BR"/>
+            </a:p>
+          </p:txBody>
+        </p:sp>
+      </p:grpSp>
+    </p:spTree>
+    <p:extLst>
+      <p:ext uri="{BB962C8B-B14F-4D97-AF65-F5344CB8AC3E}">
+        <p14:creationId xmlns:p14="http://schemas.microsoft.com/office/powerpoint/2010/main" val="2751441782"/>
+      </p:ext>
+    </p:extLst>
+  </p:cSld>
+  <p:clrMapOvr>
+    <a:masterClrMapping/>
+  </p:clrMapOvr>
+</p:sld>
+</file>
+
+<file path=ppt/slides/slide11.xml><?xml version="1.0" encoding="utf-8"?>
+<p:sld xmlns:a="http://schemas.openxmlformats.org/drawingml/2006/main" xmlns:r="http://schemas.openxmlformats.org/officeDocument/2006/relationships" xmlns:p="http://schemas.openxmlformats.org/presentationml/2006/main">
+  <p:cSld>
+    <p:spTree>
+      <p:nvGrpSpPr>
+        <p:cNvPr id="1" name=""/>
+        <p:cNvGrpSpPr/>
+        <p:nvPr/>
+      </p:nvGrpSpPr>
+      <p:grpSpPr>
+        <a:xfrm>
+          <a:off x="0" y="0"/>
+          <a:ext cx="0" cy="0"/>
+          <a:chOff x="0" y="0"/>
+          <a:chExt cx="0" cy="0"/>
+        </a:xfrm>
+      </p:grpSpPr>
+      <p:grpSp>
+        <p:nvGrpSpPr>
+          <p:cNvPr id="6" name="Agrupar 5">
+            <a:extLst>
+              <a:ext uri="{FF2B5EF4-FFF2-40B4-BE49-F238E27FC236}">
+                <a16:creationId xmlns:a16="http://schemas.microsoft.com/office/drawing/2014/main" id="{7AD26A1F-050B-4F7E-9E49-B5563793008E}"/>
+              </a:ext>
+            </a:extLst>
+          </p:cNvPr>
+          <p:cNvGrpSpPr/>
+          <p:nvPr/>
+        </p:nvGrpSpPr>
+        <p:grpSpPr>
+          <a:xfrm>
+            <a:off x="1444348" y="1545510"/>
+            <a:ext cx="3737127" cy="830997"/>
+            <a:chOff x="1444348" y="1545510"/>
+            <a:chExt cx="3737127" cy="830997"/>
+          </a:xfrm>
+        </p:grpSpPr>
+        <p:sp>
+          <p:nvSpPr>
+            <p:cNvPr id="11" name="CaixaDeTexto 10">
+              <a:extLst>
+                <a:ext uri="{FF2B5EF4-FFF2-40B4-BE49-F238E27FC236}">
+                  <a16:creationId xmlns:a16="http://schemas.microsoft.com/office/drawing/2014/main" id="{04882994-2E24-4060-9428-4813448CD91B}"/>
+                </a:ext>
+              </a:extLst>
+            </p:cNvPr>
+            <p:cNvSpPr txBox="1"/>
+            <p:nvPr/>
+          </p:nvSpPr>
+          <p:spPr>
+            <a:xfrm>
+              <a:off x="1713859" y="1545510"/>
+              <a:ext cx="3467616" cy="830997"/>
+            </a:xfrm>
+            <a:prstGeom prst="rect">
+              <a:avLst/>
+            </a:prstGeom>
+            <a:noFill/>
+          </p:spPr>
+          <p:txBody>
+            <a:bodyPr wrap="none" rtlCol="0">
+              <a:spAutoFit/>
+            </a:bodyPr>
+            <a:lstStyle/>
+            <a:p>
+              <a:pPr algn="ctr"/>
+              <a:r>
+                <a:rPr lang="pt-BR" sz="4800" dirty="0">
+                  <a:solidFill>
+                    <a:srgbClr val="FFFF00"/>
+                  </a:solidFill>
+                  <a:latin typeface="Arial Black" panose="020B0A04020102020204" pitchFamily="34" charset="0"/>
+                </a:rPr>
+                <a:t>T</a:t>
+              </a:r>
+              <a:r>
+                <a:rPr lang="pt-BR" sz="4800" dirty="0">
+                  <a:solidFill>
+                    <a:srgbClr val="0070C0"/>
+                  </a:solidFill>
+                  <a:latin typeface="Arial Black" panose="020B0A04020102020204" pitchFamily="34" charset="0"/>
+                </a:rPr>
+                <a:t>E</a:t>
+              </a:r>
+              <a:r>
+                <a:rPr lang="pt-BR" sz="4800" dirty="0">
+                  <a:solidFill>
+                    <a:srgbClr val="FF0000"/>
+                  </a:solidFill>
+                  <a:latin typeface="Arial Black" panose="020B0A04020102020204" pitchFamily="34" charset="0"/>
+                </a:rPr>
+                <a:t>N</a:t>
+              </a:r>
+              <a:r>
+                <a:rPr lang="pt-BR" sz="4800" dirty="0">
+                  <a:solidFill>
+                    <a:srgbClr val="FFFF00"/>
+                  </a:solidFill>
+                  <a:latin typeface="Arial Black" panose="020B0A04020102020204" pitchFamily="34" charset="0"/>
+                </a:rPr>
+                <a:t>Ç</a:t>
+              </a:r>
+              <a:r>
+                <a:rPr lang="pt-BR" sz="4800" dirty="0">
+                  <a:solidFill>
+                    <a:srgbClr val="92D050"/>
+                  </a:solidFill>
+                  <a:latin typeface="Arial Black" panose="020B0A04020102020204" pitchFamily="34" charset="0"/>
+                </a:rPr>
+                <a:t>Ã</a:t>
+              </a:r>
+              <a:r>
+                <a:rPr lang="pt-BR" sz="4800" dirty="0">
+                  <a:solidFill>
+                    <a:srgbClr val="0070C0"/>
+                  </a:solidFill>
+                  <a:latin typeface="Arial Black" panose="020B0A04020102020204" pitchFamily="34" charset="0"/>
+                </a:rPr>
+                <a:t>O</a:t>
+              </a:r>
+              <a:r>
+                <a:rPr lang="pt-BR" sz="4800" dirty="0">
+                  <a:solidFill>
+                    <a:srgbClr val="FF0000"/>
+                  </a:solidFill>
+                  <a:latin typeface="Arial Black" panose="020B0A04020102020204" pitchFamily="34" charset="0"/>
+                </a:rPr>
+                <a:t>!!</a:t>
+              </a:r>
+            </a:p>
+          </p:txBody>
+        </p:sp>
+        <p:sp>
+          <p:nvSpPr>
+            <p:cNvPr id="10" name="Triângulo isósceles 9">
+              <a:extLst>
+                <a:ext uri="{FF2B5EF4-FFF2-40B4-BE49-F238E27FC236}">
+                  <a16:creationId xmlns:a16="http://schemas.microsoft.com/office/drawing/2014/main" id="{CDF2D08B-6C6A-487A-ADCB-8A0B85249939}"/>
+                </a:ext>
+              </a:extLst>
+            </p:cNvPr>
+            <p:cNvSpPr/>
+            <p:nvPr/>
+          </p:nvSpPr>
+          <p:spPr>
+            <a:xfrm>
+              <a:off x="1444348" y="1712685"/>
+              <a:ext cx="471538" cy="459800"/>
+            </a:xfrm>
+            <a:prstGeom prst="triangle">
+              <a:avLst/>
+            </a:prstGeom>
+            <a:solidFill>
+              <a:srgbClr val="92D050"/>
+            </a:solidFill>
+            <a:ln>
+              <a:noFill/>
+            </a:ln>
+          </p:spPr>
+          <p:style>
+            <a:lnRef idx="2">
+              <a:schemeClr val="accent1">
+                <a:shade val="50000"/>
+              </a:schemeClr>
+            </a:lnRef>
+            <a:fillRef idx="1">
+              <a:schemeClr val="accent1"/>
+            </a:fillRef>
+            <a:effectRef idx="0">
+              <a:schemeClr val="accent1"/>
+            </a:effectRef>
+            <a:fontRef idx="minor">
+              <a:schemeClr val="lt1"/>
+            </a:fontRef>
+          </p:style>
+          <p:txBody>
+            <a:bodyPr rtlCol="0" anchor="ctr"/>
+            <a:lstStyle/>
+            <a:p>
+              <a:pPr algn="ctr"/>
+              <a:endParaRPr lang="pt-BR"/>
+            </a:p>
+          </p:txBody>
+        </p:sp>
+        <p:sp>
+          <p:nvSpPr>
+            <p:cNvPr id="9" name="Triângulo isósceles 8">
+              <a:extLst>
+                <a:ext uri="{FF2B5EF4-FFF2-40B4-BE49-F238E27FC236}">
+                  <a16:creationId xmlns:a16="http://schemas.microsoft.com/office/drawing/2014/main" id="{4CD46DAE-5BC0-471B-B76E-F3ADFB447A2D}"/>
+                </a:ext>
+              </a:extLst>
+            </p:cNvPr>
+            <p:cNvSpPr/>
+            <p:nvPr/>
+          </p:nvSpPr>
+          <p:spPr>
+            <a:xfrm>
+              <a:off x="3667590" y="1712685"/>
+              <a:ext cx="471538" cy="459800"/>
+            </a:xfrm>
+            <a:prstGeom prst="triangle">
+              <a:avLst/>
+            </a:prstGeom>
+            <a:solidFill>
+              <a:srgbClr val="92D050"/>
+            </a:solidFill>
+            <a:ln>
+              <a:noFill/>
+            </a:ln>
+          </p:spPr>
+          <p:style>
+            <a:lnRef idx="2">
+              <a:schemeClr val="accent1">
+                <a:shade val="50000"/>
+              </a:schemeClr>
+            </a:lnRef>
+            <a:fillRef idx="1">
+              <a:schemeClr val="accent1"/>
+            </a:fillRef>
+            <a:effectRef idx="0">
+              <a:schemeClr val="accent1"/>
+            </a:effectRef>
+            <a:fontRef idx="minor">
+              <a:schemeClr val="lt1"/>
+            </a:fontRef>
+          </p:style>
+          <p:txBody>
+            <a:bodyPr rtlCol="0" anchor="ctr"/>
+            <a:lstStyle/>
+            <a:p>
+              <a:pPr algn="ctr"/>
+              <a:endParaRPr lang="pt-BR"/>
+            </a:p>
+          </p:txBody>
+        </p:sp>
+      </p:grpSp>
+      <p:sp>
+        <p:nvSpPr>
+          <p:cNvPr id="13" name="CaixaDeTexto 12">
+            <a:extLst>
+              <a:ext uri="{FF2B5EF4-FFF2-40B4-BE49-F238E27FC236}">
+                <a16:creationId xmlns:a16="http://schemas.microsoft.com/office/drawing/2014/main" id="{621ED7A9-EAF7-46F0-A325-D651BF1386AC}"/>
+              </a:ext>
+            </a:extLst>
+          </p:cNvPr>
+          <p:cNvSpPr txBox="1"/>
+          <p:nvPr/>
+        </p:nvSpPr>
+        <p:spPr>
+          <a:xfrm>
+            <a:off x="4352490" y="2376507"/>
+            <a:ext cx="3779817" cy="769441"/>
+          </a:xfrm>
+          <a:prstGeom prst="rect">
+            <a:avLst/>
+          </a:prstGeom>
+          <a:noFill/>
+        </p:spPr>
+        <p:txBody>
+          <a:bodyPr wrap="none" rtlCol="0">
+            <a:spAutoFit/>
+          </a:bodyPr>
+          <a:lstStyle/>
+          <a:p>
+            <a:pPr algn="ctr"/>
+            <a:r>
+              <a:rPr lang="pt-BR" sz="4400" dirty="0">
+                <a:solidFill>
+                  <a:schemeClr val="bg2">
+                    <a:lumMod val="90000"/>
+                  </a:schemeClr>
+                </a:solidFill>
+                <a:latin typeface="Arial Black" panose="020B0A04020102020204" pitchFamily="34" charset="0"/>
+              </a:rPr>
+              <a:t>ATENÇÃO!!!</a:t>
+            </a:r>
+          </a:p>
+        </p:txBody>
+      </p:sp>
+    </p:spTree>
+    <p:extLst>
+      <p:ext uri="{BB962C8B-B14F-4D97-AF65-F5344CB8AC3E}">
+        <p14:creationId xmlns:p14="http://schemas.microsoft.com/office/powerpoint/2010/main" val="176806908"/>
+      </p:ext>
+    </p:extLst>
+  </p:cSld>
+  <p:clrMapOvr>
+    <a:masterClrMapping/>
+  </p:clrMapOvr>
+</p:sld>
+</file>
+
+<file path=ppt/slides/slide12.xml><?xml version="1.0" encoding="utf-8"?>
+<p:sld xmlns:a="http://schemas.openxmlformats.org/drawingml/2006/main" xmlns:r="http://schemas.openxmlformats.org/officeDocument/2006/relationships" xmlns:p="http://schemas.openxmlformats.org/presentationml/2006/main">
+  <p:cSld>
+    <p:spTree>
+      <p:nvGrpSpPr>
+        <p:cNvPr id="1" name=""/>
+        <p:cNvGrpSpPr/>
+        <p:nvPr/>
+      </p:nvGrpSpPr>
+      <p:grpSpPr>
+        <a:xfrm>
+          <a:off x="0" y="0"/>
+          <a:ext cx="0" cy="0"/>
+          <a:chOff x="0" y="0"/>
+          <a:chExt cx="0" cy="0"/>
+        </a:xfrm>
+      </p:grpSpPr>
+      <p:grpSp>
+        <p:nvGrpSpPr>
           <p:cNvPr id="10" name="Agrupar 9">
             <a:extLst>
               <a:ext uri="{FF2B5EF4-FFF2-40B4-BE49-F238E27FC236}">
@@ -4328,7 +5456,7 @@
 </p:sld>
 </file>
 
-<file path=ppt/slides/slide11.xml><?xml version="1.0" encoding="utf-8"?>
+<file path=ppt/slides/slide13.xml><?xml version="1.0" encoding="utf-8"?>
 <p:sld xmlns:a="http://schemas.openxmlformats.org/drawingml/2006/main" xmlns:r="http://schemas.openxmlformats.org/officeDocument/2006/relationships" xmlns:p="http://schemas.openxmlformats.org/presentationml/2006/main">
   <p:cSld>
     <p:spTree>
@@ -5328,7 +6456,7 @@
 </p:sld>
 </file>
 
-<file path=ppt/slides/slide12.xml><?xml version="1.0" encoding="utf-8"?>
+<file path=ppt/slides/slide14.xml><?xml version="1.0" encoding="utf-8"?>
 <p:sld xmlns:a="http://schemas.openxmlformats.org/drawingml/2006/main" xmlns:r="http://schemas.openxmlformats.org/officeDocument/2006/relationships" xmlns:p="http://schemas.openxmlformats.org/presentationml/2006/main">
   <p:cSld>
     <p:spTree>
@@ -6451,7 +7579,7 @@
 </p:sld>
 </file>
 
-<file path=ppt/slides/slide13.xml><?xml version="1.0" encoding="utf-8"?>
+<file path=ppt/slides/slide15.xml><?xml version="1.0" encoding="utf-8"?>
 <p:sld xmlns:a="http://schemas.openxmlformats.org/drawingml/2006/main" xmlns:r="http://schemas.openxmlformats.org/officeDocument/2006/relationships" xmlns:p="http://schemas.openxmlformats.org/presentationml/2006/main">
   <p:cSld>
     <p:spTree>
@@ -7684,6 +8812,164 @@
           <a:chExt cx="0" cy="0"/>
         </a:xfrm>
       </p:grpSpPr>
+      <p:pic>
+        <p:nvPicPr>
+          <p:cNvPr id="5" name="Imagem 4">
+            <a:extLst>
+              <a:ext uri="{FF2B5EF4-FFF2-40B4-BE49-F238E27FC236}">
+                <a16:creationId xmlns:a16="http://schemas.microsoft.com/office/drawing/2014/main" id="{42966987-86AD-413C-9E4E-C278CE0EF690}"/>
+              </a:ext>
+            </a:extLst>
+          </p:cNvPr>
+          <p:cNvPicPr>
+            <a:picLocks noChangeAspect="1"/>
+          </p:cNvPicPr>
+          <p:nvPr/>
+        </p:nvPicPr>
+        <p:blipFill>
+          <a:blip r:embed="rId2">
+            <a:extLst>
+              <a:ext uri="{28A0092B-C50C-407E-A947-70E740481C1C}">
+                <a14:useLocalDpi xmlns:a14="http://schemas.microsoft.com/office/drawing/2010/main" val="0"/>
+              </a:ext>
+            </a:extLst>
+          </a:blip>
+          <a:stretch>
+            <a:fillRect/>
+          </a:stretch>
+        </p:blipFill>
+        <p:spPr>
+          <a:xfrm>
+            <a:off x="5943600" y="3276600"/>
+            <a:ext cx="304800" cy="304800"/>
+          </a:xfrm>
+          <a:prstGeom prst="rect">
+            <a:avLst/>
+          </a:prstGeom>
+        </p:spPr>
+      </p:pic>
+      <p:pic>
+        <p:nvPicPr>
+          <p:cNvPr id="1026" name="Picture 2" descr="Marca UDESC">
+            <a:extLst>
+              <a:ext uri="{FF2B5EF4-FFF2-40B4-BE49-F238E27FC236}">
+                <a16:creationId xmlns:a16="http://schemas.microsoft.com/office/drawing/2014/main" id="{7EDB3DF8-0994-4C98-AE3E-CD92A477E805}"/>
+              </a:ext>
+            </a:extLst>
+          </p:cNvPr>
+          <p:cNvPicPr>
+            <a:picLocks noChangeAspect="1" noChangeArrowheads="1"/>
+          </p:cNvPicPr>
+          <p:nvPr/>
+        </p:nvPicPr>
+        <p:blipFill>
+          <a:blip r:embed="rId3">
+            <a:extLst>
+              <a:ext uri="{28A0092B-C50C-407E-A947-70E740481C1C}">
+                <a14:useLocalDpi xmlns:a14="http://schemas.microsoft.com/office/drawing/2010/main" val="0"/>
+              </a:ext>
+            </a:extLst>
+          </a:blip>
+          <a:srcRect/>
+          <a:stretch>
+            <a:fillRect/>
+          </a:stretch>
+        </p:blipFill>
+        <p:spPr bwMode="auto">
+          <a:xfrm>
+            <a:off x="6468034" y="3272117"/>
+            <a:ext cx="306000" cy="306000"/>
+          </a:xfrm>
+          <a:prstGeom prst="rect">
+            <a:avLst/>
+          </a:prstGeom>
+          <a:noFill/>
+          <a:extLst>
+            <a:ext uri="{909E8E84-426E-40DD-AFC4-6F175D3DCCD1}">
+              <a14:hiddenFill xmlns:a14="http://schemas.microsoft.com/office/drawing/2010/main">
+                <a:solidFill>
+                  <a:srgbClr val="FFFFFF"/>
+                </a:solidFill>
+              </a14:hiddenFill>
+            </a:ext>
+          </a:extLst>
+        </p:spPr>
+      </p:pic>
+      <p:pic>
+        <p:nvPicPr>
+          <p:cNvPr id="1032" name="Picture 8">
+            <a:extLst>
+              <a:ext uri="{FF2B5EF4-FFF2-40B4-BE49-F238E27FC236}">
+                <a16:creationId xmlns:a16="http://schemas.microsoft.com/office/drawing/2014/main" id="{8174093A-BAF2-4B39-B61A-60443B31503C}"/>
+              </a:ext>
+            </a:extLst>
+          </p:cNvPr>
+          <p:cNvPicPr>
+            <a:picLocks noChangeAspect="1" noChangeArrowheads="1"/>
+          </p:cNvPicPr>
+          <p:nvPr/>
+        </p:nvPicPr>
+        <p:blipFill rotWithShape="1">
+          <a:blip r:embed="rId4">
+            <a:extLst>
+              <a:ext uri="{28A0092B-C50C-407E-A947-70E740481C1C}">
+                <a14:useLocalDpi xmlns:a14="http://schemas.microsoft.com/office/drawing/2010/main" val="0"/>
+              </a:ext>
+            </a:extLst>
+          </a:blip>
+          <a:srcRect l="22141" t="8889" r="15115" b="13856"/>
+          <a:stretch/>
+        </p:blipFill>
+        <p:spPr bwMode="auto">
+          <a:xfrm>
+            <a:off x="6794406" y="3272117"/>
+            <a:ext cx="397645" cy="306000"/>
+          </a:xfrm>
+          <a:prstGeom prst="rect">
+            <a:avLst/>
+          </a:prstGeom>
+          <a:noFill/>
+          <a:extLst>
+            <a:ext uri="{909E8E84-426E-40DD-AFC4-6F175D3DCCD1}">
+              <a14:hiddenFill xmlns:a14="http://schemas.microsoft.com/office/drawing/2010/main">
+                <a:solidFill>
+                  <a:srgbClr val="FFFFFF"/>
+                </a:solidFill>
+              </a14:hiddenFill>
+            </a:ext>
+          </a:extLst>
+        </p:spPr>
+      </p:pic>
+    </p:spTree>
+    <p:extLst>
+      <p:ext uri="{BB962C8B-B14F-4D97-AF65-F5344CB8AC3E}">
+        <p14:creationId xmlns:p14="http://schemas.microsoft.com/office/powerpoint/2010/main" val="3866807362"/>
+      </p:ext>
+    </p:extLst>
+  </p:cSld>
+  <p:clrMapOvr>
+    <a:masterClrMapping/>
+  </p:clrMapOvr>
+</p:sld>
+</file>
+
+<file path=ppt/slides/slide3.xml><?xml version="1.0" encoding="utf-8"?>
+<p:sld xmlns:a="http://schemas.openxmlformats.org/drawingml/2006/main" xmlns:r="http://schemas.openxmlformats.org/officeDocument/2006/relationships" xmlns:p="http://schemas.openxmlformats.org/presentationml/2006/main">
+  <p:cSld>
+    <p:spTree>
+      <p:nvGrpSpPr>
+        <p:cNvPr id="1" name=""/>
+        <p:cNvGrpSpPr/>
+        <p:nvPr/>
+      </p:nvGrpSpPr>
+      <p:grpSpPr>
+        <a:xfrm>
+          <a:off x="0" y="0"/>
+          <a:ext cx="0" cy="0"/>
+          <a:chOff x="0" y="0"/>
+          <a:chExt cx="0" cy="0"/>
+        </a:xfrm>
+      </p:grpSpPr>
       <p:sp>
         <p:nvSpPr>
           <p:cNvPr id="26" name="Retângulo: Cantos Arredondados 25">
@@ -8643,7 +9929,1025 @@
 </p:sld>
 </file>
 
-<file path=ppt/slides/slide3.xml><?xml version="1.0" encoding="utf-8"?>
+<file path=ppt/slides/slide4.xml><?xml version="1.0" encoding="utf-8"?>
+<p:sld xmlns:a="http://schemas.openxmlformats.org/drawingml/2006/main" xmlns:r="http://schemas.openxmlformats.org/officeDocument/2006/relationships" xmlns:p="http://schemas.openxmlformats.org/presentationml/2006/main">
+  <p:cSld>
+    <p:spTree>
+      <p:nvGrpSpPr>
+        <p:cNvPr id="1" name=""/>
+        <p:cNvGrpSpPr/>
+        <p:nvPr/>
+      </p:nvGrpSpPr>
+      <p:grpSpPr>
+        <a:xfrm>
+          <a:off x="0" y="0"/>
+          <a:ext cx="0" cy="0"/>
+          <a:chOff x="0" y="0"/>
+          <a:chExt cx="0" cy="0"/>
+        </a:xfrm>
+      </p:grpSpPr>
+      <p:sp>
+        <p:nvSpPr>
+          <p:cNvPr id="26" name="Retângulo: Cantos Arredondados 25">
+            <a:extLst>
+              <a:ext uri="{FF2B5EF4-FFF2-40B4-BE49-F238E27FC236}">
+                <a16:creationId xmlns:a16="http://schemas.microsoft.com/office/drawing/2014/main" id="{999946BC-9188-47FE-9CC7-5472364785AB}"/>
+              </a:ext>
+            </a:extLst>
+          </p:cNvPr>
+          <p:cNvSpPr/>
+          <p:nvPr/>
+        </p:nvSpPr>
+        <p:spPr>
+          <a:xfrm>
+            <a:off x="2324100" y="350744"/>
+            <a:ext cx="7372350" cy="5459506"/>
+          </a:xfrm>
+          <a:prstGeom prst="roundRect">
+            <a:avLst>
+              <a:gd name="adj" fmla="val 5501"/>
+            </a:avLst>
+          </a:prstGeom>
+          <a:solidFill>
+            <a:srgbClr val="FFFF00"/>
+          </a:solidFill>
+        </p:spPr>
+        <p:style>
+          <a:lnRef idx="2">
+            <a:schemeClr val="accent1">
+              <a:shade val="50000"/>
+            </a:schemeClr>
+          </a:lnRef>
+          <a:fillRef idx="1">
+            <a:schemeClr val="accent1"/>
+          </a:fillRef>
+          <a:effectRef idx="0">
+            <a:schemeClr val="accent1"/>
+          </a:effectRef>
+          <a:fontRef idx="minor">
+            <a:schemeClr val="lt1"/>
+          </a:fontRef>
+        </p:style>
+        <p:txBody>
+          <a:bodyPr rtlCol="0" anchor="ctr"/>
+          <a:lstStyle/>
+          <a:p>
+            <a:pPr algn="ctr"/>
+            <a:endParaRPr lang="pt-BR"/>
+          </a:p>
+        </p:txBody>
+      </p:sp>
+      <p:sp>
+        <p:nvSpPr>
+          <p:cNvPr id="4" name="CaixaDeTexto 3">
+            <a:extLst>
+              <a:ext uri="{FF2B5EF4-FFF2-40B4-BE49-F238E27FC236}">
+                <a16:creationId xmlns:a16="http://schemas.microsoft.com/office/drawing/2014/main" id="{B5B7E5F6-52D6-43AA-8D45-AABD568F9A7E}"/>
+              </a:ext>
+            </a:extLst>
+          </p:cNvPr>
+          <p:cNvSpPr txBox="1"/>
+          <p:nvPr/>
+        </p:nvSpPr>
+        <p:spPr>
+          <a:xfrm>
+            <a:off x="3053226" y="3885905"/>
+            <a:ext cx="5914097" cy="707886"/>
+          </a:xfrm>
+          <a:prstGeom prst="rect">
+            <a:avLst/>
+          </a:prstGeom>
+          <a:noFill/>
+        </p:spPr>
+        <p:txBody>
+          <a:bodyPr wrap="square" rtlCol="0">
+            <a:spAutoFit/>
+            <a:scene3d>
+              <a:camera prst="orthographicFront">
+                <a:rot lat="10800000" lon="0" rev="0"/>
+              </a:camera>
+              <a:lightRig rig="threePt" dir="t"/>
+            </a:scene3d>
+          </a:bodyPr>
+          <a:lstStyle/>
+          <a:p>
+            <a:pPr algn="ctr"/>
+            <a:r>
+              <a:rPr lang="pt-BR" sz="2000" b="1" dirty="0"/>
+              <a:t>Clique nas arestas da tela de projeção capturada na tela de controle, na seguinte sequência: 1-2-3-4.</a:t>
+            </a:r>
+            <a:endParaRPr lang="pt-BR" sz="3200" b="1" dirty="0"/>
+          </a:p>
+        </p:txBody>
+      </p:sp>
+      <p:sp>
+        <p:nvSpPr>
+          <p:cNvPr id="2" name="Trapezoide 1">
+            <a:extLst>
+              <a:ext uri="{FF2B5EF4-FFF2-40B4-BE49-F238E27FC236}">
+                <a16:creationId xmlns:a16="http://schemas.microsoft.com/office/drawing/2014/main" id="{86F0CA80-37C6-44DD-9C2A-17E79D57ABB9}"/>
+              </a:ext>
+            </a:extLst>
+          </p:cNvPr>
+          <p:cNvSpPr/>
+          <p:nvPr/>
+        </p:nvSpPr>
+        <p:spPr>
+          <a:xfrm>
+            <a:off x="3827829" y="835198"/>
+            <a:ext cx="4597400" cy="2489200"/>
+          </a:xfrm>
+          <a:prstGeom prst="trapezoid">
+            <a:avLst/>
+          </a:prstGeom>
+        </p:spPr>
+        <p:style>
+          <a:lnRef idx="2">
+            <a:schemeClr val="accent1">
+              <a:shade val="50000"/>
+            </a:schemeClr>
+          </a:lnRef>
+          <a:fillRef idx="1">
+            <a:schemeClr val="accent1"/>
+          </a:fillRef>
+          <a:effectRef idx="0">
+            <a:schemeClr val="accent1"/>
+          </a:effectRef>
+          <a:fontRef idx="minor">
+            <a:schemeClr val="lt1"/>
+          </a:fontRef>
+        </p:style>
+        <p:txBody>
+          <a:bodyPr rtlCol="0" anchor="ctr">
+            <a:scene3d>
+              <a:camera prst="orthographicFront">
+                <a:rot lat="10800000" lon="0" rev="0"/>
+              </a:camera>
+              <a:lightRig rig="threePt" dir="t"/>
+            </a:scene3d>
+          </a:bodyPr>
+          <a:lstStyle/>
+          <a:p>
+            <a:pPr algn="ctr"/>
+            <a:endParaRPr lang="pt-BR" dirty="0"/>
+          </a:p>
+        </p:txBody>
+      </p:sp>
+      <p:sp>
+        <p:nvSpPr>
+          <p:cNvPr id="5" name="Elipse 4">
+            <a:extLst>
+              <a:ext uri="{FF2B5EF4-FFF2-40B4-BE49-F238E27FC236}">
+                <a16:creationId xmlns:a16="http://schemas.microsoft.com/office/drawing/2014/main" id="{9A9B6E74-C586-4393-BFE1-3A5A796EA6C3}"/>
+              </a:ext>
+            </a:extLst>
+          </p:cNvPr>
+          <p:cNvSpPr/>
+          <p:nvPr/>
+        </p:nvSpPr>
+        <p:spPr>
+          <a:xfrm rot="10800000">
+            <a:off x="8177580" y="3061701"/>
+            <a:ext cx="495300" cy="508000"/>
+          </a:xfrm>
+          <a:prstGeom prst="ellipse">
+            <a:avLst/>
+          </a:prstGeom>
+          <a:solidFill>
+            <a:schemeClr val="accent2"/>
+          </a:solidFill>
+          <a:ln>
+            <a:solidFill>
+              <a:schemeClr val="tx1"/>
+            </a:solidFill>
+          </a:ln>
+        </p:spPr>
+        <p:style>
+          <a:lnRef idx="2">
+            <a:schemeClr val="accent1">
+              <a:shade val="50000"/>
+            </a:schemeClr>
+          </a:lnRef>
+          <a:fillRef idx="1">
+            <a:schemeClr val="accent1"/>
+          </a:fillRef>
+          <a:effectRef idx="0">
+            <a:schemeClr val="accent1"/>
+          </a:effectRef>
+          <a:fontRef idx="minor">
+            <a:schemeClr val="lt1"/>
+          </a:fontRef>
+        </p:style>
+        <p:txBody>
+          <a:bodyPr rtlCol="0" anchor="ctr"/>
+          <a:lstStyle/>
+          <a:p>
+            <a:pPr algn="ctr"/>
+            <a:r>
+              <a:rPr lang="pt-BR" sz="3200" b="1" dirty="0">
+                <a:solidFill>
+                  <a:schemeClr val="tx1"/>
+                </a:solidFill>
+              </a:rPr>
+              <a:t>4</a:t>
+            </a:r>
+          </a:p>
+        </p:txBody>
+      </p:sp>
+      <p:sp>
+        <p:nvSpPr>
+          <p:cNvPr id="6" name="Elipse 5">
+            <a:extLst>
+              <a:ext uri="{FF2B5EF4-FFF2-40B4-BE49-F238E27FC236}">
+                <a16:creationId xmlns:a16="http://schemas.microsoft.com/office/drawing/2014/main" id="{FDD0116C-634F-49AB-A380-A86A82AD1D48}"/>
+              </a:ext>
+            </a:extLst>
+          </p:cNvPr>
+          <p:cNvSpPr/>
+          <p:nvPr/>
+        </p:nvSpPr>
+        <p:spPr>
+          <a:xfrm rot="10800000">
+            <a:off x="3580179" y="3058353"/>
+            <a:ext cx="495300" cy="508000"/>
+          </a:xfrm>
+          <a:prstGeom prst="ellipse">
+            <a:avLst/>
+          </a:prstGeom>
+          <a:solidFill>
+            <a:schemeClr val="accent2"/>
+          </a:solidFill>
+          <a:ln>
+            <a:solidFill>
+              <a:schemeClr val="tx1"/>
+            </a:solidFill>
+          </a:ln>
+        </p:spPr>
+        <p:style>
+          <a:lnRef idx="2">
+            <a:schemeClr val="accent1">
+              <a:shade val="50000"/>
+            </a:schemeClr>
+          </a:lnRef>
+          <a:fillRef idx="1">
+            <a:schemeClr val="accent1"/>
+          </a:fillRef>
+          <a:effectRef idx="0">
+            <a:schemeClr val="accent1"/>
+          </a:effectRef>
+          <a:fontRef idx="minor">
+            <a:schemeClr val="lt1"/>
+          </a:fontRef>
+        </p:style>
+        <p:txBody>
+          <a:bodyPr rtlCol="0" anchor="ctr"/>
+          <a:lstStyle/>
+          <a:p>
+            <a:pPr algn="ctr"/>
+            <a:r>
+              <a:rPr lang="pt-BR" sz="3200" b="1" dirty="0">
+                <a:solidFill>
+                  <a:schemeClr val="tx1"/>
+                </a:solidFill>
+              </a:rPr>
+              <a:t>3</a:t>
+            </a:r>
+            <a:endParaRPr lang="pt-BR" sz="2400" b="1" dirty="0">
+              <a:solidFill>
+                <a:schemeClr val="tx1"/>
+              </a:solidFill>
+            </a:endParaRPr>
+          </a:p>
+        </p:txBody>
+      </p:sp>
+      <p:sp>
+        <p:nvSpPr>
+          <p:cNvPr id="7" name="Elipse 6">
+            <a:extLst>
+              <a:ext uri="{FF2B5EF4-FFF2-40B4-BE49-F238E27FC236}">
+                <a16:creationId xmlns:a16="http://schemas.microsoft.com/office/drawing/2014/main" id="{E4524FC5-70A8-4521-9703-612D2FB0D8B9}"/>
+              </a:ext>
+            </a:extLst>
+          </p:cNvPr>
+          <p:cNvSpPr/>
+          <p:nvPr/>
+        </p:nvSpPr>
+        <p:spPr>
+          <a:xfrm rot="10800000">
+            <a:off x="7587224" y="583890"/>
+            <a:ext cx="495300" cy="508000"/>
+          </a:xfrm>
+          <a:prstGeom prst="ellipse">
+            <a:avLst/>
+          </a:prstGeom>
+          <a:solidFill>
+            <a:schemeClr val="accent2"/>
+          </a:solidFill>
+          <a:ln>
+            <a:solidFill>
+              <a:schemeClr val="tx1"/>
+            </a:solidFill>
+          </a:ln>
+        </p:spPr>
+        <p:style>
+          <a:lnRef idx="2">
+            <a:schemeClr val="accent1">
+              <a:shade val="50000"/>
+            </a:schemeClr>
+          </a:lnRef>
+          <a:fillRef idx="1">
+            <a:schemeClr val="accent1"/>
+          </a:fillRef>
+          <a:effectRef idx="0">
+            <a:schemeClr val="accent1"/>
+          </a:effectRef>
+          <a:fontRef idx="minor">
+            <a:schemeClr val="lt1"/>
+          </a:fontRef>
+        </p:style>
+        <p:txBody>
+          <a:bodyPr rtlCol="0" anchor="ctr"/>
+          <a:lstStyle/>
+          <a:p>
+            <a:pPr algn="ctr"/>
+            <a:r>
+              <a:rPr lang="pt-BR" sz="4000" b="1" dirty="0">
+                <a:solidFill>
+                  <a:schemeClr val="tx1"/>
+                </a:solidFill>
+              </a:rPr>
+              <a:t>2</a:t>
+            </a:r>
+            <a:endParaRPr lang="pt-BR" sz="3200" b="1" dirty="0">
+              <a:solidFill>
+                <a:schemeClr val="tx1"/>
+              </a:solidFill>
+            </a:endParaRPr>
+          </a:p>
+        </p:txBody>
+      </p:sp>
+      <p:sp>
+        <p:nvSpPr>
+          <p:cNvPr id="8" name="Elipse 7">
+            <a:extLst>
+              <a:ext uri="{FF2B5EF4-FFF2-40B4-BE49-F238E27FC236}">
+                <a16:creationId xmlns:a16="http://schemas.microsoft.com/office/drawing/2014/main" id="{0922F221-7D0F-4A64-A440-FD92DD66DD88}"/>
+              </a:ext>
+            </a:extLst>
+          </p:cNvPr>
+          <p:cNvSpPr/>
+          <p:nvPr/>
+        </p:nvSpPr>
+        <p:spPr>
+          <a:xfrm rot="10800000">
+            <a:off x="4169434" y="573089"/>
+            <a:ext cx="495300" cy="508000"/>
+          </a:xfrm>
+          <a:prstGeom prst="ellipse">
+            <a:avLst/>
+          </a:prstGeom>
+          <a:solidFill>
+            <a:schemeClr val="accent2"/>
+          </a:solidFill>
+          <a:ln>
+            <a:solidFill>
+              <a:schemeClr val="tx1"/>
+            </a:solidFill>
+          </a:ln>
+        </p:spPr>
+        <p:style>
+          <a:lnRef idx="2">
+            <a:schemeClr val="accent1">
+              <a:shade val="50000"/>
+            </a:schemeClr>
+          </a:lnRef>
+          <a:fillRef idx="1">
+            <a:schemeClr val="accent1"/>
+          </a:fillRef>
+          <a:effectRef idx="0">
+            <a:schemeClr val="accent1"/>
+          </a:effectRef>
+          <a:fontRef idx="minor">
+            <a:schemeClr val="lt1"/>
+          </a:fontRef>
+        </p:style>
+        <p:txBody>
+          <a:bodyPr rtlCol="0" anchor="ctr"/>
+          <a:lstStyle/>
+          <a:p>
+            <a:pPr algn="ctr"/>
+            <a:r>
+              <a:rPr lang="pt-BR" sz="4000" b="1" dirty="0">
+                <a:solidFill>
+                  <a:schemeClr val="tx1"/>
+                </a:solidFill>
+              </a:rPr>
+              <a:t>1</a:t>
+            </a:r>
+            <a:endParaRPr lang="pt-BR" sz="3200" b="1" dirty="0">
+              <a:solidFill>
+                <a:schemeClr val="tx1"/>
+              </a:solidFill>
+            </a:endParaRPr>
+          </a:p>
+        </p:txBody>
+      </p:sp>
+      <p:cxnSp>
+        <p:nvCxnSpPr>
+          <p:cNvPr id="10" name="Conector de Seta Reta 9">
+            <a:extLst>
+              <a:ext uri="{FF2B5EF4-FFF2-40B4-BE49-F238E27FC236}">
+                <a16:creationId xmlns:a16="http://schemas.microsoft.com/office/drawing/2014/main" id="{57DED23F-5A8A-4EA0-981D-AE7A43CA9582}"/>
+              </a:ext>
+            </a:extLst>
+          </p:cNvPr>
+          <p:cNvCxnSpPr>
+            <a:cxnSpLocks/>
+            <a:stCxn id="5" idx="6"/>
+            <a:endCxn id="6" idx="2"/>
+          </p:cNvCxnSpPr>
+          <p:nvPr/>
+        </p:nvCxnSpPr>
+        <p:spPr>
+          <a:xfrm flipH="1" flipV="1">
+            <a:off x="4075479" y="3312353"/>
+            <a:ext cx="4102101" cy="3348"/>
+          </a:xfrm>
+          <a:prstGeom prst="straightConnector1">
+            <a:avLst/>
+          </a:prstGeom>
+          <a:ln w="76200">
+            <a:solidFill>
+              <a:schemeClr val="tx1"/>
+            </a:solidFill>
+            <a:headEnd type="triangle" w="med" len="med"/>
+            <a:tailEnd type="none" w="med" len="med"/>
+          </a:ln>
+        </p:spPr>
+        <p:style>
+          <a:lnRef idx="1">
+            <a:schemeClr val="accent1"/>
+          </a:lnRef>
+          <a:fillRef idx="0">
+            <a:schemeClr val="accent1"/>
+          </a:fillRef>
+          <a:effectRef idx="0">
+            <a:schemeClr val="accent1"/>
+          </a:effectRef>
+          <a:fontRef idx="minor">
+            <a:schemeClr val="tx1"/>
+          </a:fontRef>
+        </p:style>
+      </p:cxnSp>
+      <p:cxnSp>
+        <p:nvCxnSpPr>
+          <p:cNvPr id="13" name="Conector de Seta Reta 12">
+            <a:extLst>
+              <a:ext uri="{FF2B5EF4-FFF2-40B4-BE49-F238E27FC236}">
+                <a16:creationId xmlns:a16="http://schemas.microsoft.com/office/drawing/2014/main" id="{ECFAB39C-A5E4-4A9F-9FF1-DC9AEF1E3C38}"/>
+              </a:ext>
+            </a:extLst>
+          </p:cNvPr>
+          <p:cNvCxnSpPr>
+            <a:cxnSpLocks/>
+            <a:stCxn id="6" idx="3"/>
+            <a:endCxn id="7" idx="7"/>
+          </p:cNvCxnSpPr>
+          <p:nvPr/>
+        </p:nvCxnSpPr>
+        <p:spPr>
+          <a:xfrm flipV="1">
+            <a:off x="4002944" y="1017495"/>
+            <a:ext cx="3656815" cy="2115253"/>
+          </a:xfrm>
+          <a:prstGeom prst="straightConnector1">
+            <a:avLst/>
+          </a:prstGeom>
+          <a:ln w="76200">
+            <a:solidFill>
+              <a:schemeClr val="tx1"/>
+            </a:solidFill>
+            <a:headEnd type="triangle" w="med" len="med"/>
+            <a:tailEnd type="none" w="med" len="med"/>
+          </a:ln>
+        </p:spPr>
+        <p:style>
+          <a:lnRef idx="1">
+            <a:schemeClr val="accent1"/>
+          </a:lnRef>
+          <a:fillRef idx="0">
+            <a:schemeClr val="accent1"/>
+          </a:fillRef>
+          <a:effectRef idx="0">
+            <a:schemeClr val="accent1"/>
+          </a:effectRef>
+          <a:fontRef idx="minor">
+            <a:schemeClr val="tx1"/>
+          </a:fontRef>
+        </p:style>
+      </p:cxnSp>
+      <p:cxnSp>
+        <p:nvCxnSpPr>
+          <p:cNvPr id="16" name="Conector de Seta Reta 15">
+            <a:extLst>
+              <a:ext uri="{FF2B5EF4-FFF2-40B4-BE49-F238E27FC236}">
+                <a16:creationId xmlns:a16="http://schemas.microsoft.com/office/drawing/2014/main" id="{91A7FE31-8020-4F4A-AB83-3CA1DBFF9B45}"/>
+              </a:ext>
+            </a:extLst>
+          </p:cNvPr>
+          <p:cNvCxnSpPr>
+            <a:cxnSpLocks/>
+            <a:stCxn id="7" idx="6"/>
+          </p:cNvCxnSpPr>
+          <p:nvPr/>
+        </p:nvCxnSpPr>
+        <p:spPr>
+          <a:xfrm flipH="1" flipV="1">
+            <a:off x="4664736" y="835198"/>
+            <a:ext cx="2922488" cy="2692"/>
+          </a:xfrm>
+          <a:prstGeom prst="straightConnector1">
+            <a:avLst/>
+          </a:prstGeom>
+          <a:ln w="76200">
+            <a:solidFill>
+              <a:schemeClr val="tx1"/>
+            </a:solidFill>
+            <a:headEnd type="triangle" w="med" len="med"/>
+            <a:tailEnd type="none" w="med" len="med"/>
+          </a:ln>
+        </p:spPr>
+        <p:style>
+          <a:lnRef idx="1">
+            <a:schemeClr val="accent1"/>
+          </a:lnRef>
+          <a:fillRef idx="0">
+            <a:schemeClr val="accent1"/>
+          </a:fillRef>
+          <a:effectRef idx="0">
+            <a:schemeClr val="accent1"/>
+          </a:effectRef>
+          <a:fontRef idx="minor">
+            <a:schemeClr val="tx1"/>
+          </a:fontRef>
+        </p:style>
+      </p:cxnSp>
+      <p:sp>
+        <p:nvSpPr>
+          <p:cNvPr id="25" name="Retângulo 24">
+            <a:extLst>
+              <a:ext uri="{FF2B5EF4-FFF2-40B4-BE49-F238E27FC236}">
+                <a16:creationId xmlns:a16="http://schemas.microsoft.com/office/drawing/2014/main" id="{5E99E2C8-27A1-4A10-808A-E050A00417B8}"/>
+              </a:ext>
+            </a:extLst>
+          </p:cNvPr>
+          <p:cNvSpPr/>
+          <p:nvPr/>
+        </p:nvSpPr>
+        <p:spPr>
+          <a:xfrm>
+            <a:off x="4063414" y="4784992"/>
+            <a:ext cx="3884398" cy="923330"/>
+          </a:xfrm>
+          <a:prstGeom prst="rect">
+            <a:avLst/>
+          </a:prstGeom>
+          <a:noFill/>
+        </p:spPr>
+        <p:txBody>
+          <a:bodyPr wrap="square" lIns="91440" tIns="45720" rIns="91440" bIns="45720">
+            <a:spAutoFit/>
+            <a:scene3d>
+              <a:camera prst="orthographicFront">
+                <a:rot lat="10800000" lon="0" rev="0"/>
+              </a:camera>
+              <a:lightRig rig="threePt" dir="t"/>
+            </a:scene3d>
+          </a:bodyPr>
+          <a:lstStyle/>
+          <a:p>
+            <a:pPr algn="ctr"/>
+            <a:r>
+              <a:rPr lang="pt-BR" sz="5400" b="1" cap="none" spc="0" dirty="0">
+                <a:ln w="12700">
+                  <a:solidFill>
+                    <a:schemeClr val="tx2">
+                      <a:lumMod val="75000"/>
+                    </a:schemeClr>
+                  </a:solidFill>
+                  <a:prstDash val="solid"/>
+                </a:ln>
+                <a:pattFill prst="dkUpDiag">
+                  <a:fgClr>
+                    <a:schemeClr val="tx2"/>
+                  </a:fgClr>
+                  <a:bgClr>
+                    <a:schemeClr val="tx2">
+                      <a:lumMod val="20000"/>
+                      <a:lumOff val="80000"/>
+                    </a:schemeClr>
+                  </a:bgClr>
+                </a:pattFill>
+                <a:effectLst>
+                  <a:outerShdw dist="38100" dir="2640000" algn="bl" rotWithShape="0">
+                    <a:schemeClr val="tx2">
+                      <a:lumMod val="75000"/>
+                    </a:schemeClr>
+                  </a:outerShdw>
+                </a:effectLst>
+              </a:rPr>
+              <a:t>CALIBRAÇÃO</a:t>
+            </a:r>
+          </a:p>
+        </p:txBody>
+      </p:sp>
+      <p:sp>
+        <p:nvSpPr>
+          <p:cNvPr id="29" name="Triângulo Retângulo 28">
+            <a:extLst>
+              <a:ext uri="{FF2B5EF4-FFF2-40B4-BE49-F238E27FC236}">
+                <a16:creationId xmlns:a16="http://schemas.microsoft.com/office/drawing/2014/main" id="{CE043363-3EB4-4A8C-BE5E-5F0D4D616DA4}"/>
+              </a:ext>
+            </a:extLst>
+          </p:cNvPr>
+          <p:cNvSpPr/>
+          <p:nvPr/>
+        </p:nvSpPr>
+        <p:spPr>
+          <a:xfrm rot="5400000">
+            <a:off x="2171664" y="206956"/>
+            <a:ext cx="1443556" cy="1443556"/>
+          </a:xfrm>
+          <a:prstGeom prst="rtTriangle">
+            <a:avLst/>
+          </a:prstGeom>
+        </p:spPr>
+        <p:style>
+          <a:lnRef idx="2">
+            <a:schemeClr val="accent1">
+              <a:shade val="50000"/>
+            </a:schemeClr>
+          </a:lnRef>
+          <a:fillRef idx="1">
+            <a:schemeClr val="accent1"/>
+          </a:fillRef>
+          <a:effectRef idx="0">
+            <a:schemeClr val="accent1"/>
+          </a:effectRef>
+          <a:fontRef idx="minor">
+            <a:schemeClr val="lt1"/>
+          </a:fontRef>
+        </p:style>
+        <p:txBody>
+          <a:bodyPr rtlCol="0" anchor="ctr"/>
+          <a:lstStyle/>
+          <a:p>
+            <a:pPr algn="ctr"/>
+            <a:endParaRPr lang="pt-BR" dirty="0"/>
+          </a:p>
+        </p:txBody>
+      </p:sp>
+      <p:sp>
+        <p:nvSpPr>
+          <p:cNvPr id="30" name="Triângulo Retângulo 29">
+            <a:extLst>
+              <a:ext uri="{FF2B5EF4-FFF2-40B4-BE49-F238E27FC236}">
+                <a16:creationId xmlns:a16="http://schemas.microsoft.com/office/drawing/2014/main" id="{035B7DFC-D5FC-47CE-BF3F-0C2A6B21BF57}"/>
+              </a:ext>
+            </a:extLst>
+          </p:cNvPr>
+          <p:cNvSpPr/>
+          <p:nvPr/>
+        </p:nvSpPr>
+        <p:spPr>
+          <a:xfrm rot="10800000">
+            <a:off x="8425228" y="206956"/>
+            <a:ext cx="1443556" cy="1443556"/>
+          </a:xfrm>
+          <a:prstGeom prst="rtTriangle">
+            <a:avLst/>
+          </a:prstGeom>
+        </p:spPr>
+        <p:style>
+          <a:lnRef idx="2">
+            <a:schemeClr val="accent1">
+              <a:shade val="50000"/>
+            </a:schemeClr>
+          </a:lnRef>
+          <a:fillRef idx="1">
+            <a:schemeClr val="accent1"/>
+          </a:fillRef>
+          <a:effectRef idx="0">
+            <a:schemeClr val="accent1"/>
+          </a:effectRef>
+          <a:fontRef idx="minor">
+            <a:schemeClr val="lt1"/>
+          </a:fontRef>
+        </p:style>
+        <p:txBody>
+          <a:bodyPr rtlCol="0" anchor="ctr"/>
+          <a:lstStyle/>
+          <a:p>
+            <a:pPr algn="ctr"/>
+            <a:endParaRPr lang="pt-BR" dirty="0"/>
+          </a:p>
+        </p:txBody>
+      </p:sp>
+      <p:sp>
+        <p:nvSpPr>
+          <p:cNvPr id="31" name="Triângulo Retângulo 30">
+            <a:extLst>
+              <a:ext uri="{FF2B5EF4-FFF2-40B4-BE49-F238E27FC236}">
+                <a16:creationId xmlns:a16="http://schemas.microsoft.com/office/drawing/2014/main" id="{5E547690-1230-474E-8781-DE51713D1CD3}"/>
+              </a:ext>
+            </a:extLst>
+          </p:cNvPr>
+          <p:cNvSpPr/>
+          <p:nvPr/>
+        </p:nvSpPr>
+        <p:spPr>
+          <a:xfrm>
+            <a:off x="2171663" y="4510483"/>
+            <a:ext cx="1443555" cy="1443555"/>
+          </a:xfrm>
+          <a:prstGeom prst="rtTriangle">
+            <a:avLst/>
+          </a:prstGeom>
+        </p:spPr>
+        <p:style>
+          <a:lnRef idx="2">
+            <a:schemeClr val="accent1">
+              <a:shade val="50000"/>
+            </a:schemeClr>
+          </a:lnRef>
+          <a:fillRef idx="1">
+            <a:schemeClr val="accent1"/>
+          </a:fillRef>
+          <a:effectRef idx="0">
+            <a:schemeClr val="accent1"/>
+          </a:effectRef>
+          <a:fontRef idx="minor">
+            <a:schemeClr val="lt1"/>
+          </a:fontRef>
+        </p:style>
+        <p:txBody>
+          <a:bodyPr rtlCol="0" anchor="ctr"/>
+          <a:lstStyle/>
+          <a:p>
+            <a:pPr algn="ctr"/>
+            <a:endParaRPr lang="pt-BR" dirty="0"/>
+          </a:p>
+        </p:txBody>
+      </p:sp>
+      <p:sp>
+        <p:nvSpPr>
+          <p:cNvPr id="32" name="Triângulo Retângulo 31">
+            <a:extLst>
+              <a:ext uri="{FF2B5EF4-FFF2-40B4-BE49-F238E27FC236}">
+                <a16:creationId xmlns:a16="http://schemas.microsoft.com/office/drawing/2014/main" id="{90735404-A3C0-47BE-81AC-57B55AE16691}"/>
+              </a:ext>
+            </a:extLst>
+          </p:cNvPr>
+          <p:cNvSpPr/>
+          <p:nvPr/>
+        </p:nvSpPr>
+        <p:spPr>
+          <a:xfrm rot="16200000">
+            <a:off x="8425229" y="4510483"/>
+            <a:ext cx="1443555" cy="1443555"/>
+          </a:xfrm>
+          <a:prstGeom prst="rtTriangle">
+            <a:avLst/>
+          </a:prstGeom>
+        </p:spPr>
+        <p:style>
+          <a:lnRef idx="2">
+            <a:schemeClr val="accent1">
+              <a:shade val="50000"/>
+            </a:schemeClr>
+          </a:lnRef>
+          <a:fillRef idx="1">
+            <a:schemeClr val="accent1"/>
+          </a:fillRef>
+          <a:effectRef idx="0">
+            <a:schemeClr val="accent1"/>
+          </a:effectRef>
+          <a:fontRef idx="minor">
+            <a:schemeClr val="lt1"/>
+          </a:fontRef>
+        </p:style>
+        <p:txBody>
+          <a:bodyPr rtlCol="0" anchor="ctr"/>
+          <a:lstStyle/>
+          <a:p>
+            <a:pPr algn="ctr"/>
+            <a:endParaRPr lang="pt-BR" dirty="0"/>
+          </a:p>
+        </p:txBody>
+      </p:sp>
+      <p:sp>
+        <p:nvSpPr>
+          <p:cNvPr id="33" name="CaixaDeTexto 32">
+            <a:extLst>
+              <a:ext uri="{FF2B5EF4-FFF2-40B4-BE49-F238E27FC236}">
+                <a16:creationId xmlns:a16="http://schemas.microsoft.com/office/drawing/2014/main" id="{78EF8DF7-C724-4ECF-A596-0AD6224F976D}"/>
+              </a:ext>
+            </a:extLst>
+          </p:cNvPr>
+          <p:cNvSpPr txBox="1"/>
+          <p:nvPr/>
+        </p:nvSpPr>
+        <p:spPr>
+          <a:xfrm>
+            <a:off x="2269472" y="266697"/>
+            <a:ext cx="482405" cy="923330"/>
+          </a:xfrm>
+          <a:prstGeom prst="rect">
+            <a:avLst/>
+          </a:prstGeom>
+          <a:noFill/>
+        </p:spPr>
+        <p:txBody>
+          <a:bodyPr wrap="square" rtlCol="0">
+            <a:spAutoFit/>
+            <a:scene3d>
+              <a:camera prst="orthographicFront">
+                <a:rot lat="10800000" lon="0" rev="0"/>
+              </a:camera>
+              <a:lightRig rig="threePt" dir="t"/>
+            </a:scene3d>
+          </a:bodyPr>
+          <a:lstStyle/>
+          <a:p>
+            <a:pPr algn="ctr"/>
+            <a:r>
+              <a:rPr lang="pt-BR" sz="5400" b="1" dirty="0">
+                <a:solidFill>
+                  <a:schemeClr val="bg1"/>
+                </a:solidFill>
+              </a:rPr>
+              <a:t>1</a:t>
+            </a:r>
+          </a:p>
+        </p:txBody>
+      </p:sp>
+      <p:sp>
+        <p:nvSpPr>
+          <p:cNvPr id="34" name="CaixaDeTexto 33">
+            <a:extLst>
+              <a:ext uri="{FF2B5EF4-FFF2-40B4-BE49-F238E27FC236}">
+                <a16:creationId xmlns:a16="http://schemas.microsoft.com/office/drawing/2014/main" id="{B2B17451-6D07-489B-90FE-2F030F60DCE3}"/>
+              </a:ext>
+            </a:extLst>
+          </p:cNvPr>
+          <p:cNvSpPr txBox="1"/>
+          <p:nvPr/>
+        </p:nvSpPr>
+        <p:spPr>
+          <a:xfrm>
+            <a:off x="9311926" y="273160"/>
+            <a:ext cx="482405" cy="923330"/>
+          </a:xfrm>
+          <a:prstGeom prst="rect">
+            <a:avLst/>
+          </a:prstGeom>
+          <a:noFill/>
+        </p:spPr>
+        <p:txBody>
+          <a:bodyPr wrap="square" rtlCol="0">
+            <a:spAutoFit/>
+            <a:scene3d>
+              <a:camera prst="orthographicFront">
+                <a:rot lat="10800000" lon="0" rev="0"/>
+              </a:camera>
+              <a:lightRig rig="threePt" dir="t"/>
+            </a:scene3d>
+          </a:bodyPr>
+          <a:lstStyle/>
+          <a:p>
+            <a:pPr algn="ctr"/>
+            <a:r>
+              <a:rPr lang="pt-BR" sz="5400" b="1" dirty="0">
+                <a:solidFill>
+                  <a:schemeClr val="bg1"/>
+                </a:solidFill>
+              </a:rPr>
+              <a:t>2</a:t>
+            </a:r>
+          </a:p>
+        </p:txBody>
+      </p:sp>
+      <p:sp>
+        <p:nvSpPr>
+          <p:cNvPr id="35" name="CaixaDeTexto 34">
+            <a:extLst>
+              <a:ext uri="{FF2B5EF4-FFF2-40B4-BE49-F238E27FC236}">
+                <a16:creationId xmlns:a16="http://schemas.microsoft.com/office/drawing/2014/main" id="{281EB7E6-02FE-4BE4-881F-8AB253B5AFDB}"/>
+              </a:ext>
+            </a:extLst>
+          </p:cNvPr>
+          <p:cNvSpPr txBox="1"/>
+          <p:nvPr/>
+        </p:nvSpPr>
+        <p:spPr>
+          <a:xfrm>
+            <a:off x="2320157" y="5030708"/>
+            <a:ext cx="381036" cy="923330"/>
+          </a:xfrm>
+          <a:prstGeom prst="rect">
+            <a:avLst/>
+          </a:prstGeom>
+          <a:noFill/>
+        </p:spPr>
+        <p:txBody>
+          <a:bodyPr wrap="square" rtlCol="0">
+            <a:spAutoFit/>
+            <a:scene3d>
+              <a:camera prst="orthographicFront">
+                <a:rot lat="10800000" lon="0" rev="0"/>
+              </a:camera>
+              <a:lightRig rig="threePt" dir="t"/>
+            </a:scene3d>
+          </a:bodyPr>
+          <a:lstStyle/>
+          <a:p>
+            <a:pPr algn="ctr"/>
+            <a:r>
+              <a:rPr lang="pt-BR" sz="5400" b="1" dirty="0">
+                <a:solidFill>
+                  <a:schemeClr val="bg1"/>
+                </a:solidFill>
+              </a:rPr>
+              <a:t>3</a:t>
+            </a:r>
+          </a:p>
+        </p:txBody>
+      </p:sp>
+      <p:sp>
+        <p:nvSpPr>
+          <p:cNvPr id="36" name="CaixaDeTexto 35">
+            <a:extLst>
+              <a:ext uri="{FF2B5EF4-FFF2-40B4-BE49-F238E27FC236}">
+                <a16:creationId xmlns:a16="http://schemas.microsoft.com/office/drawing/2014/main" id="{59B64E4D-B287-48BA-AE7B-C476102093FE}"/>
+              </a:ext>
+            </a:extLst>
+          </p:cNvPr>
+          <p:cNvSpPr txBox="1"/>
+          <p:nvPr/>
+        </p:nvSpPr>
+        <p:spPr>
+          <a:xfrm>
+            <a:off x="9338475" y="4958814"/>
+            <a:ext cx="381036" cy="923330"/>
+          </a:xfrm>
+          <a:prstGeom prst="rect">
+            <a:avLst/>
+          </a:prstGeom>
+          <a:noFill/>
+        </p:spPr>
+        <p:txBody>
+          <a:bodyPr wrap="square" rtlCol="0">
+            <a:spAutoFit/>
+            <a:scene3d>
+              <a:camera prst="orthographicFront">
+                <a:rot lat="10800000" lon="0" rev="0"/>
+              </a:camera>
+              <a:lightRig rig="threePt" dir="t"/>
+            </a:scene3d>
+          </a:bodyPr>
+          <a:lstStyle/>
+          <a:p>
+            <a:pPr algn="ctr"/>
+            <a:r>
+              <a:rPr lang="pt-BR" sz="5400" b="1" dirty="0">
+                <a:solidFill>
+                  <a:schemeClr val="bg1"/>
+                </a:solidFill>
+              </a:rPr>
+              <a:t>4</a:t>
+            </a:r>
+            <a:endParaRPr lang="pt-BR" sz="3200" b="1" dirty="0">
+              <a:solidFill>
+                <a:schemeClr val="bg1"/>
+              </a:solidFill>
+            </a:endParaRPr>
+          </a:p>
+        </p:txBody>
+      </p:sp>
+    </p:spTree>
+    <p:extLst>
+      <p:ext uri="{BB962C8B-B14F-4D97-AF65-F5344CB8AC3E}">
+        <p14:creationId xmlns:p14="http://schemas.microsoft.com/office/powerpoint/2010/main" val="2303609557"/>
+      </p:ext>
+    </p:extLst>
+  </p:cSld>
+  <p:clrMapOvr>
+    <a:masterClrMapping/>
+  </p:clrMapOvr>
+</p:sld>
+</file>
+
+<file path=ppt/slides/slide5.xml><?xml version="1.0" encoding="utf-8"?>
 <p:sld xmlns:a="http://schemas.openxmlformats.org/drawingml/2006/main" xmlns:r="http://schemas.openxmlformats.org/officeDocument/2006/relationships" xmlns:p="http://schemas.openxmlformats.org/presentationml/2006/main">
   <p:cSld>
     <p:spTree>
@@ -8899,7 +11203,7 @@
 </p:sld>
 </file>
 
-<file path=ppt/slides/slide4.xml><?xml version="1.0" encoding="utf-8"?>
+<file path=ppt/slides/slide6.xml><?xml version="1.0" encoding="utf-8"?>
 <p:sld xmlns:a="http://schemas.openxmlformats.org/drawingml/2006/main" xmlns:r="http://schemas.openxmlformats.org/officeDocument/2006/relationships" xmlns:p="http://schemas.openxmlformats.org/presentationml/2006/main">
   <p:cSld>
     <p:spTree>
@@ -9881,7 +12185,7 @@
 </p:sld>
 </file>
 
-<file path=ppt/slides/slide5.xml><?xml version="1.0" encoding="utf-8"?>
+<file path=ppt/slides/slide7.xml><?xml version="1.0" encoding="utf-8"?>
 <p:sld xmlns:a="http://schemas.openxmlformats.org/drawingml/2006/main" xmlns:r="http://schemas.openxmlformats.org/officeDocument/2006/relationships" xmlns:p="http://schemas.openxmlformats.org/presentationml/2006/main">
   <p:cSld>
     <p:spTree>
@@ -10196,7 +12500,7 @@
 </p:sld>
 </file>
 
-<file path=ppt/slides/slide6.xml><?xml version="1.0" encoding="utf-8"?>
+<file path=ppt/slides/slide8.xml><?xml version="1.0" encoding="utf-8"?>
 <p:sld xmlns:a="http://schemas.openxmlformats.org/drawingml/2006/main" xmlns:r="http://schemas.openxmlformats.org/officeDocument/2006/relationships" xmlns:p="http://schemas.openxmlformats.org/presentationml/2006/main">
   <p:cSld>
     <p:spTree>
@@ -10570,815 +12874,6 @@
 </p:sld>
 </file>
 
-<file path=ppt/slides/slide7.xml><?xml version="1.0" encoding="utf-8"?>
-<p:sld xmlns:a="http://schemas.openxmlformats.org/drawingml/2006/main" xmlns:r="http://schemas.openxmlformats.org/officeDocument/2006/relationships" xmlns:p="http://schemas.openxmlformats.org/presentationml/2006/main">
-  <p:cSld>
-    <p:spTree>
-      <p:nvGrpSpPr>
-        <p:cNvPr id="1" name=""/>
-        <p:cNvGrpSpPr/>
-        <p:nvPr/>
-      </p:nvGrpSpPr>
-      <p:grpSpPr>
-        <a:xfrm>
-          <a:off x="0" y="0"/>
-          <a:ext cx="0" cy="0"/>
-          <a:chOff x="0" y="0"/>
-          <a:chExt cx="0" cy="0"/>
-        </a:xfrm>
-      </p:grpSpPr>
-      <p:sp>
-        <p:nvSpPr>
-          <p:cNvPr id="11" name="CaixaDeTexto 10">
-            <a:extLst>
-              <a:ext uri="{FF2B5EF4-FFF2-40B4-BE49-F238E27FC236}">
-                <a16:creationId xmlns:a16="http://schemas.microsoft.com/office/drawing/2014/main" id="{04882994-2E24-4060-9428-4813448CD91B}"/>
-              </a:ext>
-            </a:extLst>
-          </p:cNvPr>
-          <p:cNvSpPr txBox="1"/>
-          <p:nvPr/>
-        </p:nvSpPr>
-        <p:spPr>
-          <a:xfrm>
-            <a:off x="2025610" y="1149791"/>
-            <a:ext cx="4006225" cy="2585323"/>
-          </a:xfrm>
-          <a:prstGeom prst="rect">
-            <a:avLst/>
-          </a:prstGeom>
-          <a:noFill/>
-        </p:spPr>
-        <p:txBody>
-          <a:bodyPr wrap="none" rtlCol="0">
-            <a:spAutoFit/>
-          </a:bodyPr>
-          <a:lstStyle/>
-          <a:p>
-            <a:pPr algn="ctr"/>
-            <a:r>
-              <a:rPr lang="pt-BR" sz="3600" dirty="0">
-                <a:solidFill>
-                  <a:srgbClr val="FFFF00"/>
-                </a:solidFill>
-                <a:latin typeface="Arial Black" panose="020B0A04020102020204" pitchFamily="34" charset="0"/>
-              </a:rPr>
-              <a:t>P</a:t>
-            </a:r>
-            <a:r>
-              <a:rPr lang="pt-BR" sz="3600" dirty="0">
-                <a:solidFill>
-                  <a:srgbClr val="FF0000"/>
-                </a:solidFill>
-                <a:latin typeface="Arial Black" panose="020B0A04020102020204" pitchFamily="34" charset="0"/>
-              </a:rPr>
-              <a:t>A</a:t>
-            </a:r>
-            <a:r>
-              <a:rPr lang="pt-BR" sz="3600" dirty="0">
-                <a:solidFill>
-                  <a:srgbClr val="0070C0"/>
-                </a:solidFill>
-                <a:latin typeface="Arial Black" panose="020B0A04020102020204" pitchFamily="34" charset="0"/>
-              </a:rPr>
-              <a:t>I</a:t>
-            </a:r>
-            <a:r>
-              <a:rPr lang="pt-BR" sz="3600" dirty="0">
-                <a:solidFill>
-                  <a:srgbClr val="92D050"/>
-                </a:solidFill>
-                <a:latin typeface="Arial Black" panose="020B0A04020102020204" pitchFamily="34" charset="0"/>
-              </a:rPr>
-              <a:t>N</a:t>
-            </a:r>
-            <a:r>
-              <a:rPr lang="pt-BR" sz="3600" dirty="0">
-                <a:solidFill>
-                  <a:srgbClr val="FFFF00"/>
-                </a:solidFill>
-                <a:latin typeface="Arial Black" panose="020B0A04020102020204" pitchFamily="34" charset="0"/>
-              </a:rPr>
-              <a:t>E</a:t>
-            </a:r>
-            <a:r>
-              <a:rPr lang="pt-BR" sz="3600" dirty="0">
-                <a:solidFill>
-                  <a:srgbClr val="FF0000"/>
-                </a:solidFill>
-                <a:latin typeface="Arial Black" panose="020B0A04020102020204" pitchFamily="34" charset="0"/>
-              </a:rPr>
-              <a:t>L</a:t>
-            </a:r>
-            <a:r>
-              <a:rPr lang="pt-BR" sz="3600" dirty="0">
-                <a:solidFill>
-                  <a:srgbClr val="0070C0"/>
-                </a:solidFill>
-                <a:latin typeface="Arial Black" panose="020B0A04020102020204" pitchFamily="34" charset="0"/>
-              </a:rPr>
-              <a:t> </a:t>
-            </a:r>
-            <a:r>
-              <a:rPr lang="pt-BR" sz="3600" dirty="0">
-                <a:solidFill>
-                  <a:srgbClr val="92D050"/>
-                </a:solidFill>
-                <a:latin typeface="Arial Black" panose="020B0A04020102020204" pitchFamily="34" charset="0"/>
-              </a:rPr>
-              <a:t>D</a:t>
-            </a:r>
-            <a:r>
-              <a:rPr lang="pt-BR" sz="3600" dirty="0">
-                <a:solidFill>
-                  <a:srgbClr val="FFFF00"/>
-                </a:solidFill>
-                <a:latin typeface="Arial Black" panose="020B0A04020102020204" pitchFamily="34" charset="0"/>
-              </a:rPr>
-              <a:t>E </a:t>
-            </a:r>
-          </a:p>
-          <a:p>
-            <a:pPr algn="ctr"/>
-            <a:r>
-              <a:rPr lang="pt-BR" sz="3600" dirty="0">
-                <a:solidFill>
-                  <a:srgbClr val="FFFF00"/>
-                </a:solidFill>
-                <a:latin typeface="Arial Black" panose="020B0A04020102020204" pitchFamily="34" charset="0"/>
-              </a:rPr>
-              <a:t>I</a:t>
-            </a:r>
-            <a:r>
-              <a:rPr lang="pt-BR" sz="3600" dirty="0">
-                <a:solidFill>
-                  <a:srgbClr val="FF0000"/>
-                </a:solidFill>
-                <a:latin typeface="Arial Black" panose="020B0A04020102020204" pitchFamily="34" charset="0"/>
-              </a:rPr>
-              <a:t>N</a:t>
-            </a:r>
-            <a:r>
-              <a:rPr lang="pt-BR" sz="3600" dirty="0">
-                <a:solidFill>
-                  <a:srgbClr val="0070C0"/>
-                </a:solidFill>
-                <a:latin typeface="Arial Black" panose="020B0A04020102020204" pitchFamily="34" charset="0"/>
-              </a:rPr>
-              <a:t>F</a:t>
-            </a:r>
-            <a:r>
-              <a:rPr lang="pt-BR" sz="3600" dirty="0">
-                <a:solidFill>
-                  <a:srgbClr val="92D050"/>
-                </a:solidFill>
-                <a:latin typeface="Arial Black" panose="020B0A04020102020204" pitchFamily="34" charset="0"/>
-              </a:rPr>
-              <a:t>O</a:t>
-            </a:r>
-            <a:r>
-              <a:rPr lang="pt-BR" sz="3600" dirty="0">
-                <a:solidFill>
-                  <a:srgbClr val="FFFF00"/>
-                </a:solidFill>
-                <a:latin typeface="Arial Black" panose="020B0A04020102020204" pitchFamily="34" charset="0"/>
-              </a:rPr>
-              <a:t>R</a:t>
-            </a:r>
-            <a:r>
-              <a:rPr lang="pt-BR" sz="3600" dirty="0">
-                <a:solidFill>
-                  <a:srgbClr val="FF0000"/>
-                </a:solidFill>
-                <a:latin typeface="Arial Black" panose="020B0A04020102020204" pitchFamily="34" charset="0"/>
-              </a:rPr>
-              <a:t>M</a:t>
-            </a:r>
-            <a:r>
-              <a:rPr lang="pt-BR" sz="3600" dirty="0">
-                <a:solidFill>
-                  <a:srgbClr val="0070C0"/>
-                </a:solidFill>
-                <a:latin typeface="Arial Black" panose="020B0A04020102020204" pitchFamily="34" charset="0"/>
-              </a:rPr>
-              <a:t>A</a:t>
-            </a:r>
-            <a:r>
-              <a:rPr lang="pt-BR" sz="3600" dirty="0">
-                <a:solidFill>
-                  <a:srgbClr val="92D050"/>
-                </a:solidFill>
-                <a:latin typeface="Arial Black" panose="020B0A04020102020204" pitchFamily="34" charset="0"/>
-              </a:rPr>
-              <a:t>Ç</a:t>
-            </a:r>
-            <a:r>
-              <a:rPr lang="pt-BR" sz="3600" dirty="0">
-                <a:solidFill>
-                  <a:srgbClr val="FFFF00"/>
-                </a:solidFill>
-                <a:latin typeface="Arial Black" panose="020B0A04020102020204" pitchFamily="34" charset="0"/>
-              </a:rPr>
-              <a:t>Õ</a:t>
-            </a:r>
-            <a:r>
-              <a:rPr lang="pt-BR" sz="3600" dirty="0">
-                <a:solidFill>
-                  <a:srgbClr val="FF0000"/>
-                </a:solidFill>
-                <a:latin typeface="Arial Black" panose="020B0A04020102020204" pitchFamily="34" charset="0"/>
-              </a:rPr>
-              <a:t>E</a:t>
-            </a:r>
-            <a:r>
-              <a:rPr lang="pt-BR" sz="3600" dirty="0">
-                <a:solidFill>
-                  <a:srgbClr val="0070C0"/>
-                </a:solidFill>
-                <a:latin typeface="Arial Black" panose="020B0A04020102020204" pitchFamily="34" charset="0"/>
-              </a:rPr>
-              <a:t>S</a:t>
-            </a:r>
-          </a:p>
-          <a:p>
-            <a:pPr algn="ctr"/>
-            <a:endParaRPr lang="pt-BR" sz="3600" dirty="0">
-              <a:solidFill>
-                <a:srgbClr val="92D050"/>
-              </a:solidFill>
-              <a:latin typeface="Arial Black" panose="020B0A04020102020204" pitchFamily="34" charset="0"/>
-            </a:endParaRPr>
-          </a:p>
-          <a:p>
-            <a:pPr algn="ctr"/>
-            <a:r>
-              <a:rPr lang="pt-BR" sz="4800" dirty="0">
-                <a:solidFill>
-                  <a:schemeClr val="bg2"/>
-                </a:solidFill>
-                <a:latin typeface="Arial Black" panose="020B0A04020102020204" pitchFamily="34" charset="0"/>
-              </a:rPr>
-              <a:t>LIGADO</a:t>
-            </a:r>
-          </a:p>
-        </p:txBody>
-      </p:sp>
-      <p:sp>
-        <p:nvSpPr>
-          <p:cNvPr id="9" name="CaixaDeTexto 8">
-            <a:extLst>
-              <a:ext uri="{FF2B5EF4-FFF2-40B4-BE49-F238E27FC236}">
-                <a16:creationId xmlns:a16="http://schemas.microsoft.com/office/drawing/2014/main" id="{2C2B32A4-9106-4C8B-9D3A-8CFE100E9320}"/>
-              </a:ext>
-            </a:extLst>
-          </p:cNvPr>
-          <p:cNvSpPr txBox="1"/>
-          <p:nvPr/>
-        </p:nvSpPr>
-        <p:spPr>
-          <a:xfrm>
-            <a:off x="6545942" y="1238691"/>
-            <a:ext cx="4185761" cy="2492990"/>
-          </a:xfrm>
-          <a:prstGeom prst="rect">
-            <a:avLst/>
-          </a:prstGeom>
-          <a:noFill/>
-        </p:spPr>
-        <p:txBody>
-          <a:bodyPr wrap="none" rtlCol="0">
-            <a:spAutoFit/>
-          </a:bodyPr>
-          <a:lstStyle/>
-          <a:p>
-            <a:pPr algn="ctr"/>
-            <a:r>
-              <a:rPr lang="pt-BR" sz="3600" u="sng" dirty="0">
-                <a:solidFill>
-                  <a:srgbClr val="FFFF00"/>
-                </a:solidFill>
-                <a:latin typeface="Arial Black" panose="020B0A04020102020204" pitchFamily="34" charset="0"/>
-              </a:rPr>
-              <a:t>P</a:t>
-            </a:r>
-            <a:r>
-              <a:rPr lang="pt-BR" sz="3600" u="sng" dirty="0">
-                <a:solidFill>
-                  <a:srgbClr val="FF0000"/>
-                </a:solidFill>
-                <a:latin typeface="Arial Black" panose="020B0A04020102020204" pitchFamily="34" charset="0"/>
-              </a:rPr>
-              <a:t>A</a:t>
-            </a:r>
-            <a:r>
-              <a:rPr lang="pt-BR" sz="3600" u="sng" dirty="0">
-                <a:solidFill>
-                  <a:srgbClr val="0070C0"/>
-                </a:solidFill>
-                <a:latin typeface="Arial Black" panose="020B0A04020102020204" pitchFamily="34" charset="0"/>
-              </a:rPr>
-              <a:t>I</a:t>
-            </a:r>
-            <a:r>
-              <a:rPr lang="pt-BR" sz="3600" u="sng" dirty="0">
-                <a:solidFill>
-                  <a:srgbClr val="92D050"/>
-                </a:solidFill>
-                <a:latin typeface="Arial Black" panose="020B0A04020102020204" pitchFamily="34" charset="0"/>
-              </a:rPr>
-              <a:t>N</a:t>
-            </a:r>
-            <a:r>
-              <a:rPr lang="pt-BR" sz="3600" u="sng" dirty="0">
-                <a:solidFill>
-                  <a:srgbClr val="FFFF00"/>
-                </a:solidFill>
-                <a:latin typeface="Arial Black" panose="020B0A04020102020204" pitchFamily="34" charset="0"/>
-              </a:rPr>
-              <a:t>E</a:t>
-            </a:r>
-            <a:r>
-              <a:rPr lang="pt-BR" sz="3600" u="sng" dirty="0">
-                <a:solidFill>
-                  <a:srgbClr val="FF0000"/>
-                </a:solidFill>
-                <a:latin typeface="Arial Black" panose="020B0A04020102020204" pitchFamily="34" charset="0"/>
-              </a:rPr>
-              <a:t>L</a:t>
-            </a:r>
-            <a:r>
-              <a:rPr lang="pt-BR" sz="3600" u="sng" dirty="0">
-                <a:solidFill>
-                  <a:srgbClr val="0070C0"/>
-                </a:solidFill>
-                <a:latin typeface="Arial Black" panose="020B0A04020102020204" pitchFamily="34" charset="0"/>
-              </a:rPr>
-              <a:t> </a:t>
-            </a:r>
-            <a:r>
-              <a:rPr lang="pt-BR" sz="3600" u="sng" dirty="0">
-                <a:solidFill>
-                  <a:srgbClr val="92D050"/>
-                </a:solidFill>
-                <a:latin typeface="Arial Black" panose="020B0A04020102020204" pitchFamily="34" charset="0"/>
-              </a:rPr>
-              <a:t>D</a:t>
-            </a:r>
-            <a:r>
-              <a:rPr lang="pt-BR" sz="3600" u="sng" dirty="0">
-                <a:solidFill>
-                  <a:srgbClr val="FFFF00"/>
-                </a:solidFill>
-                <a:latin typeface="Arial Black" panose="020B0A04020102020204" pitchFamily="34" charset="0"/>
-              </a:rPr>
-              <a:t>E </a:t>
-            </a:r>
-          </a:p>
-          <a:p>
-            <a:pPr algn="ctr"/>
-            <a:r>
-              <a:rPr lang="pt-BR" sz="3600" u="sng" dirty="0">
-                <a:solidFill>
-                  <a:srgbClr val="FFFF00"/>
-                </a:solidFill>
-                <a:latin typeface="Arial Black" panose="020B0A04020102020204" pitchFamily="34" charset="0"/>
-              </a:rPr>
-              <a:t>I</a:t>
-            </a:r>
-            <a:r>
-              <a:rPr lang="pt-BR" sz="3600" u="sng" dirty="0">
-                <a:solidFill>
-                  <a:srgbClr val="FF0000"/>
-                </a:solidFill>
-                <a:latin typeface="Arial Black" panose="020B0A04020102020204" pitchFamily="34" charset="0"/>
-              </a:rPr>
-              <a:t>N</a:t>
-            </a:r>
-            <a:r>
-              <a:rPr lang="pt-BR" sz="3600" u="sng" dirty="0">
-                <a:solidFill>
-                  <a:srgbClr val="0070C0"/>
-                </a:solidFill>
-                <a:latin typeface="Arial Black" panose="020B0A04020102020204" pitchFamily="34" charset="0"/>
-              </a:rPr>
-              <a:t>F</a:t>
-            </a:r>
-            <a:r>
-              <a:rPr lang="pt-BR" sz="3600" u="sng" dirty="0">
-                <a:solidFill>
-                  <a:srgbClr val="92D050"/>
-                </a:solidFill>
-                <a:latin typeface="Arial Black" panose="020B0A04020102020204" pitchFamily="34" charset="0"/>
-              </a:rPr>
-              <a:t>O</a:t>
-            </a:r>
-            <a:r>
-              <a:rPr lang="pt-BR" sz="3600" u="sng" dirty="0">
-                <a:solidFill>
-                  <a:srgbClr val="FFFF00"/>
-                </a:solidFill>
-                <a:latin typeface="Arial Black" panose="020B0A04020102020204" pitchFamily="34" charset="0"/>
-              </a:rPr>
-              <a:t>R</a:t>
-            </a:r>
-            <a:r>
-              <a:rPr lang="pt-BR" sz="3600" u="sng" dirty="0">
-                <a:solidFill>
-                  <a:srgbClr val="FF0000"/>
-                </a:solidFill>
-                <a:latin typeface="Arial Black" panose="020B0A04020102020204" pitchFamily="34" charset="0"/>
-              </a:rPr>
-              <a:t>M</a:t>
-            </a:r>
-            <a:r>
-              <a:rPr lang="pt-BR" sz="3600" u="sng" dirty="0">
-                <a:solidFill>
-                  <a:srgbClr val="0070C0"/>
-                </a:solidFill>
-                <a:latin typeface="Arial Black" panose="020B0A04020102020204" pitchFamily="34" charset="0"/>
-              </a:rPr>
-              <a:t>A</a:t>
-            </a:r>
-            <a:r>
-              <a:rPr lang="pt-BR" sz="3600" u="sng" dirty="0">
-                <a:solidFill>
-                  <a:srgbClr val="92D050"/>
-                </a:solidFill>
-                <a:latin typeface="Arial Black" panose="020B0A04020102020204" pitchFamily="34" charset="0"/>
-              </a:rPr>
-              <a:t>Ç</a:t>
-            </a:r>
-            <a:r>
-              <a:rPr lang="pt-BR" sz="3600" u="sng" dirty="0">
-                <a:solidFill>
-                  <a:srgbClr val="FFFF00"/>
-                </a:solidFill>
-                <a:latin typeface="Arial Black" panose="020B0A04020102020204" pitchFamily="34" charset="0"/>
-              </a:rPr>
-              <a:t>Õ</a:t>
-            </a:r>
-            <a:r>
-              <a:rPr lang="pt-BR" sz="3600" u="sng" dirty="0">
-                <a:solidFill>
-                  <a:srgbClr val="FF0000"/>
-                </a:solidFill>
-                <a:latin typeface="Arial Black" panose="020B0A04020102020204" pitchFamily="34" charset="0"/>
-              </a:rPr>
-              <a:t>E</a:t>
-            </a:r>
-            <a:r>
-              <a:rPr lang="pt-BR" sz="3600" u="sng" dirty="0">
-                <a:solidFill>
-                  <a:srgbClr val="0070C0"/>
-                </a:solidFill>
-                <a:latin typeface="Arial Black" panose="020B0A04020102020204" pitchFamily="34" charset="0"/>
-              </a:rPr>
-              <a:t>S</a:t>
-            </a:r>
-          </a:p>
-          <a:p>
-            <a:pPr algn="ctr"/>
-            <a:endParaRPr lang="pt-BR" sz="3600" u="sng" dirty="0">
-              <a:solidFill>
-                <a:srgbClr val="92D050"/>
-              </a:solidFill>
-              <a:latin typeface="Arial Black" panose="020B0A04020102020204" pitchFamily="34" charset="0"/>
-            </a:endParaRPr>
-          </a:p>
-          <a:p>
-            <a:pPr algn="ctr"/>
-            <a:r>
-              <a:rPr lang="pt-BR" sz="4800" u="sng" dirty="0">
-                <a:solidFill>
-                  <a:schemeClr val="bg2"/>
-                </a:solidFill>
-                <a:latin typeface="Arial Black" panose="020B0A04020102020204" pitchFamily="34" charset="0"/>
-              </a:rPr>
-              <a:t>DESLIGADO</a:t>
-            </a:r>
-          </a:p>
-        </p:txBody>
-      </p:sp>
-    </p:spTree>
-    <p:extLst>
-      <p:ext uri="{BB962C8B-B14F-4D97-AF65-F5344CB8AC3E}">
-        <p14:creationId xmlns:p14="http://schemas.microsoft.com/office/powerpoint/2010/main" val="1785793872"/>
-      </p:ext>
-    </p:extLst>
-  </p:cSld>
-  <p:clrMapOvr>
-    <a:masterClrMapping/>
-  </p:clrMapOvr>
-</p:sld>
-</file>
-
-<file path=ppt/slides/slide8.xml><?xml version="1.0" encoding="utf-8"?>
-<p:sld xmlns:a="http://schemas.openxmlformats.org/drawingml/2006/main" xmlns:r="http://schemas.openxmlformats.org/officeDocument/2006/relationships" xmlns:p="http://schemas.openxmlformats.org/presentationml/2006/main">
-  <p:cSld>
-    <p:spTree>
-      <p:nvGrpSpPr>
-        <p:cNvPr id="1" name=""/>
-        <p:cNvGrpSpPr/>
-        <p:nvPr/>
-      </p:nvGrpSpPr>
-      <p:grpSpPr>
-        <a:xfrm>
-          <a:off x="0" y="0"/>
-          <a:ext cx="0" cy="0"/>
-          <a:chOff x="0" y="0"/>
-          <a:chExt cx="0" cy="0"/>
-        </a:xfrm>
-      </p:grpSpPr>
-      <p:grpSp>
-        <p:nvGrpSpPr>
-          <p:cNvPr id="3" name="Agrupar 2">
-            <a:extLst>
-              <a:ext uri="{FF2B5EF4-FFF2-40B4-BE49-F238E27FC236}">
-                <a16:creationId xmlns:a16="http://schemas.microsoft.com/office/drawing/2014/main" id="{25CCB410-C71B-4E76-939A-F7512C9A2FF5}"/>
-              </a:ext>
-            </a:extLst>
-          </p:cNvPr>
-          <p:cNvGrpSpPr/>
-          <p:nvPr/>
-        </p:nvGrpSpPr>
-        <p:grpSpPr>
-          <a:xfrm>
-            <a:off x="1541672" y="1371339"/>
-            <a:ext cx="4217821" cy="830997"/>
-            <a:chOff x="1541672" y="1371339"/>
-            <a:chExt cx="4217821" cy="830997"/>
-          </a:xfrm>
-        </p:grpSpPr>
-        <p:sp>
-          <p:nvSpPr>
-            <p:cNvPr id="11" name="CaixaDeTexto 10">
-              <a:extLst>
-                <a:ext uri="{FF2B5EF4-FFF2-40B4-BE49-F238E27FC236}">
-                  <a16:creationId xmlns:a16="http://schemas.microsoft.com/office/drawing/2014/main" id="{04882994-2E24-4060-9428-4813448CD91B}"/>
-                </a:ext>
-              </a:extLst>
-            </p:cNvPr>
-            <p:cNvSpPr txBox="1"/>
-            <p:nvPr/>
-          </p:nvSpPr>
-          <p:spPr>
-            <a:xfrm>
-              <a:off x="1541672" y="1371339"/>
-              <a:ext cx="4217821" cy="830997"/>
-            </a:xfrm>
-            <a:prstGeom prst="rect">
-              <a:avLst/>
-            </a:prstGeom>
-            <a:noFill/>
-          </p:spPr>
-          <p:txBody>
-            <a:bodyPr wrap="none" rtlCol="0">
-              <a:spAutoFit/>
-            </a:bodyPr>
-            <a:lstStyle/>
-            <a:p>
-              <a:r>
-                <a:rPr lang="pt-BR" sz="4800" dirty="0">
-                  <a:solidFill>
-                    <a:srgbClr val="FFFF00"/>
-                  </a:solidFill>
-                  <a:latin typeface="Arial Black" panose="020B0A04020102020204" pitchFamily="34" charset="0"/>
-                </a:rPr>
-                <a:t>F  </a:t>
-              </a:r>
-              <a:r>
-                <a:rPr lang="pt-BR" sz="4800" dirty="0">
-                  <a:solidFill>
-                    <a:srgbClr val="0070C0"/>
-                  </a:solidFill>
-                  <a:latin typeface="Arial Black" panose="020B0A04020102020204" pitchFamily="34" charset="0"/>
-                </a:rPr>
-                <a:t>S</a:t>
-              </a:r>
-              <a:r>
-                <a:rPr lang="pt-BR" sz="4800" dirty="0">
-                  <a:solidFill>
-                    <a:srgbClr val="FF0000"/>
-                  </a:solidFill>
-                  <a:latin typeface="Arial Black" panose="020B0A04020102020204" pitchFamily="34" charset="0"/>
-                </a:rPr>
-                <a:t>E</a:t>
-              </a:r>
-              <a:r>
-                <a:rPr lang="pt-BR" sz="4800" dirty="0">
-                  <a:solidFill>
-                    <a:srgbClr val="FFFF00"/>
-                  </a:solidFill>
-                  <a:latin typeface="Arial Black" panose="020B0A04020102020204" pitchFamily="34" charset="0"/>
-                </a:rPr>
-                <a:t>   </a:t>
-              </a:r>
-              <a:r>
-                <a:rPr lang="pt-BR" sz="4800" dirty="0">
-                  <a:solidFill>
-                    <a:srgbClr val="0070C0"/>
-                  </a:solidFill>
-                  <a:latin typeface="Arial Black" panose="020B0A04020102020204" pitchFamily="34" charset="0"/>
-                </a:rPr>
-                <a:t>C</a:t>
-              </a:r>
-              <a:r>
-                <a:rPr lang="pt-BR" sz="4800" dirty="0">
-                  <a:solidFill>
-                    <a:srgbClr val="FF0000"/>
-                  </a:solidFill>
-                  <a:latin typeface="Arial Black" panose="020B0A04020102020204" pitchFamily="34" charset="0"/>
-                </a:rPr>
-                <a:t>I</a:t>
-              </a:r>
-              <a:r>
-                <a:rPr lang="pt-BR" sz="4800" dirty="0">
-                  <a:solidFill>
-                    <a:srgbClr val="FFFF00"/>
-                  </a:solidFill>
-                  <a:latin typeface="Arial Black" panose="020B0A04020102020204" pitchFamily="34" charset="0"/>
-                </a:rPr>
-                <a:t>M  </a:t>
-              </a:r>
-              <a:endParaRPr lang="pt-BR" sz="4800" dirty="0">
-                <a:solidFill>
-                  <a:srgbClr val="92D050"/>
-                </a:solidFill>
-                <a:latin typeface="Arial Black" panose="020B0A04020102020204" pitchFamily="34" charset="0"/>
-              </a:endParaRPr>
-            </a:p>
-          </p:txBody>
-        </p:sp>
-        <p:sp>
-          <p:nvSpPr>
-            <p:cNvPr id="10" name="Triângulo isósceles 9">
-              <a:extLst>
-                <a:ext uri="{FF2B5EF4-FFF2-40B4-BE49-F238E27FC236}">
-                  <a16:creationId xmlns:a16="http://schemas.microsoft.com/office/drawing/2014/main" id="{CDF2D08B-6C6A-487A-ADCB-8A0B85249939}"/>
-                </a:ext>
-              </a:extLst>
-            </p:cNvPr>
-            <p:cNvSpPr/>
-            <p:nvPr/>
-          </p:nvSpPr>
-          <p:spPr>
-            <a:xfrm>
-              <a:off x="1981377" y="1538514"/>
-              <a:ext cx="471538" cy="480104"/>
-            </a:xfrm>
-            <a:prstGeom prst="triangle">
-              <a:avLst/>
-            </a:prstGeom>
-            <a:solidFill>
-              <a:srgbClr val="92D050"/>
-            </a:solidFill>
-            <a:ln>
-              <a:noFill/>
-            </a:ln>
-          </p:spPr>
-          <p:style>
-            <a:lnRef idx="2">
-              <a:schemeClr val="accent1">
-                <a:shade val="50000"/>
-              </a:schemeClr>
-            </a:lnRef>
-            <a:fillRef idx="1">
-              <a:schemeClr val="accent1"/>
-            </a:fillRef>
-            <a:effectRef idx="0">
-              <a:schemeClr val="accent1"/>
-            </a:effectRef>
-            <a:fontRef idx="minor">
-              <a:schemeClr val="lt1"/>
-            </a:fontRef>
-          </p:style>
-          <p:txBody>
-            <a:bodyPr rtlCol="0" anchor="ctr"/>
-            <a:lstStyle/>
-            <a:p>
-              <a:pPr algn="ctr"/>
-              <a:endParaRPr lang="pt-BR"/>
-            </a:p>
-          </p:txBody>
-        </p:sp>
-        <p:sp>
-          <p:nvSpPr>
-            <p:cNvPr id="9" name="Triângulo isósceles 8">
-              <a:extLst>
-                <a:ext uri="{FF2B5EF4-FFF2-40B4-BE49-F238E27FC236}">
-                  <a16:creationId xmlns:a16="http://schemas.microsoft.com/office/drawing/2014/main" id="{4CD46DAE-5BC0-471B-B76E-F3ADFB447A2D}"/>
-                </a:ext>
-              </a:extLst>
-            </p:cNvPr>
-            <p:cNvSpPr/>
-            <p:nvPr/>
-          </p:nvSpPr>
-          <p:spPr>
-            <a:xfrm>
-              <a:off x="3509294" y="1546785"/>
-              <a:ext cx="471538" cy="480104"/>
-            </a:xfrm>
-            <a:prstGeom prst="triangle">
-              <a:avLst/>
-            </a:prstGeom>
-            <a:solidFill>
-              <a:srgbClr val="92D050"/>
-            </a:solidFill>
-            <a:ln>
-              <a:noFill/>
-            </a:ln>
-          </p:spPr>
-          <p:style>
-            <a:lnRef idx="2">
-              <a:schemeClr val="accent1">
-                <a:shade val="50000"/>
-              </a:schemeClr>
-            </a:lnRef>
-            <a:fillRef idx="1">
-              <a:schemeClr val="accent1"/>
-            </a:fillRef>
-            <a:effectRef idx="0">
-              <a:schemeClr val="accent1"/>
-            </a:effectRef>
-            <a:fontRef idx="minor">
-              <a:schemeClr val="lt1"/>
-            </a:fontRef>
-          </p:style>
-          <p:txBody>
-            <a:bodyPr rtlCol="0" anchor="ctr"/>
-            <a:lstStyle/>
-            <a:p>
-              <a:pPr algn="ctr"/>
-              <a:endParaRPr lang="pt-BR"/>
-            </a:p>
-          </p:txBody>
-        </p:sp>
-        <p:sp>
-          <p:nvSpPr>
-            <p:cNvPr id="12" name="Triângulo isósceles 11">
-              <a:extLst>
-                <a:ext uri="{FF2B5EF4-FFF2-40B4-BE49-F238E27FC236}">
-                  <a16:creationId xmlns:a16="http://schemas.microsoft.com/office/drawing/2014/main" id="{EDCF34A2-6D9E-4C33-BE40-C2505CFC7F95}"/>
-                </a:ext>
-              </a:extLst>
-            </p:cNvPr>
-            <p:cNvSpPr/>
-            <p:nvPr/>
-          </p:nvSpPr>
-          <p:spPr>
-            <a:xfrm>
-              <a:off x="5244413" y="1539646"/>
-              <a:ext cx="471538" cy="480104"/>
-            </a:xfrm>
-            <a:prstGeom prst="triangle">
-              <a:avLst/>
-            </a:prstGeom>
-            <a:solidFill>
-              <a:srgbClr val="92D050"/>
-            </a:solidFill>
-            <a:ln>
-              <a:noFill/>
-            </a:ln>
-          </p:spPr>
-          <p:style>
-            <a:lnRef idx="2">
-              <a:schemeClr val="accent1">
-                <a:shade val="50000"/>
-              </a:schemeClr>
-            </a:lnRef>
-            <a:fillRef idx="1">
-              <a:schemeClr val="accent1"/>
-            </a:fillRef>
-            <a:effectRef idx="0">
-              <a:schemeClr val="accent1"/>
-            </a:effectRef>
-            <a:fontRef idx="minor">
-              <a:schemeClr val="lt1"/>
-            </a:fontRef>
-          </p:style>
-          <p:txBody>
-            <a:bodyPr rtlCol="0" anchor="ctr"/>
-            <a:lstStyle/>
-            <a:p>
-              <a:pPr algn="ctr"/>
-              <a:endParaRPr lang="pt-BR"/>
-            </a:p>
-          </p:txBody>
-        </p:sp>
-      </p:grpSp>
-    </p:spTree>
-    <p:extLst>
-      <p:ext uri="{BB962C8B-B14F-4D97-AF65-F5344CB8AC3E}">
-        <p14:creationId xmlns:p14="http://schemas.microsoft.com/office/powerpoint/2010/main" val="2751441782"/>
-      </p:ext>
-    </p:extLst>
-  </p:cSld>
-  <p:clrMapOvr>
-    <a:masterClrMapping/>
-  </p:clrMapOvr>
-</p:sld>
-</file>
-
 <file path=ppt/slides/slide9.xml><?xml version="1.0" encoding="utf-8"?>
 <p:sld xmlns:a="http://schemas.openxmlformats.org/drawingml/2006/main" xmlns:r="http://schemas.openxmlformats.org/officeDocument/2006/relationships" xmlns:p="http://schemas.openxmlformats.org/presentationml/2006/main">
   <p:cSld>
@@ -11396,232 +12891,12 @@
           <a:chExt cx="0" cy="0"/>
         </a:xfrm>
       </p:grpSpPr>
-      <p:grpSp>
-        <p:nvGrpSpPr>
-          <p:cNvPr id="6" name="Agrupar 5">
-            <a:extLst>
-              <a:ext uri="{FF2B5EF4-FFF2-40B4-BE49-F238E27FC236}">
-                <a16:creationId xmlns:a16="http://schemas.microsoft.com/office/drawing/2014/main" id="{7AD26A1F-050B-4F7E-9E49-B5563793008E}"/>
-              </a:ext>
-            </a:extLst>
-          </p:cNvPr>
-          <p:cNvGrpSpPr/>
-          <p:nvPr/>
-        </p:nvGrpSpPr>
-        <p:grpSpPr>
-          <a:xfrm>
-            <a:off x="1444348" y="1545510"/>
-            <a:ext cx="3737127" cy="830997"/>
-            <a:chOff x="1444348" y="1545510"/>
-            <a:chExt cx="3737127" cy="830997"/>
-          </a:xfrm>
-        </p:grpSpPr>
-        <p:sp>
-          <p:nvSpPr>
-            <p:cNvPr id="11" name="CaixaDeTexto 10">
-              <a:extLst>
-                <a:ext uri="{FF2B5EF4-FFF2-40B4-BE49-F238E27FC236}">
-                  <a16:creationId xmlns:a16="http://schemas.microsoft.com/office/drawing/2014/main" id="{04882994-2E24-4060-9428-4813448CD91B}"/>
-                </a:ext>
-              </a:extLst>
-            </p:cNvPr>
-            <p:cNvSpPr txBox="1"/>
-            <p:nvPr/>
-          </p:nvSpPr>
-          <p:spPr>
-            <a:xfrm>
-              <a:off x="1713859" y="1545510"/>
-              <a:ext cx="3467616" cy="830997"/>
-            </a:xfrm>
-            <a:prstGeom prst="rect">
-              <a:avLst/>
-            </a:prstGeom>
-            <a:noFill/>
-          </p:spPr>
-          <p:txBody>
-            <a:bodyPr wrap="none" rtlCol="0">
-              <a:spAutoFit/>
-            </a:bodyPr>
-            <a:lstStyle/>
-            <a:p>
-              <a:pPr algn="ctr"/>
-              <a:r>
-                <a:rPr lang="pt-BR" sz="4800" dirty="0">
-                  <a:solidFill>
-                    <a:srgbClr val="FFFF00"/>
-                  </a:solidFill>
-                  <a:latin typeface="Arial Black" panose="020B0A04020102020204" pitchFamily="34" charset="0"/>
-                </a:rPr>
-                <a:t>T</a:t>
-              </a:r>
-              <a:r>
-                <a:rPr lang="pt-BR" sz="4800" dirty="0">
-                  <a:solidFill>
-                    <a:srgbClr val="0070C0"/>
-                  </a:solidFill>
-                  <a:latin typeface="Arial Black" panose="020B0A04020102020204" pitchFamily="34" charset="0"/>
-                </a:rPr>
-                <a:t>E</a:t>
-              </a:r>
-              <a:r>
-                <a:rPr lang="pt-BR" sz="4800" dirty="0">
-                  <a:solidFill>
-                    <a:srgbClr val="FF0000"/>
-                  </a:solidFill>
-                  <a:latin typeface="Arial Black" panose="020B0A04020102020204" pitchFamily="34" charset="0"/>
-                </a:rPr>
-                <a:t>N</a:t>
-              </a:r>
-              <a:r>
-                <a:rPr lang="pt-BR" sz="4800" dirty="0">
-                  <a:solidFill>
-                    <a:srgbClr val="FFFF00"/>
-                  </a:solidFill>
-                  <a:latin typeface="Arial Black" panose="020B0A04020102020204" pitchFamily="34" charset="0"/>
-                </a:rPr>
-                <a:t>Ç</a:t>
-              </a:r>
-              <a:r>
-                <a:rPr lang="pt-BR" sz="4800" dirty="0">
-                  <a:solidFill>
-                    <a:srgbClr val="92D050"/>
-                  </a:solidFill>
-                  <a:latin typeface="Arial Black" panose="020B0A04020102020204" pitchFamily="34" charset="0"/>
-                </a:rPr>
-                <a:t>Ã</a:t>
-              </a:r>
-              <a:r>
-                <a:rPr lang="pt-BR" sz="4800" dirty="0">
-                  <a:solidFill>
-                    <a:srgbClr val="0070C0"/>
-                  </a:solidFill>
-                  <a:latin typeface="Arial Black" panose="020B0A04020102020204" pitchFamily="34" charset="0"/>
-                </a:rPr>
-                <a:t>O</a:t>
-              </a:r>
-              <a:r>
-                <a:rPr lang="pt-BR" sz="4800" dirty="0">
-                  <a:solidFill>
-                    <a:srgbClr val="FF0000"/>
-                  </a:solidFill>
-                  <a:latin typeface="Arial Black" panose="020B0A04020102020204" pitchFamily="34" charset="0"/>
-                </a:rPr>
-                <a:t>!!</a:t>
-              </a:r>
-            </a:p>
-          </p:txBody>
-        </p:sp>
-        <p:sp>
-          <p:nvSpPr>
-            <p:cNvPr id="10" name="Triângulo isósceles 9">
-              <a:extLst>
-                <a:ext uri="{FF2B5EF4-FFF2-40B4-BE49-F238E27FC236}">
-                  <a16:creationId xmlns:a16="http://schemas.microsoft.com/office/drawing/2014/main" id="{CDF2D08B-6C6A-487A-ADCB-8A0B85249939}"/>
-                </a:ext>
-              </a:extLst>
-            </p:cNvPr>
-            <p:cNvSpPr/>
-            <p:nvPr/>
-          </p:nvSpPr>
-          <p:spPr>
-            <a:xfrm>
-              <a:off x="1444348" y="1712685"/>
-              <a:ext cx="471538" cy="459800"/>
-            </a:xfrm>
-            <a:prstGeom prst="triangle">
-              <a:avLst/>
-            </a:prstGeom>
-            <a:solidFill>
-              <a:srgbClr val="92D050"/>
-            </a:solidFill>
-            <a:ln>
-              <a:noFill/>
-            </a:ln>
-          </p:spPr>
-          <p:style>
-            <a:lnRef idx="2">
-              <a:schemeClr val="accent1">
-                <a:shade val="50000"/>
-              </a:schemeClr>
-            </a:lnRef>
-            <a:fillRef idx="1">
-              <a:schemeClr val="accent1"/>
-            </a:fillRef>
-            <a:effectRef idx="0">
-              <a:schemeClr val="accent1"/>
-            </a:effectRef>
-            <a:fontRef idx="minor">
-              <a:schemeClr val="lt1"/>
-            </a:fontRef>
-          </p:style>
-          <p:txBody>
-            <a:bodyPr rtlCol="0" anchor="ctr"/>
-            <a:lstStyle/>
-            <a:p>
-              <a:pPr algn="ctr"/>
-              <a:endParaRPr lang="pt-BR"/>
-            </a:p>
-          </p:txBody>
-        </p:sp>
-        <p:sp>
-          <p:nvSpPr>
-            <p:cNvPr id="9" name="Triângulo isósceles 8">
-              <a:extLst>
-                <a:ext uri="{FF2B5EF4-FFF2-40B4-BE49-F238E27FC236}">
-                  <a16:creationId xmlns:a16="http://schemas.microsoft.com/office/drawing/2014/main" id="{4CD46DAE-5BC0-471B-B76E-F3ADFB447A2D}"/>
-                </a:ext>
-              </a:extLst>
-            </p:cNvPr>
-            <p:cNvSpPr/>
-            <p:nvPr/>
-          </p:nvSpPr>
-          <p:spPr>
-            <a:xfrm>
-              <a:off x="3667590" y="1712685"/>
-              <a:ext cx="471538" cy="459800"/>
-            </a:xfrm>
-            <a:prstGeom prst="triangle">
-              <a:avLst/>
-            </a:prstGeom>
-            <a:solidFill>
-              <a:srgbClr val="92D050"/>
-            </a:solidFill>
-            <a:ln>
-              <a:noFill/>
-            </a:ln>
-          </p:spPr>
-          <p:style>
-            <a:lnRef idx="2">
-              <a:schemeClr val="accent1">
-                <a:shade val="50000"/>
-              </a:schemeClr>
-            </a:lnRef>
-            <a:fillRef idx="1">
-              <a:schemeClr val="accent1"/>
-            </a:fillRef>
-            <a:effectRef idx="0">
-              <a:schemeClr val="accent1"/>
-            </a:effectRef>
-            <a:fontRef idx="minor">
-              <a:schemeClr val="lt1"/>
-            </a:fontRef>
-          </p:style>
-          <p:txBody>
-            <a:bodyPr rtlCol="0" anchor="ctr"/>
-            <a:lstStyle/>
-            <a:p>
-              <a:pPr algn="ctr"/>
-              <a:endParaRPr lang="pt-BR"/>
-            </a:p>
-          </p:txBody>
-        </p:sp>
-      </p:grpSp>
-      <p:sp>
-        <p:nvSpPr>
-          <p:cNvPr id="13" name="CaixaDeTexto 12">
-            <a:extLst>
-              <a:ext uri="{FF2B5EF4-FFF2-40B4-BE49-F238E27FC236}">
-                <a16:creationId xmlns:a16="http://schemas.microsoft.com/office/drawing/2014/main" id="{621ED7A9-EAF7-46F0-A325-D651BF1386AC}"/>
+      <p:sp>
+        <p:nvSpPr>
+          <p:cNvPr id="11" name="CaixaDeTexto 10">
+            <a:extLst>
+              <a:ext uri="{FF2B5EF4-FFF2-40B4-BE49-F238E27FC236}">
+                <a16:creationId xmlns:a16="http://schemas.microsoft.com/office/drawing/2014/main" id="{04882994-2E24-4060-9428-4813448CD91B}"/>
               </a:ext>
             </a:extLst>
           </p:cNvPr>
@@ -11630,8 +12905,8 @@
         </p:nvSpPr>
         <p:spPr>
           <a:xfrm>
-            <a:off x="4352490" y="2376507"/>
-            <a:ext cx="3779817" cy="769441"/>
+            <a:off x="2025610" y="1149791"/>
+            <a:ext cx="4006225" cy="2585323"/>
           </a:xfrm>
           <a:prstGeom prst="rect">
             <a:avLst/>
@@ -11646,15 +12921,444 @@
           <a:p>
             <a:pPr algn="ctr"/>
             <a:r>
-              <a:rPr lang="pt-BR" sz="4400" dirty="0">
+              <a:rPr lang="pt-BR" sz="3600" dirty="0">
                 <a:solidFill>
-                  <a:schemeClr val="bg2">
-                    <a:lumMod val="90000"/>
-                  </a:schemeClr>
+                  <a:srgbClr val="FFFF00"/>
                 </a:solidFill>
                 <a:latin typeface="Arial Black" panose="020B0A04020102020204" pitchFamily="34" charset="0"/>
               </a:rPr>
-              <a:t>ATENÇÃO!!!</a:t>
+              <a:t>P</a:t>
+            </a:r>
+            <a:r>
+              <a:rPr lang="pt-BR" sz="3600" dirty="0">
+                <a:solidFill>
+                  <a:srgbClr val="FF0000"/>
+                </a:solidFill>
+                <a:latin typeface="Arial Black" panose="020B0A04020102020204" pitchFamily="34" charset="0"/>
+              </a:rPr>
+              <a:t>A</a:t>
+            </a:r>
+            <a:r>
+              <a:rPr lang="pt-BR" sz="3600" dirty="0">
+                <a:solidFill>
+                  <a:srgbClr val="0070C0"/>
+                </a:solidFill>
+                <a:latin typeface="Arial Black" panose="020B0A04020102020204" pitchFamily="34" charset="0"/>
+              </a:rPr>
+              <a:t>I</a:t>
+            </a:r>
+            <a:r>
+              <a:rPr lang="pt-BR" sz="3600" dirty="0">
+                <a:solidFill>
+                  <a:srgbClr val="92D050"/>
+                </a:solidFill>
+                <a:latin typeface="Arial Black" panose="020B0A04020102020204" pitchFamily="34" charset="0"/>
+              </a:rPr>
+              <a:t>N</a:t>
+            </a:r>
+            <a:r>
+              <a:rPr lang="pt-BR" sz="3600" dirty="0">
+                <a:solidFill>
+                  <a:srgbClr val="FFFF00"/>
+                </a:solidFill>
+                <a:latin typeface="Arial Black" panose="020B0A04020102020204" pitchFamily="34" charset="0"/>
+              </a:rPr>
+              <a:t>E</a:t>
+            </a:r>
+            <a:r>
+              <a:rPr lang="pt-BR" sz="3600" dirty="0">
+                <a:solidFill>
+                  <a:srgbClr val="FF0000"/>
+                </a:solidFill>
+                <a:latin typeface="Arial Black" panose="020B0A04020102020204" pitchFamily="34" charset="0"/>
+              </a:rPr>
+              <a:t>L</a:t>
+            </a:r>
+            <a:r>
+              <a:rPr lang="pt-BR" sz="3600" dirty="0">
+                <a:solidFill>
+                  <a:srgbClr val="0070C0"/>
+                </a:solidFill>
+                <a:latin typeface="Arial Black" panose="020B0A04020102020204" pitchFamily="34" charset="0"/>
+              </a:rPr>
+              <a:t> </a:t>
+            </a:r>
+            <a:r>
+              <a:rPr lang="pt-BR" sz="3600" dirty="0">
+                <a:solidFill>
+                  <a:srgbClr val="92D050"/>
+                </a:solidFill>
+                <a:latin typeface="Arial Black" panose="020B0A04020102020204" pitchFamily="34" charset="0"/>
+              </a:rPr>
+              <a:t>D</a:t>
+            </a:r>
+            <a:r>
+              <a:rPr lang="pt-BR" sz="3600" dirty="0">
+                <a:solidFill>
+                  <a:srgbClr val="FFFF00"/>
+                </a:solidFill>
+                <a:latin typeface="Arial Black" panose="020B0A04020102020204" pitchFamily="34" charset="0"/>
+              </a:rPr>
+              <a:t>E </a:t>
+            </a:r>
+          </a:p>
+          <a:p>
+            <a:pPr algn="ctr"/>
+            <a:r>
+              <a:rPr lang="pt-BR" sz="3600" dirty="0">
+                <a:solidFill>
+                  <a:srgbClr val="FFFF00"/>
+                </a:solidFill>
+                <a:latin typeface="Arial Black" panose="020B0A04020102020204" pitchFamily="34" charset="0"/>
+              </a:rPr>
+              <a:t>I</a:t>
+            </a:r>
+            <a:r>
+              <a:rPr lang="pt-BR" sz="3600" dirty="0">
+                <a:solidFill>
+                  <a:srgbClr val="FF0000"/>
+                </a:solidFill>
+                <a:latin typeface="Arial Black" panose="020B0A04020102020204" pitchFamily="34" charset="0"/>
+              </a:rPr>
+              <a:t>N</a:t>
+            </a:r>
+            <a:r>
+              <a:rPr lang="pt-BR" sz="3600" dirty="0">
+                <a:solidFill>
+                  <a:srgbClr val="0070C0"/>
+                </a:solidFill>
+                <a:latin typeface="Arial Black" panose="020B0A04020102020204" pitchFamily="34" charset="0"/>
+              </a:rPr>
+              <a:t>F</a:t>
+            </a:r>
+            <a:r>
+              <a:rPr lang="pt-BR" sz="3600" dirty="0">
+                <a:solidFill>
+                  <a:srgbClr val="92D050"/>
+                </a:solidFill>
+                <a:latin typeface="Arial Black" panose="020B0A04020102020204" pitchFamily="34" charset="0"/>
+              </a:rPr>
+              <a:t>O</a:t>
+            </a:r>
+            <a:r>
+              <a:rPr lang="pt-BR" sz="3600" dirty="0">
+                <a:solidFill>
+                  <a:srgbClr val="FFFF00"/>
+                </a:solidFill>
+                <a:latin typeface="Arial Black" panose="020B0A04020102020204" pitchFamily="34" charset="0"/>
+              </a:rPr>
+              <a:t>R</a:t>
+            </a:r>
+            <a:r>
+              <a:rPr lang="pt-BR" sz="3600" dirty="0">
+                <a:solidFill>
+                  <a:srgbClr val="FF0000"/>
+                </a:solidFill>
+                <a:latin typeface="Arial Black" panose="020B0A04020102020204" pitchFamily="34" charset="0"/>
+              </a:rPr>
+              <a:t>M</a:t>
+            </a:r>
+            <a:r>
+              <a:rPr lang="pt-BR" sz="3600" dirty="0">
+                <a:solidFill>
+                  <a:srgbClr val="0070C0"/>
+                </a:solidFill>
+                <a:latin typeface="Arial Black" panose="020B0A04020102020204" pitchFamily="34" charset="0"/>
+              </a:rPr>
+              <a:t>A</a:t>
+            </a:r>
+            <a:r>
+              <a:rPr lang="pt-BR" sz="3600" dirty="0">
+                <a:solidFill>
+                  <a:srgbClr val="92D050"/>
+                </a:solidFill>
+                <a:latin typeface="Arial Black" panose="020B0A04020102020204" pitchFamily="34" charset="0"/>
+              </a:rPr>
+              <a:t>Ç</a:t>
+            </a:r>
+            <a:r>
+              <a:rPr lang="pt-BR" sz="3600" dirty="0">
+                <a:solidFill>
+                  <a:srgbClr val="FFFF00"/>
+                </a:solidFill>
+                <a:latin typeface="Arial Black" panose="020B0A04020102020204" pitchFamily="34" charset="0"/>
+              </a:rPr>
+              <a:t>Õ</a:t>
+            </a:r>
+            <a:r>
+              <a:rPr lang="pt-BR" sz="3600" dirty="0">
+                <a:solidFill>
+                  <a:srgbClr val="FF0000"/>
+                </a:solidFill>
+                <a:latin typeface="Arial Black" panose="020B0A04020102020204" pitchFamily="34" charset="0"/>
+              </a:rPr>
+              <a:t>E</a:t>
+            </a:r>
+            <a:r>
+              <a:rPr lang="pt-BR" sz="3600" dirty="0">
+                <a:solidFill>
+                  <a:srgbClr val="0070C0"/>
+                </a:solidFill>
+                <a:latin typeface="Arial Black" panose="020B0A04020102020204" pitchFamily="34" charset="0"/>
+              </a:rPr>
+              <a:t>S</a:t>
+            </a:r>
+          </a:p>
+          <a:p>
+            <a:pPr algn="ctr"/>
+            <a:endParaRPr lang="pt-BR" sz="3600" dirty="0">
+              <a:solidFill>
+                <a:srgbClr val="92D050"/>
+              </a:solidFill>
+              <a:latin typeface="Arial Black" panose="020B0A04020102020204" pitchFamily="34" charset="0"/>
+            </a:endParaRPr>
+          </a:p>
+          <a:p>
+            <a:pPr algn="ctr"/>
+            <a:r>
+              <a:rPr lang="pt-BR" sz="4800" dirty="0">
+                <a:solidFill>
+                  <a:schemeClr val="bg2"/>
+                </a:solidFill>
+                <a:latin typeface="Arial Black" panose="020B0A04020102020204" pitchFamily="34" charset="0"/>
+              </a:rPr>
+              <a:t>LIGADO</a:t>
+            </a:r>
+          </a:p>
+        </p:txBody>
+      </p:sp>
+      <p:sp>
+        <p:nvSpPr>
+          <p:cNvPr id="9" name="CaixaDeTexto 8">
+            <a:extLst>
+              <a:ext uri="{FF2B5EF4-FFF2-40B4-BE49-F238E27FC236}">
+                <a16:creationId xmlns:a16="http://schemas.microsoft.com/office/drawing/2014/main" id="{2C2B32A4-9106-4C8B-9D3A-8CFE100E9320}"/>
+              </a:ext>
+            </a:extLst>
+          </p:cNvPr>
+          <p:cNvSpPr txBox="1"/>
+          <p:nvPr/>
+        </p:nvSpPr>
+        <p:spPr>
+          <a:xfrm>
+            <a:off x="6545942" y="1238691"/>
+            <a:ext cx="4185761" cy="2492990"/>
+          </a:xfrm>
+          <a:prstGeom prst="rect">
+            <a:avLst/>
+          </a:prstGeom>
+          <a:noFill/>
+        </p:spPr>
+        <p:txBody>
+          <a:bodyPr wrap="none" rtlCol="0">
+            <a:spAutoFit/>
+          </a:bodyPr>
+          <a:lstStyle/>
+          <a:p>
+            <a:pPr algn="ctr"/>
+            <a:r>
+              <a:rPr lang="pt-BR" sz="3600" u="sng" dirty="0">
+                <a:solidFill>
+                  <a:srgbClr val="FFFF00"/>
+                </a:solidFill>
+                <a:latin typeface="Arial Black" panose="020B0A04020102020204" pitchFamily="34" charset="0"/>
+              </a:rPr>
+              <a:t>P</a:t>
+            </a:r>
+            <a:r>
+              <a:rPr lang="pt-BR" sz="3600" u="sng" dirty="0">
+                <a:solidFill>
+                  <a:srgbClr val="FF0000"/>
+                </a:solidFill>
+                <a:latin typeface="Arial Black" panose="020B0A04020102020204" pitchFamily="34" charset="0"/>
+              </a:rPr>
+              <a:t>A</a:t>
+            </a:r>
+            <a:r>
+              <a:rPr lang="pt-BR" sz="3600" u="sng" dirty="0">
+                <a:solidFill>
+                  <a:srgbClr val="0070C0"/>
+                </a:solidFill>
+                <a:latin typeface="Arial Black" panose="020B0A04020102020204" pitchFamily="34" charset="0"/>
+              </a:rPr>
+              <a:t>I</a:t>
+            </a:r>
+            <a:r>
+              <a:rPr lang="pt-BR" sz="3600" u="sng" dirty="0">
+                <a:solidFill>
+                  <a:srgbClr val="92D050"/>
+                </a:solidFill>
+                <a:latin typeface="Arial Black" panose="020B0A04020102020204" pitchFamily="34" charset="0"/>
+              </a:rPr>
+              <a:t>N</a:t>
+            </a:r>
+            <a:r>
+              <a:rPr lang="pt-BR" sz="3600" u="sng" dirty="0">
+                <a:solidFill>
+                  <a:srgbClr val="FFFF00"/>
+                </a:solidFill>
+                <a:latin typeface="Arial Black" panose="020B0A04020102020204" pitchFamily="34" charset="0"/>
+              </a:rPr>
+              <a:t>E</a:t>
+            </a:r>
+            <a:r>
+              <a:rPr lang="pt-BR" sz="3600" u="sng" dirty="0">
+                <a:solidFill>
+                  <a:srgbClr val="FF0000"/>
+                </a:solidFill>
+                <a:latin typeface="Arial Black" panose="020B0A04020102020204" pitchFamily="34" charset="0"/>
+              </a:rPr>
+              <a:t>L</a:t>
+            </a:r>
+            <a:r>
+              <a:rPr lang="pt-BR" sz="3600" u="sng" dirty="0">
+                <a:solidFill>
+                  <a:srgbClr val="0070C0"/>
+                </a:solidFill>
+                <a:latin typeface="Arial Black" panose="020B0A04020102020204" pitchFamily="34" charset="0"/>
+              </a:rPr>
+              <a:t> </a:t>
+            </a:r>
+            <a:r>
+              <a:rPr lang="pt-BR" sz="3600" u="sng" dirty="0">
+                <a:solidFill>
+                  <a:srgbClr val="92D050"/>
+                </a:solidFill>
+                <a:latin typeface="Arial Black" panose="020B0A04020102020204" pitchFamily="34" charset="0"/>
+              </a:rPr>
+              <a:t>D</a:t>
+            </a:r>
+            <a:r>
+              <a:rPr lang="pt-BR" sz="3600" u="sng" dirty="0">
+                <a:solidFill>
+                  <a:srgbClr val="FFFF00"/>
+                </a:solidFill>
+                <a:latin typeface="Arial Black" panose="020B0A04020102020204" pitchFamily="34" charset="0"/>
+              </a:rPr>
+              <a:t>E </a:t>
+            </a:r>
+          </a:p>
+          <a:p>
+            <a:pPr algn="ctr"/>
+            <a:r>
+              <a:rPr lang="pt-BR" sz="3600" u="sng" dirty="0">
+                <a:solidFill>
+                  <a:srgbClr val="FFFF00"/>
+                </a:solidFill>
+                <a:latin typeface="Arial Black" panose="020B0A04020102020204" pitchFamily="34" charset="0"/>
+              </a:rPr>
+              <a:t>I</a:t>
+            </a:r>
+            <a:r>
+              <a:rPr lang="pt-BR" sz="3600" u="sng" dirty="0">
+                <a:solidFill>
+                  <a:srgbClr val="FF0000"/>
+                </a:solidFill>
+                <a:latin typeface="Arial Black" panose="020B0A04020102020204" pitchFamily="34" charset="0"/>
+              </a:rPr>
+              <a:t>N</a:t>
+            </a:r>
+            <a:r>
+              <a:rPr lang="pt-BR" sz="3600" u="sng" dirty="0">
+                <a:solidFill>
+                  <a:srgbClr val="0070C0"/>
+                </a:solidFill>
+                <a:latin typeface="Arial Black" panose="020B0A04020102020204" pitchFamily="34" charset="0"/>
+              </a:rPr>
+              <a:t>F</a:t>
+            </a:r>
+            <a:r>
+              <a:rPr lang="pt-BR" sz="3600" u="sng" dirty="0">
+                <a:solidFill>
+                  <a:srgbClr val="92D050"/>
+                </a:solidFill>
+                <a:latin typeface="Arial Black" panose="020B0A04020102020204" pitchFamily="34" charset="0"/>
+              </a:rPr>
+              <a:t>O</a:t>
+            </a:r>
+            <a:r>
+              <a:rPr lang="pt-BR" sz="3600" u="sng" dirty="0">
+                <a:solidFill>
+                  <a:srgbClr val="FFFF00"/>
+                </a:solidFill>
+                <a:latin typeface="Arial Black" panose="020B0A04020102020204" pitchFamily="34" charset="0"/>
+              </a:rPr>
+              <a:t>R</a:t>
+            </a:r>
+            <a:r>
+              <a:rPr lang="pt-BR" sz="3600" u="sng" dirty="0">
+                <a:solidFill>
+                  <a:srgbClr val="FF0000"/>
+                </a:solidFill>
+                <a:latin typeface="Arial Black" panose="020B0A04020102020204" pitchFamily="34" charset="0"/>
+              </a:rPr>
+              <a:t>M</a:t>
+            </a:r>
+            <a:r>
+              <a:rPr lang="pt-BR" sz="3600" u="sng" dirty="0">
+                <a:solidFill>
+                  <a:srgbClr val="0070C0"/>
+                </a:solidFill>
+                <a:latin typeface="Arial Black" panose="020B0A04020102020204" pitchFamily="34" charset="0"/>
+              </a:rPr>
+              <a:t>A</a:t>
+            </a:r>
+            <a:r>
+              <a:rPr lang="pt-BR" sz="3600" u="sng" dirty="0">
+                <a:solidFill>
+                  <a:srgbClr val="92D050"/>
+                </a:solidFill>
+                <a:latin typeface="Arial Black" panose="020B0A04020102020204" pitchFamily="34" charset="0"/>
+              </a:rPr>
+              <a:t>Ç</a:t>
+            </a:r>
+            <a:r>
+              <a:rPr lang="pt-BR" sz="3600" u="sng" dirty="0">
+                <a:solidFill>
+                  <a:srgbClr val="FFFF00"/>
+                </a:solidFill>
+                <a:latin typeface="Arial Black" panose="020B0A04020102020204" pitchFamily="34" charset="0"/>
+              </a:rPr>
+              <a:t>Õ</a:t>
+            </a:r>
+            <a:r>
+              <a:rPr lang="pt-BR" sz="3600" u="sng" dirty="0">
+                <a:solidFill>
+                  <a:srgbClr val="FF0000"/>
+                </a:solidFill>
+                <a:latin typeface="Arial Black" panose="020B0A04020102020204" pitchFamily="34" charset="0"/>
+              </a:rPr>
+              <a:t>E</a:t>
+            </a:r>
+            <a:r>
+              <a:rPr lang="pt-BR" sz="3600" u="sng" dirty="0">
+                <a:solidFill>
+                  <a:srgbClr val="0070C0"/>
+                </a:solidFill>
+                <a:latin typeface="Arial Black" panose="020B0A04020102020204" pitchFamily="34" charset="0"/>
+              </a:rPr>
+              <a:t>S</a:t>
+            </a:r>
+          </a:p>
+          <a:p>
+            <a:pPr algn="ctr"/>
+            <a:endParaRPr lang="pt-BR" sz="3600" u="sng" dirty="0">
+              <a:solidFill>
+                <a:srgbClr val="92D050"/>
+              </a:solidFill>
+              <a:latin typeface="Arial Black" panose="020B0A04020102020204" pitchFamily="34" charset="0"/>
+            </a:endParaRPr>
+          </a:p>
+          <a:p>
+            <a:pPr algn="ctr"/>
+            <a:r>
+              <a:rPr lang="pt-BR" sz="4800" u="sng" dirty="0">
+                <a:solidFill>
+                  <a:schemeClr val="bg2"/>
+                </a:solidFill>
+                <a:latin typeface="Arial Black" panose="020B0A04020102020204" pitchFamily="34" charset="0"/>
+              </a:rPr>
+              <a:t>DESLIGADO</a:t>
             </a:r>
           </a:p>
         </p:txBody>
@@ -11662,7 +13366,7 @@
     </p:spTree>
     <p:extLst>
       <p:ext uri="{BB962C8B-B14F-4D97-AF65-F5344CB8AC3E}">
-        <p14:creationId xmlns:p14="http://schemas.microsoft.com/office/powerpoint/2010/main" val="176806908"/>
+        <p14:creationId xmlns:p14="http://schemas.microsoft.com/office/powerpoint/2010/main" val="1785793872"/>
       </p:ext>
     </p:extLst>
   </p:cSld>
@@ -11965,4 +13669,299 @@
     </a:ext>
   </a:extLst>
 </a:theme>
+</file>
+
+<file path=ppt/theme/theme2.xml><?xml version="1.0" encoding="utf-8"?>
+<a:theme xmlns:a="http://schemas.openxmlformats.org/drawingml/2006/main" name="Tema do Office">
+  <a:themeElements>
+    <a:clrScheme name="Office">
+      <a:dk1>
+        <a:sysClr val="windowText" lastClr="000000"/>
+      </a:dk1>
+      <a:lt1>
+        <a:sysClr val="window" lastClr="FFFFFF"/>
+      </a:lt1>
+      <a:dk2>
+        <a:srgbClr val="44546A"/>
+      </a:dk2>
+      <a:lt2>
+        <a:srgbClr val="E7E6E6"/>
+      </a:lt2>
+      <a:accent1>
+        <a:srgbClr val="4472C4"/>
+      </a:accent1>
+      <a:accent2>
+        <a:srgbClr val="ED7D31"/>
+      </a:accent2>
+      <a:accent3>
+        <a:srgbClr val="A5A5A5"/>
+      </a:accent3>
+      <a:accent4>
+        <a:srgbClr val="FFC000"/>
+      </a:accent4>
+      <a:accent5>
+        <a:srgbClr val="5B9BD5"/>
+      </a:accent5>
+      <a:accent6>
+        <a:srgbClr val="70AD47"/>
+      </a:accent6>
+      <a:hlink>
+        <a:srgbClr val="0563C1"/>
+      </a:hlink>
+      <a:folHlink>
+        <a:srgbClr val="954F72"/>
+      </a:folHlink>
+    </a:clrScheme>
+    <a:fontScheme name="Office">
+      <a:majorFont>
+        <a:latin typeface="Calibri Light" panose="020F0302020204030204"/>
+        <a:ea typeface=""/>
+        <a:cs typeface=""/>
+        <a:font script="Jpan" typeface="游ゴシック Light"/>
+        <a:font script="Hang" typeface="맑은 고딕"/>
+        <a:font script="Hans" typeface="等线 Light"/>
+        <a:font script="Hant" typeface="新細明體"/>
+        <a:font script="Arab" typeface="Times New Roman"/>
+        <a:font script="Hebr" typeface="Times New Roman"/>
+        <a:font script="Thai" typeface="Angsana New"/>
+        <a:font script="Ethi" typeface="Nyala"/>
+        <a:font script="Beng" typeface="Vrinda"/>
+        <a:font script="Gujr" typeface="Shruti"/>
+        <a:font script="Khmr" typeface="MoolBoran"/>
+        <a:font script="Knda" typeface="Tunga"/>
+        <a:font script="Guru" typeface="Raavi"/>
+        <a:font script="Cans" typeface="Euphemia"/>
+        <a:font script="Cher" typeface="Plantagenet Cherokee"/>
+        <a:font script="Yiii" typeface="Microsoft Yi Baiti"/>
+        <a:font script="Tibt" typeface="Microsoft Himalaya"/>
+        <a:font script="Thaa" typeface="MV Boli"/>
+        <a:font script="Deva" typeface="Mangal"/>
+        <a:font script="Telu" typeface="Gautami"/>
+        <a:font script="Taml" typeface="Latha"/>
+        <a:font script="Syrc" typeface="Estrangelo Edessa"/>
+        <a:font script="Orya" typeface="Kalinga"/>
+        <a:font script="Mlym" typeface="Kartika"/>
+        <a:font script="Laoo" typeface="DokChampa"/>
+        <a:font script="Sinh" typeface="Iskoola Pota"/>
+        <a:font script="Mong" typeface="Mongolian Baiti"/>
+        <a:font script="Viet" typeface="Times New Roman"/>
+        <a:font script="Uigh" typeface="Microsoft Uighur"/>
+        <a:font script="Geor" typeface="Sylfaen"/>
+        <a:font script="Armn" typeface="Arial"/>
+        <a:font script="Bugi" typeface="Leelawadee UI"/>
+        <a:font script="Bopo" typeface="Microsoft JhengHei"/>
+        <a:font script="Java" typeface="Javanese Text"/>
+        <a:font script="Lisu" typeface="Segoe UI"/>
+        <a:font script="Mymr" typeface="Myanmar Text"/>
+        <a:font script="Nkoo" typeface="Ebrima"/>
+        <a:font script="Olck" typeface="Nirmala UI"/>
+        <a:font script="Osma" typeface="Ebrima"/>
+        <a:font script="Phag" typeface="Phagspa"/>
+        <a:font script="Syrn" typeface="Estrangelo Edessa"/>
+        <a:font script="Syrj" typeface="Estrangelo Edessa"/>
+        <a:font script="Syre" typeface="Estrangelo Edessa"/>
+        <a:font script="Sora" typeface="Nirmala UI"/>
+        <a:font script="Tale" typeface="Microsoft Tai Le"/>
+        <a:font script="Talu" typeface="Microsoft New Tai Lue"/>
+        <a:font script="Tfng" typeface="Ebrima"/>
+      </a:majorFont>
+      <a:minorFont>
+        <a:latin typeface="Calibri" panose="020F0502020204030204"/>
+        <a:ea typeface=""/>
+        <a:cs typeface=""/>
+        <a:font script="Jpan" typeface="游ゴシック"/>
+        <a:font script="Hang" typeface="맑은 고딕"/>
+        <a:font script="Hans" typeface="等线"/>
+        <a:font script="Hant" typeface="新細明體"/>
+        <a:font script="Arab" typeface="Arial"/>
+        <a:font script="Hebr" typeface="Arial"/>
+        <a:font script="Thai" typeface="Cordia New"/>
+        <a:font script="Ethi" typeface="Nyala"/>
+        <a:font script="Beng" typeface="Vrinda"/>
+        <a:font script="Gujr" typeface="Shruti"/>
+        <a:font script="Khmr" typeface="DaunPenh"/>
+        <a:font script="Knda" typeface="Tunga"/>
+        <a:font script="Guru" typeface="Raavi"/>
+        <a:font script="Cans" typeface="Euphemia"/>
+        <a:font script="Cher" typeface="Plantagenet Cherokee"/>
+        <a:font script="Yiii" typeface="Microsoft Yi Baiti"/>
+        <a:font script="Tibt" typeface="Microsoft Himalaya"/>
+        <a:font script="Thaa" typeface="MV Boli"/>
+        <a:font script="Deva" typeface="Mangal"/>
+        <a:font script="Telu" typeface="Gautami"/>
+        <a:font script="Taml" typeface="Latha"/>
+        <a:font script="Syrc" typeface="Estrangelo Edessa"/>
+        <a:font script="Orya" typeface="Kalinga"/>
+        <a:font script="Mlym" typeface="Kartika"/>
+        <a:font script="Laoo" typeface="DokChampa"/>
+        <a:font script="Sinh" typeface="Iskoola Pota"/>
+        <a:font script="Mong" typeface="Mongolian Baiti"/>
+        <a:font script="Viet" typeface="Arial"/>
+        <a:font script="Uigh" typeface="Microsoft Uighur"/>
+        <a:font script="Geor" typeface="Sylfaen"/>
+        <a:font script="Armn" typeface="Arial"/>
+        <a:font script="Bugi" typeface="Leelawadee UI"/>
+        <a:font script="Bopo" typeface="Microsoft JhengHei"/>
+        <a:font script="Java" typeface="Javanese Text"/>
+        <a:font script="Lisu" typeface="Segoe UI"/>
+        <a:font script="Mymr" typeface="Myanmar Text"/>
+        <a:font script="Nkoo" typeface="Ebrima"/>
+        <a:font script="Olck" typeface="Nirmala UI"/>
+        <a:font script="Osma" typeface="Ebrima"/>
+        <a:font script="Phag" typeface="Phagspa"/>
+        <a:font script="Syrn" typeface="Estrangelo Edessa"/>
+        <a:font script="Syrj" typeface="Estrangelo Edessa"/>
+        <a:font script="Syre" typeface="Estrangelo Edessa"/>
+        <a:font script="Sora" typeface="Nirmala UI"/>
+        <a:font script="Tale" typeface="Microsoft Tai Le"/>
+        <a:font script="Talu" typeface="Microsoft New Tai Lue"/>
+        <a:font script="Tfng" typeface="Ebrima"/>
+      </a:minorFont>
+    </a:fontScheme>
+    <a:fmtScheme name="Office">
+      <a:fillStyleLst>
+        <a:solidFill>
+          <a:schemeClr val="phClr"/>
+        </a:solidFill>
+        <a:gradFill rotWithShape="1">
+          <a:gsLst>
+            <a:gs pos="0">
+              <a:schemeClr val="phClr">
+                <a:lumMod val="110000"/>
+                <a:satMod val="105000"/>
+                <a:tint val="67000"/>
+              </a:schemeClr>
+            </a:gs>
+            <a:gs pos="50000">
+              <a:schemeClr val="phClr">
+                <a:lumMod val="105000"/>
+                <a:satMod val="103000"/>
+                <a:tint val="73000"/>
+              </a:schemeClr>
+            </a:gs>
+            <a:gs pos="100000">
+              <a:schemeClr val="phClr">
+                <a:lumMod val="105000"/>
+                <a:satMod val="109000"/>
+                <a:tint val="81000"/>
+              </a:schemeClr>
+            </a:gs>
+          </a:gsLst>
+          <a:lin ang="5400000" scaled="0"/>
+        </a:gradFill>
+        <a:gradFill rotWithShape="1">
+          <a:gsLst>
+            <a:gs pos="0">
+              <a:schemeClr val="phClr">
+                <a:satMod val="103000"/>
+                <a:lumMod val="102000"/>
+                <a:tint val="94000"/>
+              </a:schemeClr>
+            </a:gs>
+            <a:gs pos="50000">
+              <a:schemeClr val="phClr">
+                <a:satMod val="110000"/>
+                <a:lumMod val="100000"/>
+                <a:shade val="100000"/>
+              </a:schemeClr>
+            </a:gs>
+            <a:gs pos="100000">
+              <a:schemeClr val="phClr">
+                <a:lumMod val="99000"/>
+                <a:satMod val="120000"/>
+                <a:shade val="78000"/>
+              </a:schemeClr>
+            </a:gs>
+          </a:gsLst>
+          <a:lin ang="5400000" scaled="0"/>
+        </a:gradFill>
+      </a:fillStyleLst>
+      <a:lnStyleLst>
+        <a:ln w="6350" cap="flat" cmpd="sng" algn="ctr">
+          <a:solidFill>
+            <a:schemeClr val="phClr"/>
+          </a:solidFill>
+          <a:prstDash val="solid"/>
+          <a:miter lim="800000"/>
+        </a:ln>
+        <a:ln w="12700" cap="flat" cmpd="sng" algn="ctr">
+          <a:solidFill>
+            <a:schemeClr val="phClr"/>
+          </a:solidFill>
+          <a:prstDash val="solid"/>
+          <a:miter lim="800000"/>
+        </a:ln>
+        <a:ln w="19050" cap="flat" cmpd="sng" algn="ctr">
+          <a:solidFill>
+            <a:schemeClr val="phClr"/>
+          </a:solidFill>
+          <a:prstDash val="solid"/>
+          <a:miter lim="800000"/>
+        </a:ln>
+      </a:lnStyleLst>
+      <a:effectStyleLst>
+        <a:effectStyle>
+          <a:effectLst/>
+        </a:effectStyle>
+        <a:effectStyle>
+          <a:effectLst/>
+        </a:effectStyle>
+        <a:effectStyle>
+          <a:effectLst>
+            <a:outerShdw blurRad="57150" dist="19050" dir="5400000" algn="ctr" rotWithShape="0">
+              <a:srgbClr val="000000">
+                <a:alpha val="63000"/>
+              </a:srgbClr>
+            </a:outerShdw>
+          </a:effectLst>
+        </a:effectStyle>
+      </a:effectStyleLst>
+      <a:bgFillStyleLst>
+        <a:solidFill>
+          <a:schemeClr val="phClr"/>
+        </a:solidFill>
+        <a:solidFill>
+          <a:schemeClr val="phClr">
+            <a:tint val="95000"/>
+            <a:satMod val="170000"/>
+          </a:schemeClr>
+        </a:solidFill>
+        <a:gradFill rotWithShape="1">
+          <a:gsLst>
+            <a:gs pos="0">
+              <a:schemeClr val="phClr">
+                <a:tint val="93000"/>
+                <a:satMod val="150000"/>
+                <a:shade val="98000"/>
+                <a:lumMod val="102000"/>
+              </a:schemeClr>
+            </a:gs>
+            <a:gs pos="50000">
+              <a:schemeClr val="phClr">
+                <a:tint val="98000"/>
+                <a:satMod val="130000"/>
+                <a:shade val="90000"/>
+                <a:lumMod val="103000"/>
+              </a:schemeClr>
+            </a:gs>
+            <a:gs pos="100000">
+              <a:schemeClr val="phClr">
+                <a:shade val="63000"/>
+                <a:satMod val="120000"/>
+              </a:schemeClr>
+            </a:gs>
+          </a:gsLst>
+          <a:lin ang="5400000" scaled="0"/>
+        </a:gradFill>
+      </a:bgFillStyleLst>
+    </a:fmtScheme>
+  </a:themeElements>
+  <a:objectDefaults/>
+  <a:extraClrSchemeLst/>
+  <a:extLst>
+    <a:ext uri="{05A4C25C-085E-4340-85A3-A5531E510DB2}">
+      <thm15:themeFamily xmlns:thm15="http://schemas.microsoft.com/office/thememl/2012/main" name="Office Theme" id="{62F939B6-93AF-4DB8-9C6B-D6C7DFDC589F}" vid="{4A3C46E8-61CC-4603-A589-7422A47A8E4A}"/>
+    </a:ext>
+  </a:extLst>
+</a:theme>
 </file>
</xml_diff>

<commit_message>
Atualização do PPT de imagens
</commit_message>
<xml_diff>
--- a/Source/Assets/Repetea_Figuras/Avisos.pptx
+++ b/Source/Assets/Repetea_Figuras/Avisos.pptx
@@ -5,24 +5,25 @@
     <p:sldMasterId id="2147483648" r:id="rId1"/>
   </p:sldMasterIdLst>
   <p:notesMasterIdLst>
-    <p:notesMasterId r:id="rId17"/>
+    <p:notesMasterId r:id="rId18"/>
   </p:notesMasterIdLst>
   <p:sldIdLst>
     <p:sldId id="256" r:id="rId2"/>
     <p:sldId id="270" r:id="rId3"/>
     <p:sldId id="257" r:id="rId4"/>
     <p:sldId id="269" r:id="rId5"/>
-    <p:sldId id="258" r:id="rId6"/>
-    <p:sldId id="261" r:id="rId7"/>
-    <p:sldId id="264" r:id="rId8"/>
-    <p:sldId id="263" r:id="rId9"/>
-    <p:sldId id="267" r:id="rId10"/>
-    <p:sldId id="265" r:id="rId11"/>
-    <p:sldId id="266" r:id="rId12"/>
-    <p:sldId id="262" r:id="rId13"/>
-    <p:sldId id="259" r:id="rId14"/>
-    <p:sldId id="260" r:id="rId15"/>
-    <p:sldId id="268" r:id="rId16"/>
+    <p:sldId id="271" r:id="rId6"/>
+    <p:sldId id="258" r:id="rId7"/>
+    <p:sldId id="261" r:id="rId8"/>
+    <p:sldId id="264" r:id="rId9"/>
+    <p:sldId id="263" r:id="rId10"/>
+    <p:sldId id="267" r:id="rId11"/>
+    <p:sldId id="265" r:id="rId12"/>
+    <p:sldId id="266" r:id="rId13"/>
+    <p:sldId id="262" r:id="rId14"/>
+    <p:sldId id="259" r:id="rId15"/>
+    <p:sldId id="260" r:id="rId16"/>
+    <p:sldId id="268" r:id="rId17"/>
   </p:sldIdLst>
   <p:sldSz cx="12192000" cy="6858000"/>
   <p:notesSz cx="6858000" cy="9144000"/>
@@ -617,7 +618,7 @@
           <a:p>
             <a:fld id="{AE1650F6-AD51-43A5-BD94-AF8C5A9C0302}" type="datetimeFigureOut">
               <a:rPr lang="pt-BR" smtClean="0"/>
-              <a:t>30/06/2023</a:t>
+              <a:t>07/08/2023</a:t>
             </a:fld>
             <a:endParaRPr lang="pt-BR"/>
           </a:p>
@@ -1058,6 +1059,93 @@
 </p:notes>
 </file>
 
+<file path=ppt/notesSlides/notesSlide3.xml><?xml version="1.0" encoding="utf-8"?>
+<p:notes xmlns:a="http://schemas.openxmlformats.org/drawingml/2006/main" xmlns:r="http://schemas.openxmlformats.org/officeDocument/2006/relationships" xmlns:p="http://schemas.openxmlformats.org/presentationml/2006/main">
+  <p:cSld>
+    <p:spTree>
+      <p:nvGrpSpPr>
+        <p:cNvPr id="1" name=""/>
+        <p:cNvGrpSpPr/>
+        <p:nvPr/>
+      </p:nvGrpSpPr>
+      <p:grpSpPr>
+        <a:xfrm>
+          <a:off x="0" y="0"/>
+          <a:ext cx="0" cy="0"/>
+          <a:chOff x="0" y="0"/>
+          <a:chExt cx="0" cy="0"/>
+        </a:xfrm>
+      </p:grpSpPr>
+      <p:sp>
+        <p:nvSpPr>
+          <p:cNvPr id="2" name="Espaço Reservado para Imagem de Slide 1"/>
+          <p:cNvSpPr>
+            <a:spLocks noGrp="1" noRot="1" noChangeAspect="1"/>
+          </p:cNvSpPr>
+          <p:nvPr>
+            <p:ph type="sldImg"/>
+          </p:nvPr>
+        </p:nvSpPr>
+        <p:spPr/>
+      </p:sp>
+      <p:sp>
+        <p:nvSpPr>
+          <p:cNvPr id="3" name="Espaço Reservado para Anotações 2"/>
+          <p:cNvSpPr>
+            <a:spLocks noGrp="1"/>
+          </p:cNvSpPr>
+          <p:nvPr>
+            <p:ph type="body" idx="1"/>
+          </p:nvPr>
+        </p:nvSpPr>
+        <p:spPr/>
+        <p:txBody>
+          <a:bodyPr/>
+          <a:lstStyle/>
+          <a:p>
+            <a:r>
+              <a:rPr lang="pt-BR" dirty="0"/>
+              <a:t>Versão 2</a:t>
+            </a:r>
+          </a:p>
+        </p:txBody>
+      </p:sp>
+      <p:sp>
+        <p:nvSpPr>
+          <p:cNvPr id="4" name="Espaço Reservado para Número de Slide 3"/>
+          <p:cNvSpPr>
+            <a:spLocks noGrp="1"/>
+          </p:cNvSpPr>
+          <p:nvPr>
+            <p:ph type="sldNum" sz="quarter" idx="5"/>
+          </p:nvPr>
+        </p:nvSpPr>
+        <p:spPr/>
+        <p:txBody>
+          <a:bodyPr/>
+          <a:lstStyle/>
+          <a:p>
+            <a:fld id="{4992AE91-B890-479E-8258-4C2ADA44E29B}" type="slidenum">
+              <a:rPr lang="pt-BR" smtClean="0"/>
+              <a:t>5</a:t>
+            </a:fld>
+            <a:endParaRPr lang="pt-BR"/>
+          </a:p>
+        </p:txBody>
+      </p:sp>
+    </p:spTree>
+    <p:extLst>
+      <p:ext uri="{BB962C8B-B14F-4D97-AF65-F5344CB8AC3E}">
+        <p14:creationId xmlns:p14="http://schemas.microsoft.com/office/powerpoint/2010/main" val="1778230099"/>
+      </p:ext>
+    </p:extLst>
+  </p:cSld>
+  <p:clrMapOvr>
+    <a:masterClrMapping/>
+  </p:clrMapOvr>
+</p:notes>
+</file>
+
 <file path=ppt/slideLayouts/slideLayout1.xml><?xml version="1.0" encoding="utf-8"?>
 <p:sldLayout xmlns:a="http://schemas.openxmlformats.org/drawingml/2006/main" xmlns:r="http://schemas.openxmlformats.org/officeDocument/2006/relationships" xmlns:p="http://schemas.openxmlformats.org/presentationml/2006/main" type="title" preserve="1">
   <p:cSld name="Slide de Título">
@@ -1205,7 +1293,7 @@
           <a:p>
             <a:fld id="{F05CD7A9-91D7-456F-A2CA-A01848C64662}" type="datetimeFigureOut">
               <a:rPr lang="pt-BR" smtClean="0"/>
-              <a:t>30/06/2023</a:t>
+              <a:t>07/08/2023</a:t>
             </a:fld>
             <a:endParaRPr lang="pt-BR"/>
           </a:p>
@@ -1403,7 +1491,7 @@
           <a:p>
             <a:fld id="{F05CD7A9-91D7-456F-A2CA-A01848C64662}" type="datetimeFigureOut">
               <a:rPr lang="pt-BR" smtClean="0"/>
-              <a:t>30/06/2023</a:t>
+              <a:t>07/08/2023</a:t>
             </a:fld>
             <a:endParaRPr lang="pt-BR"/>
           </a:p>
@@ -1611,7 +1699,7 @@
           <a:p>
             <a:fld id="{F05CD7A9-91D7-456F-A2CA-A01848C64662}" type="datetimeFigureOut">
               <a:rPr lang="pt-BR" smtClean="0"/>
-              <a:t>30/06/2023</a:t>
+              <a:t>07/08/2023</a:t>
             </a:fld>
             <a:endParaRPr lang="pt-BR"/>
           </a:p>
@@ -1809,7 +1897,7 @@
           <a:p>
             <a:fld id="{F05CD7A9-91D7-456F-A2CA-A01848C64662}" type="datetimeFigureOut">
               <a:rPr lang="pt-BR" smtClean="0"/>
-              <a:t>30/06/2023</a:t>
+              <a:t>07/08/2023</a:t>
             </a:fld>
             <a:endParaRPr lang="pt-BR"/>
           </a:p>
@@ -2084,7 +2172,7 @@
           <a:p>
             <a:fld id="{F05CD7A9-91D7-456F-A2CA-A01848C64662}" type="datetimeFigureOut">
               <a:rPr lang="pt-BR" smtClean="0"/>
-              <a:t>30/06/2023</a:t>
+              <a:t>07/08/2023</a:t>
             </a:fld>
             <a:endParaRPr lang="pt-BR"/>
           </a:p>
@@ -2349,7 +2437,7 @@
           <a:p>
             <a:fld id="{F05CD7A9-91D7-456F-A2CA-A01848C64662}" type="datetimeFigureOut">
               <a:rPr lang="pt-BR" smtClean="0"/>
-              <a:t>30/06/2023</a:t>
+              <a:t>07/08/2023</a:t>
             </a:fld>
             <a:endParaRPr lang="pt-BR"/>
           </a:p>
@@ -2761,7 +2849,7 @@
           <a:p>
             <a:fld id="{F05CD7A9-91D7-456F-A2CA-A01848C64662}" type="datetimeFigureOut">
               <a:rPr lang="pt-BR" smtClean="0"/>
-              <a:t>30/06/2023</a:t>
+              <a:t>07/08/2023</a:t>
             </a:fld>
             <a:endParaRPr lang="pt-BR"/>
           </a:p>
@@ -2902,7 +2990,7 @@
           <a:p>
             <a:fld id="{F05CD7A9-91D7-456F-A2CA-A01848C64662}" type="datetimeFigureOut">
               <a:rPr lang="pt-BR" smtClean="0"/>
-              <a:t>30/06/2023</a:t>
+              <a:t>07/08/2023</a:t>
             </a:fld>
             <a:endParaRPr lang="pt-BR"/>
           </a:p>
@@ -3015,7 +3103,7 @@
           <a:p>
             <a:fld id="{F05CD7A9-91D7-456F-A2CA-A01848C64662}" type="datetimeFigureOut">
               <a:rPr lang="pt-BR" smtClean="0"/>
-              <a:t>30/06/2023</a:t>
+              <a:t>07/08/2023</a:t>
             </a:fld>
             <a:endParaRPr lang="pt-BR"/>
           </a:p>
@@ -3326,7 +3414,7 @@
           <a:p>
             <a:fld id="{F05CD7A9-91D7-456F-A2CA-A01848C64662}" type="datetimeFigureOut">
               <a:rPr lang="pt-BR" smtClean="0"/>
-              <a:t>30/06/2023</a:t>
+              <a:t>07/08/2023</a:t>
             </a:fld>
             <a:endParaRPr lang="pt-BR"/>
           </a:p>
@@ -3614,7 +3702,7 @@
           <a:p>
             <a:fld id="{F05CD7A9-91D7-456F-A2CA-A01848C64662}" type="datetimeFigureOut">
               <a:rPr lang="pt-BR" smtClean="0"/>
-              <a:t>30/06/2023</a:t>
+              <a:t>07/08/2023</a:t>
             </a:fld>
             <a:endParaRPr lang="pt-BR"/>
           </a:p>
@@ -3855,7 +3943,7 @@
           <a:p>
             <a:fld id="{F05CD7A9-91D7-456F-A2CA-A01848C64662}" type="datetimeFigureOut">
               <a:rPr lang="pt-BR" smtClean="0"/>
-              <a:t>30/06/2023</a:t>
+              <a:t>07/08/2023</a:t>
             </a:fld>
             <a:endParaRPr lang="pt-BR"/>
           </a:p>
@@ -4417,6 +4505,508 @@
           <a:chExt cx="0" cy="0"/>
         </a:xfrm>
       </p:grpSpPr>
+      <p:sp>
+        <p:nvSpPr>
+          <p:cNvPr id="11" name="CaixaDeTexto 10">
+            <a:extLst>
+              <a:ext uri="{FF2B5EF4-FFF2-40B4-BE49-F238E27FC236}">
+                <a16:creationId xmlns:a16="http://schemas.microsoft.com/office/drawing/2014/main" id="{04882994-2E24-4060-9428-4813448CD91B}"/>
+              </a:ext>
+            </a:extLst>
+          </p:cNvPr>
+          <p:cNvSpPr txBox="1"/>
+          <p:nvPr/>
+        </p:nvSpPr>
+        <p:spPr>
+          <a:xfrm>
+            <a:off x="2025610" y="1149791"/>
+            <a:ext cx="4006225" cy="2585323"/>
+          </a:xfrm>
+          <a:prstGeom prst="rect">
+            <a:avLst/>
+          </a:prstGeom>
+          <a:noFill/>
+        </p:spPr>
+        <p:txBody>
+          <a:bodyPr wrap="none" rtlCol="0">
+            <a:spAutoFit/>
+          </a:bodyPr>
+          <a:lstStyle/>
+          <a:p>
+            <a:pPr algn="ctr"/>
+            <a:r>
+              <a:rPr lang="pt-BR" sz="3600" dirty="0">
+                <a:solidFill>
+                  <a:srgbClr val="FFFF00"/>
+                </a:solidFill>
+                <a:latin typeface="Arial Black" panose="020B0A04020102020204" pitchFamily="34" charset="0"/>
+              </a:rPr>
+              <a:t>P</a:t>
+            </a:r>
+            <a:r>
+              <a:rPr lang="pt-BR" sz="3600" dirty="0">
+                <a:solidFill>
+                  <a:srgbClr val="FF0000"/>
+                </a:solidFill>
+                <a:latin typeface="Arial Black" panose="020B0A04020102020204" pitchFamily="34" charset="0"/>
+              </a:rPr>
+              <a:t>A</a:t>
+            </a:r>
+            <a:r>
+              <a:rPr lang="pt-BR" sz="3600" dirty="0">
+                <a:solidFill>
+                  <a:srgbClr val="0070C0"/>
+                </a:solidFill>
+                <a:latin typeface="Arial Black" panose="020B0A04020102020204" pitchFamily="34" charset="0"/>
+              </a:rPr>
+              <a:t>I</a:t>
+            </a:r>
+            <a:r>
+              <a:rPr lang="pt-BR" sz="3600" dirty="0">
+                <a:solidFill>
+                  <a:srgbClr val="92D050"/>
+                </a:solidFill>
+                <a:latin typeface="Arial Black" panose="020B0A04020102020204" pitchFamily="34" charset="0"/>
+              </a:rPr>
+              <a:t>N</a:t>
+            </a:r>
+            <a:r>
+              <a:rPr lang="pt-BR" sz="3600" dirty="0">
+                <a:solidFill>
+                  <a:srgbClr val="FFFF00"/>
+                </a:solidFill>
+                <a:latin typeface="Arial Black" panose="020B0A04020102020204" pitchFamily="34" charset="0"/>
+              </a:rPr>
+              <a:t>E</a:t>
+            </a:r>
+            <a:r>
+              <a:rPr lang="pt-BR" sz="3600" dirty="0">
+                <a:solidFill>
+                  <a:srgbClr val="FF0000"/>
+                </a:solidFill>
+                <a:latin typeface="Arial Black" panose="020B0A04020102020204" pitchFamily="34" charset="0"/>
+              </a:rPr>
+              <a:t>L</a:t>
+            </a:r>
+            <a:r>
+              <a:rPr lang="pt-BR" sz="3600" dirty="0">
+                <a:solidFill>
+                  <a:srgbClr val="0070C0"/>
+                </a:solidFill>
+                <a:latin typeface="Arial Black" panose="020B0A04020102020204" pitchFamily="34" charset="0"/>
+              </a:rPr>
+              <a:t> </a:t>
+            </a:r>
+            <a:r>
+              <a:rPr lang="pt-BR" sz="3600" dirty="0">
+                <a:solidFill>
+                  <a:srgbClr val="92D050"/>
+                </a:solidFill>
+                <a:latin typeface="Arial Black" panose="020B0A04020102020204" pitchFamily="34" charset="0"/>
+              </a:rPr>
+              <a:t>D</a:t>
+            </a:r>
+            <a:r>
+              <a:rPr lang="pt-BR" sz="3600" dirty="0">
+                <a:solidFill>
+                  <a:srgbClr val="FFFF00"/>
+                </a:solidFill>
+                <a:latin typeface="Arial Black" panose="020B0A04020102020204" pitchFamily="34" charset="0"/>
+              </a:rPr>
+              <a:t>E </a:t>
+            </a:r>
+          </a:p>
+          <a:p>
+            <a:pPr algn="ctr"/>
+            <a:r>
+              <a:rPr lang="pt-BR" sz="3600" dirty="0">
+                <a:solidFill>
+                  <a:srgbClr val="FFFF00"/>
+                </a:solidFill>
+                <a:latin typeface="Arial Black" panose="020B0A04020102020204" pitchFamily="34" charset="0"/>
+              </a:rPr>
+              <a:t>I</a:t>
+            </a:r>
+            <a:r>
+              <a:rPr lang="pt-BR" sz="3600" dirty="0">
+                <a:solidFill>
+                  <a:srgbClr val="FF0000"/>
+                </a:solidFill>
+                <a:latin typeface="Arial Black" panose="020B0A04020102020204" pitchFamily="34" charset="0"/>
+              </a:rPr>
+              <a:t>N</a:t>
+            </a:r>
+            <a:r>
+              <a:rPr lang="pt-BR" sz="3600" dirty="0">
+                <a:solidFill>
+                  <a:srgbClr val="0070C0"/>
+                </a:solidFill>
+                <a:latin typeface="Arial Black" panose="020B0A04020102020204" pitchFamily="34" charset="0"/>
+              </a:rPr>
+              <a:t>F</a:t>
+            </a:r>
+            <a:r>
+              <a:rPr lang="pt-BR" sz="3600" dirty="0">
+                <a:solidFill>
+                  <a:srgbClr val="92D050"/>
+                </a:solidFill>
+                <a:latin typeface="Arial Black" panose="020B0A04020102020204" pitchFamily="34" charset="0"/>
+              </a:rPr>
+              <a:t>O</a:t>
+            </a:r>
+            <a:r>
+              <a:rPr lang="pt-BR" sz="3600" dirty="0">
+                <a:solidFill>
+                  <a:srgbClr val="FFFF00"/>
+                </a:solidFill>
+                <a:latin typeface="Arial Black" panose="020B0A04020102020204" pitchFamily="34" charset="0"/>
+              </a:rPr>
+              <a:t>R</a:t>
+            </a:r>
+            <a:r>
+              <a:rPr lang="pt-BR" sz="3600" dirty="0">
+                <a:solidFill>
+                  <a:srgbClr val="FF0000"/>
+                </a:solidFill>
+                <a:latin typeface="Arial Black" panose="020B0A04020102020204" pitchFamily="34" charset="0"/>
+              </a:rPr>
+              <a:t>M</a:t>
+            </a:r>
+            <a:r>
+              <a:rPr lang="pt-BR" sz="3600" dirty="0">
+                <a:solidFill>
+                  <a:srgbClr val="0070C0"/>
+                </a:solidFill>
+                <a:latin typeface="Arial Black" panose="020B0A04020102020204" pitchFamily="34" charset="0"/>
+              </a:rPr>
+              <a:t>A</a:t>
+            </a:r>
+            <a:r>
+              <a:rPr lang="pt-BR" sz="3600" dirty="0">
+                <a:solidFill>
+                  <a:srgbClr val="92D050"/>
+                </a:solidFill>
+                <a:latin typeface="Arial Black" panose="020B0A04020102020204" pitchFamily="34" charset="0"/>
+              </a:rPr>
+              <a:t>Ç</a:t>
+            </a:r>
+            <a:r>
+              <a:rPr lang="pt-BR" sz="3600" dirty="0">
+                <a:solidFill>
+                  <a:srgbClr val="FFFF00"/>
+                </a:solidFill>
+                <a:latin typeface="Arial Black" panose="020B0A04020102020204" pitchFamily="34" charset="0"/>
+              </a:rPr>
+              <a:t>Õ</a:t>
+            </a:r>
+            <a:r>
+              <a:rPr lang="pt-BR" sz="3600" dirty="0">
+                <a:solidFill>
+                  <a:srgbClr val="FF0000"/>
+                </a:solidFill>
+                <a:latin typeface="Arial Black" panose="020B0A04020102020204" pitchFamily="34" charset="0"/>
+              </a:rPr>
+              <a:t>E</a:t>
+            </a:r>
+            <a:r>
+              <a:rPr lang="pt-BR" sz="3600" dirty="0">
+                <a:solidFill>
+                  <a:srgbClr val="0070C0"/>
+                </a:solidFill>
+                <a:latin typeface="Arial Black" panose="020B0A04020102020204" pitchFamily="34" charset="0"/>
+              </a:rPr>
+              <a:t>S</a:t>
+            </a:r>
+          </a:p>
+          <a:p>
+            <a:pPr algn="ctr"/>
+            <a:endParaRPr lang="pt-BR" sz="3600" dirty="0">
+              <a:solidFill>
+                <a:srgbClr val="92D050"/>
+              </a:solidFill>
+              <a:latin typeface="Arial Black" panose="020B0A04020102020204" pitchFamily="34" charset="0"/>
+            </a:endParaRPr>
+          </a:p>
+          <a:p>
+            <a:pPr algn="ctr"/>
+            <a:r>
+              <a:rPr lang="pt-BR" sz="4800" dirty="0">
+                <a:solidFill>
+                  <a:schemeClr val="bg2"/>
+                </a:solidFill>
+                <a:latin typeface="Arial Black" panose="020B0A04020102020204" pitchFamily="34" charset="0"/>
+              </a:rPr>
+              <a:t>LIGADO</a:t>
+            </a:r>
+          </a:p>
+        </p:txBody>
+      </p:sp>
+      <p:sp>
+        <p:nvSpPr>
+          <p:cNvPr id="9" name="CaixaDeTexto 8">
+            <a:extLst>
+              <a:ext uri="{FF2B5EF4-FFF2-40B4-BE49-F238E27FC236}">
+                <a16:creationId xmlns:a16="http://schemas.microsoft.com/office/drawing/2014/main" id="{2C2B32A4-9106-4C8B-9D3A-8CFE100E9320}"/>
+              </a:ext>
+            </a:extLst>
+          </p:cNvPr>
+          <p:cNvSpPr txBox="1"/>
+          <p:nvPr/>
+        </p:nvSpPr>
+        <p:spPr>
+          <a:xfrm>
+            <a:off x="6545942" y="1238691"/>
+            <a:ext cx="4185761" cy="2492990"/>
+          </a:xfrm>
+          <a:prstGeom prst="rect">
+            <a:avLst/>
+          </a:prstGeom>
+          <a:noFill/>
+        </p:spPr>
+        <p:txBody>
+          <a:bodyPr wrap="none" rtlCol="0">
+            <a:spAutoFit/>
+          </a:bodyPr>
+          <a:lstStyle/>
+          <a:p>
+            <a:pPr algn="ctr"/>
+            <a:r>
+              <a:rPr lang="pt-BR" sz="3600" u="sng" dirty="0">
+                <a:solidFill>
+                  <a:srgbClr val="FFFF00"/>
+                </a:solidFill>
+                <a:latin typeface="Arial Black" panose="020B0A04020102020204" pitchFamily="34" charset="0"/>
+              </a:rPr>
+              <a:t>P</a:t>
+            </a:r>
+            <a:r>
+              <a:rPr lang="pt-BR" sz="3600" u="sng" dirty="0">
+                <a:solidFill>
+                  <a:srgbClr val="FF0000"/>
+                </a:solidFill>
+                <a:latin typeface="Arial Black" panose="020B0A04020102020204" pitchFamily="34" charset="0"/>
+              </a:rPr>
+              <a:t>A</a:t>
+            </a:r>
+            <a:r>
+              <a:rPr lang="pt-BR" sz="3600" u="sng" dirty="0">
+                <a:solidFill>
+                  <a:srgbClr val="0070C0"/>
+                </a:solidFill>
+                <a:latin typeface="Arial Black" panose="020B0A04020102020204" pitchFamily="34" charset="0"/>
+              </a:rPr>
+              <a:t>I</a:t>
+            </a:r>
+            <a:r>
+              <a:rPr lang="pt-BR" sz="3600" u="sng" dirty="0">
+                <a:solidFill>
+                  <a:srgbClr val="92D050"/>
+                </a:solidFill>
+                <a:latin typeface="Arial Black" panose="020B0A04020102020204" pitchFamily="34" charset="0"/>
+              </a:rPr>
+              <a:t>N</a:t>
+            </a:r>
+            <a:r>
+              <a:rPr lang="pt-BR" sz="3600" u="sng" dirty="0">
+                <a:solidFill>
+                  <a:srgbClr val="FFFF00"/>
+                </a:solidFill>
+                <a:latin typeface="Arial Black" panose="020B0A04020102020204" pitchFamily="34" charset="0"/>
+              </a:rPr>
+              <a:t>E</a:t>
+            </a:r>
+            <a:r>
+              <a:rPr lang="pt-BR" sz="3600" u="sng" dirty="0">
+                <a:solidFill>
+                  <a:srgbClr val="FF0000"/>
+                </a:solidFill>
+                <a:latin typeface="Arial Black" panose="020B0A04020102020204" pitchFamily="34" charset="0"/>
+              </a:rPr>
+              <a:t>L</a:t>
+            </a:r>
+            <a:r>
+              <a:rPr lang="pt-BR" sz="3600" u="sng" dirty="0">
+                <a:solidFill>
+                  <a:srgbClr val="0070C0"/>
+                </a:solidFill>
+                <a:latin typeface="Arial Black" panose="020B0A04020102020204" pitchFamily="34" charset="0"/>
+              </a:rPr>
+              <a:t> </a:t>
+            </a:r>
+            <a:r>
+              <a:rPr lang="pt-BR" sz="3600" u="sng" dirty="0">
+                <a:solidFill>
+                  <a:srgbClr val="92D050"/>
+                </a:solidFill>
+                <a:latin typeface="Arial Black" panose="020B0A04020102020204" pitchFamily="34" charset="0"/>
+              </a:rPr>
+              <a:t>D</a:t>
+            </a:r>
+            <a:r>
+              <a:rPr lang="pt-BR" sz="3600" u="sng" dirty="0">
+                <a:solidFill>
+                  <a:srgbClr val="FFFF00"/>
+                </a:solidFill>
+                <a:latin typeface="Arial Black" panose="020B0A04020102020204" pitchFamily="34" charset="0"/>
+              </a:rPr>
+              <a:t>E </a:t>
+            </a:r>
+          </a:p>
+          <a:p>
+            <a:pPr algn="ctr"/>
+            <a:r>
+              <a:rPr lang="pt-BR" sz="3600" u="sng" dirty="0">
+                <a:solidFill>
+                  <a:srgbClr val="FFFF00"/>
+                </a:solidFill>
+                <a:latin typeface="Arial Black" panose="020B0A04020102020204" pitchFamily="34" charset="0"/>
+              </a:rPr>
+              <a:t>I</a:t>
+            </a:r>
+            <a:r>
+              <a:rPr lang="pt-BR" sz="3600" u="sng" dirty="0">
+                <a:solidFill>
+                  <a:srgbClr val="FF0000"/>
+                </a:solidFill>
+                <a:latin typeface="Arial Black" panose="020B0A04020102020204" pitchFamily="34" charset="0"/>
+              </a:rPr>
+              <a:t>N</a:t>
+            </a:r>
+            <a:r>
+              <a:rPr lang="pt-BR" sz="3600" u="sng" dirty="0">
+                <a:solidFill>
+                  <a:srgbClr val="0070C0"/>
+                </a:solidFill>
+                <a:latin typeface="Arial Black" panose="020B0A04020102020204" pitchFamily="34" charset="0"/>
+              </a:rPr>
+              <a:t>F</a:t>
+            </a:r>
+            <a:r>
+              <a:rPr lang="pt-BR" sz="3600" u="sng" dirty="0">
+                <a:solidFill>
+                  <a:srgbClr val="92D050"/>
+                </a:solidFill>
+                <a:latin typeface="Arial Black" panose="020B0A04020102020204" pitchFamily="34" charset="0"/>
+              </a:rPr>
+              <a:t>O</a:t>
+            </a:r>
+            <a:r>
+              <a:rPr lang="pt-BR" sz="3600" u="sng" dirty="0">
+                <a:solidFill>
+                  <a:srgbClr val="FFFF00"/>
+                </a:solidFill>
+                <a:latin typeface="Arial Black" panose="020B0A04020102020204" pitchFamily="34" charset="0"/>
+              </a:rPr>
+              <a:t>R</a:t>
+            </a:r>
+            <a:r>
+              <a:rPr lang="pt-BR" sz="3600" u="sng" dirty="0">
+                <a:solidFill>
+                  <a:srgbClr val="FF0000"/>
+                </a:solidFill>
+                <a:latin typeface="Arial Black" panose="020B0A04020102020204" pitchFamily="34" charset="0"/>
+              </a:rPr>
+              <a:t>M</a:t>
+            </a:r>
+            <a:r>
+              <a:rPr lang="pt-BR" sz="3600" u="sng" dirty="0">
+                <a:solidFill>
+                  <a:srgbClr val="0070C0"/>
+                </a:solidFill>
+                <a:latin typeface="Arial Black" panose="020B0A04020102020204" pitchFamily="34" charset="0"/>
+              </a:rPr>
+              <a:t>A</a:t>
+            </a:r>
+            <a:r>
+              <a:rPr lang="pt-BR" sz="3600" u="sng" dirty="0">
+                <a:solidFill>
+                  <a:srgbClr val="92D050"/>
+                </a:solidFill>
+                <a:latin typeface="Arial Black" panose="020B0A04020102020204" pitchFamily="34" charset="0"/>
+              </a:rPr>
+              <a:t>Ç</a:t>
+            </a:r>
+            <a:r>
+              <a:rPr lang="pt-BR" sz="3600" u="sng" dirty="0">
+                <a:solidFill>
+                  <a:srgbClr val="FFFF00"/>
+                </a:solidFill>
+                <a:latin typeface="Arial Black" panose="020B0A04020102020204" pitchFamily="34" charset="0"/>
+              </a:rPr>
+              <a:t>Õ</a:t>
+            </a:r>
+            <a:r>
+              <a:rPr lang="pt-BR" sz="3600" u="sng" dirty="0">
+                <a:solidFill>
+                  <a:srgbClr val="FF0000"/>
+                </a:solidFill>
+                <a:latin typeface="Arial Black" panose="020B0A04020102020204" pitchFamily="34" charset="0"/>
+              </a:rPr>
+              <a:t>E</a:t>
+            </a:r>
+            <a:r>
+              <a:rPr lang="pt-BR" sz="3600" u="sng" dirty="0">
+                <a:solidFill>
+                  <a:srgbClr val="0070C0"/>
+                </a:solidFill>
+                <a:latin typeface="Arial Black" panose="020B0A04020102020204" pitchFamily="34" charset="0"/>
+              </a:rPr>
+              <a:t>S</a:t>
+            </a:r>
+          </a:p>
+          <a:p>
+            <a:pPr algn="ctr"/>
+            <a:endParaRPr lang="pt-BR" sz="3600" u="sng" dirty="0">
+              <a:solidFill>
+                <a:srgbClr val="92D050"/>
+              </a:solidFill>
+              <a:latin typeface="Arial Black" panose="020B0A04020102020204" pitchFamily="34" charset="0"/>
+            </a:endParaRPr>
+          </a:p>
+          <a:p>
+            <a:pPr algn="ctr"/>
+            <a:r>
+              <a:rPr lang="pt-BR" sz="4800" u="sng" dirty="0">
+                <a:solidFill>
+                  <a:schemeClr val="bg2"/>
+                </a:solidFill>
+                <a:latin typeface="Arial Black" panose="020B0A04020102020204" pitchFamily="34" charset="0"/>
+              </a:rPr>
+              <a:t>DESLIGADO</a:t>
+            </a:r>
+          </a:p>
+        </p:txBody>
+      </p:sp>
+    </p:spTree>
+    <p:extLst>
+      <p:ext uri="{BB962C8B-B14F-4D97-AF65-F5344CB8AC3E}">
+        <p14:creationId xmlns:p14="http://schemas.microsoft.com/office/powerpoint/2010/main" val="1785793872"/>
+      </p:ext>
+    </p:extLst>
+  </p:cSld>
+  <p:clrMapOvr>
+    <a:masterClrMapping/>
+  </p:clrMapOvr>
+</p:sld>
+</file>
+
+<file path=ppt/slides/slide11.xml><?xml version="1.0" encoding="utf-8"?>
+<p:sld xmlns:a="http://schemas.openxmlformats.org/drawingml/2006/main" xmlns:r="http://schemas.openxmlformats.org/officeDocument/2006/relationships" xmlns:p="http://schemas.openxmlformats.org/presentationml/2006/main">
+  <p:cSld>
+    <p:spTree>
+      <p:nvGrpSpPr>
+        <p:cNvPr id="1" name=""/>
+        <p:cNvGrpSpPr/>
+        <p:nvPr/>
+      </p:nvGrpSpPr>
+      <p:grpSpPr>
+        <a:xfrm>
+          <a:off x="0" y="0"/>
+          <a:ext cx="0" cy="0"/>
+          <a:chOff x="0" y="0"/>
+          <a:chExt cx="0" cy="0"/>
+        </a:xfrm>
+      </p:grpSpPr>
       <p:grpSp>
         <p:nvGrpSpPr>
           <p:cNvPr id="3" name="Agrupar 2">
@@ -4707,7 +5297,7 @@
 </p:sld>
 </file>
 
-<file path=ppt/slides/slide11.xml><?xml version="1.0" encoding="utf-8"?>
+<file path=ppt/slides/slide12.xml><?xml version="1.0" encoding="utf-8"?>
 <p:sld xmlns:a="http://schemas.openxmlformats.org/drawingml/2006/main" xmlns:r="http://schemas.openxmlformats.org/officeDocument/2006/relationships" xmlns:p="http://schemas.openxmlformats.org/presentationml/2006/main">
   <p:cSld>
     <p:spTree>
@@ -5000,7 +5590,7 @@
 </p:sld>
 </file>
 
-<file path=ppt/slides/slide12.xml><?xml version="1.0" encoding="utf-8"?>
+<file path=ppt/slides/slide13.xml><?xml version="1.0" encoding="utf-8"?>
 <p:sld xmlns:a="http://schemas.openxmlformats.org/drawingml/2006/main" xmlns:r="http://schemas.openxmlformats.org/officeDocument/2006/relationships" xmlns:p="http://schemas.openxmlformats.org/presentationml/2006/main">
   <p:cSld>
     <p:spTree>
@@ -5456,7 +6046,7 @@
 </p:sld>
 </file>
 
-<file path=ppt/slides/slide13.xml><?xml version="1.0" encoding="utf-8"?>
+<file path=ppt/slides/slide14.xml><?xml version="1.0" encoding="utf-8"?>
 <p:sld xmlns:a="http://schemas.openxmlformats.org/drawingml/2006/main" xmlns:r="http://schemas.openxmlformats.org/officeDocument/2006/relationships" xmlns:p="http://schemas.openxmlformats.org/presentationml/2006/main">
   <p:cSld>
     <p:spTree>
@@ -6456,7 +7046,7 @@
 </p:sld>
 </file>
 
-<file path=ppt/slides/slide14.xml><?xml version="1.0" encoding="utf-8"?>
+<file path=ppt/slides/slide15.xml><?xml version="1.0" encoding="utf-8"?>
 <p:sld xmlns:a="http://schemas.openxmlformats.org/drawingml/2006/main" xmlns:r="http://schemas.openxmlformats.org/officeDocument/2006/relationships" xmlns:p="http://schemas.openxmlformats.org/presentationml/2006/main">
   <p:cSld>
     <p:spTree>
@@ -7579,7 +8169,7 @@
 </p:sld>
 </file>
 
-<file path=ppt/slides/slide15.xml><?xml version="1.0" encoding="utf-8"?>
+<file path=ppt/slides/slide16.xml><?xml version="1.0" encoding="utf-8"?>
 <p:sld xmlns:a="http://schemas.openxmlformats.org/drawingml/2006/main" xmlns:r="http://schemas.openxmlformats.org/officeDocument/2006/relationships" xmlns:p="http://schemas.openxmlformats.org/presentationml/2006/main">
   <p:cSld>
     <p:spTree>
@@ -10143,14 +10733,11 @@
           <a:lstStyle/>
           <a:p>
             <a:pPr algn="ctr"/>
-            <a:r>
-              <a:rPr lang="pt-BR" sz="3200" b="1" dirty="0">
-                <a:solidFill>
-                  <a:schemeClr val="tx1"/>
-                </a:solidFill>
-              </a:rPr>
-              <a:t>4</a:t>
-            </a:r>
+            <a:endParaRPr lang="pt-BR" sz="3200" b="1" dirty="0">
+              <a:solidFill>
+                <a:schemeClr val="tx1"/>
+              </a:solidFill>
+            </a:endParaRPr>
           </a:p>
         </p:txBody>
       </p:sp>
@@ -10204,14 +10791,6 @@
           <a:lstStyle/>
           <a:p>
             <a:pPr algn="ctr"/>
-            <a:r>
-              <a:rPr lang="pt-BR" sz="3200" b="1" dirty="0">
-                <a:solidFill>
-                  <a:schemeClr val="tx1"/>
-                </a:solidFill>
-              </a:rPr>
-              <a:t>3</a:t>
-            </a:r>
             <a:endParaRPr lang="pt-BR" sz="2400" b="1" dirty="0">
               <a:solidFill>
                 <a:schemeClr val="tx1"/>
@@ -10270,14 +10849,6 @@
           <a:lstStyle/>
           <a:p>
             <a:pPr algn="ctr"/>
-            <a:r>
-              <a:rPr lang="pt-BR" sz="4000" b="1" dirty="0">
-                <a:solidFill>
-                  <a:schemeClr val="tx1"/>
-                </a:solidFill>
-              </a:rPr>
-              <a:t>2</a:t>
-            </a:r>
             <a:endParaRPr lang="pt-BR" sz="3200" b="1" dirty="0">
               <a:solidFill>
                 <a:schemeClr val="tx1"/>
@@ -10336,14 +10907,6 @@
           <a:lstStyle/>
           <a:p>
             <a:pPr algn="ctr"/>
-            <a:r>
-              <a:rPr lang="pt-BR" sz="4000" b="1" dirty="0">
-                <a:solidFill>
-                  <a:schemeClr val="tx1"/>
-                </a:solidFill>
-              </a:rPr>
-              <a:t>1</a:t>
-            </a:r>
             <a:endParaRPr lang="pt-BR" sz="3200" b="1" dirty="0">
               <a:solidFill>
                 <a:schemeClr val="tx1"/>
@@ -10931,6 +11494,174 @@
                 <a:schemeClr val="bg1"/>
               </a:solidFill>
             </a:endParaRPr>
+          </a:p>
+        </p:txBody>
+      </p:sp>
+      <p:sp>
+        <p:nvSpPr>
+          <p:cNvPr id="21" name="CaixaDeTexto 20">
+            <a:extLst>
+              <a:ext uri="{FF2B5EF4-FFF2-40B4-BE49-F238E27FC236}">
+                <a16:creationId xmlns:a16="http://schemas.microsoft.com/office/drawing/2014/main" id="{91B76ED8-37F1-4ACA-86DF-1AA4F5A94678}"/>
+              </a:ext>
+            </a:extLst>
+          </p:cNvPr>
+          <p:cNvSpPr txBox="1"/>
+          <p:nvPr/>
+        </p:nvSpPr>
+        <p:spPr>
+          <a:xfrm>
+            <a:off x="4256823" y="409147"/>
+            <a:ext cx="322729" cy="830997"/>
+          </a:xfrm>
+          <a:prstGeom prst="rect">
+            <a:avLst/>
+          </a:prstGeom>
+          <a:noFill/>
+        </p:spPr>
+        <p:txBody>
+          <a:bodyPr wrap="square" rtlCol="0">
+            <a:spAutoFit/>
+            <a:scene3d>
+              <a:camera prst="orthographicFront">
+                <a:rot lat="10800000" lon="0" rev="0"/>
+              </a:camera>
+              <a:lightRig rig="threePt" dir="t"/>
+            </a:scene3d>
+          </a:bodyPr>
+          <a:lstStyle/>
+          <a:p>
+            <a:pPr algn="ctr"/>
+            <a:r>
+              <a:rPr lang="pt-BR" sz="4800" b="1" dirty="0"/>
+              <a:t>1</a:t>
+            </a:r>
+          </a:p>
+        </p:txBody>
+      </p:sp>
+      <p:sp>
+        <p:nvSpPr>
+          <p:cNvPr id="22" name="CaixaDeTexto 21">
+            <a:extLst>
+              <a:ext uri="{FF2B5EF4-FFF2-40B4-BE49-F238E27FC236}">
+                <a16:creationId xmlns:a16="http://schemas.microsoft.com/office/drawing/2014/main" id="{F0783883-2E66-4181-A2CF-3B28DB0D9C5A}"/>
+              </a:ext>
+            </a:extLst>
+          </p:cNvPr>
+          <p:cNvSpPr txBox="1"/>
+          <p:nvPr/>
+        </p:nvSpPr>
+        <p:spPr>
+          <a:xfrm>
+            <a:off x="7673509" y="427077"/>
+            <a:ext cx="322729" cy="830997"/>
+          </a:xfrm>
+          <a:prstGeom prst="rect">
+            <a:avLst/>
+          </a:prstGeom>
+          <a:noFill/>
+        </p:spPr>
+        <p:txBody>
+          <a:bodyPr wrap="square" rtlCol="0">
+            <a:spAutoFit/>
+            <a:scene3d>
+              <a:camera prst="orthographicFront">
+                <a:rot lat="10800000" lon="0" rev="0"/>
+              </a:camera>
+              <a:lightRig rig="threePt" dir="t"/>
+            </a:scene3d>
+          </a:bodyPr>
+          <a:lstStyle/>
+          <a:p>
+            <a:pPr algn="ctr"/>
+            <a:r>
+              <a:rPr lang="pt-BR" sz="4800" b="1" dirty="0"/>
+              <a:t>2</a:t>
+            </a:r>
+          </a:p>
+        </p:txBody>
+      </p:sp>
+      <p:sp>
+        <p:nvSpPr>
+          <p:cNvPr id="23" name="CaixaDeTexto 22">
+            <a:extLst>
+              <a:ext uri="{FF2B5EF4-FFF2-40B4-BE49-F238E27FC236}">
+                <a16:creationId xmlns:a16="http://schemas.microsoft.com/office/drawing/2014/main" id="{3D9FBB97-1739-4261-BA78-EA68902932B4}"/>
+              </a:ext>
+            </a:extLst>
+          </p:cNvPr>
+          <p:cNvSpPr txBox="1"/>
+          <p:nvPr/>
+        </p:nvSpPr>
+        <p:spPr>
+          <a:xfrm>
+            <a:off x="3610703" y="2940480"/>
+            <a:ext cx="465614" cy="707886"/>
+          </a:xfrm>
+          <a:prstGeom prst="rect">
+            <a:avLst/>
+          </a:prstGeom>
+          <a:noFill/>
+        </p:spPr>
+        <p:txBody>
+          <a:bodyPr wrap="square" rtlCol="0">
+            <a:spAutoFit/>
+            <a:scene3d>
+              <a:camera prst="orthographicFront">
+                <a:rot lat="10800000" lon="0" rev="0"/>
+              </a:camera>
+              <a:lightRig rig="threePt" dir="t"/>
+            </a:scene3d>
+          </a:bodyPr>
+          <a:lstStyle/>
+          <a:p>
+            <a:pPr algn="ctr"/>
+            <a:r>
+              <a:rPr lang="pt-BR" sz="4000" b="1" dirty="0"/>
+              <a:t>3</a:t>
+            </a:r>
+          </a:p>
+        </p:txBody>
+      </p:sp>
+      <p:sp>
+        <p:nvSpPr>
+          <p:cNvPr id="24" name="CaixaDeTexto 23">
+            <a:extLst>
+              <a:ext uri="{FF2B5EF4-FFF2-40B4-BE49-F238E27FC236}">
+                <a16:creationId xmlns:a16="http://schemas.microsoft.com/office/drawing/2014/main" id="{25BB3999-FFCB-4D3D-8B72-FF1D7E88CE9E}"/>
+              </a:ext>
+            </a:extLst>
+          </p:cNvPr>
+          <p:cNvSpPr txBox="1"/>
+          <p:nvPr/>
+        </p:nvSpPr>
+        <p:spPr>
+          <a:xfrm>
+            <a:off x="8254249" y="2958410"/>
+            <a:ext cx="322729" cy="707886"/>
+          </a:xfrm>
+          <a:prstGeom prst="rect">
+            <a:avLst/>
+          </a:prstGeom>
+          <a:noFill/>
+        </p:spPr>
+        <p:txBody>
+          <a:bodyPr wrap="square" rtlCol="0">
+            <a:spAutoFit/>
+            <a:scene3d>
+              <a:camera prst="orthographicFront">
+                <a:rot lat="10800000" lon="0" rev="0"/>
+              </a:camera>
+              <a:lightRig rig="threePt" dir="t"/>
+            </a:scene3d>
+          </a:bodyPr>
+          <a:lstStyle/>
+          <a:p>
+            <a:pPr algn="ctr"/>
+            <a:r>
+              <a:rPr lang="pt-BR" sz="4000" b="1" dirty="0"/>
+              <a:t>4</a:t>
+            </a:r>
           </a:p>
         </p:txBody>
       </p:sp>
@@ -10966,6 +11697,412 @@
       </p:grpSpPr>
       <p:sp>
         <p:nvSpPr>
+          <p:cNvPr id="26" name="Retângulo: Cantos Arredondados 25">
+            <a:extLst>
+              <a:ext uri="{FF2B5EF4-FFF2-40B4-BE49-F238E27FC236}">
+                <a16:creationId xmlns:a16="http://schemas.microsoft.com/office/drawing/2014/main" id="{999946BC-9188-47FE-9CC7-5472364785AB}"/>
+              </a:ext>
+            </a:extLst>
+          </p:cNvPr>
+          <p:cNvSpPr/>
+          <p:nvPr/>
+        </p:nvSpPr>
+        <p:spPr>
+          <a:xfrm>
+            <a:off x="2324100" y="350744"/>
+            <a:ext cx="7372350" cy="5459506"/>
+          </a:xfrm>
+          <a:prstGeom prst="roundRect">
+            <a:avLst>
+              <a:gd name="adj" fmla="val 5501"/>
+            </a:avLst>
+          </a:prstGeom>
+          <a:solidFill>
+            <a:srgbClr val="FFFF00"/>
+          </a:solidFill>
+        </p:spPr>
+        <p:style>
+          <a:lnRef idx="2">
+            <a:schemeClr val="accent1">
+              <a:shade val="50000"/>
+            </a:schemeClr>
+          </a:lnRef>
+          <a:fillRef idx="1">
+            <a:schemeClr val="accent1"/>
+          </a:fillRef>
+          <a:effectRef idx="0">
+            <a:schemeClr val="accent1"/>
+          </a:effectRef>
+          <a:fontRef idx="minor">
+            <a:schemeClr val="lt1"/>
+          </a:fontRef>
+        </p:style>
+        <p:txBody>
+          <a:bodyPr rtlCol="0" anchor="ctr"/>
+          <a:lstStyle/>
+          <a:p>
+            <a:pPr algn="ctr"/>
+            <a:endParaRPr lang="pt-BR"/>
+          </a:p>
+        </p:txBody>
+      </p:sp>
+      <p:sp>
+        <p:nvSpPr>
+          <p:cNvPr id="4" name="CaixaDeTexto 3">
+            <a:extLst>
+              <a:ext uri="{FF2B5EF4-FFF2-40B4-BE49-F238E27FC236}">
+                <a16:creationId xmlns:a16="http://schemas.microsoft.com/office/drawing/2014/main" id="{B5B7E5F6-52D6-43AA-8D45-AABD568F9A7E}"/>
+              </a:ext>
+            </a:extLst>
+          </p:cNvPr>
+          <p:cNvSpPr txBox="1"/>
+          <p:nvPr/>
+        </p:nvSpPr>
+        <p:spPr>
+          <a:xfrm>
+            <a:off x="3063176" y="752305"/>
+            <a:ext cx="5914097" cy="584775"/>
+          </a:xfrm>
+          <a:prstGeom prst="rect">
+            <a:avLst/>
+          </a:prstGeom>
+          <a:noFill/>
+        </p:spPr>
+        <p:txBody>
+          <a:bodyPr wrap="square" rtlCol="0">
+            <a:spAutoFit/>
+            <a:scene3d>
+              <a:camera prst="orthographicFront">
+                <a:rot lat="10800000" lon="0" rev="0"/>
+              </a:camera>
+              <a:lightRig rig="threePt" dir="t"/>
+            </a:scene3d>
+          </a:bodyPr>
+          <a:lstStyle/>
+          <a:p>
+            <a:pPr algn="ctr"/>
+            <a:r>
+              <a:rPr lang="pt-BR" sz="3200" b="1" dirty="0"/>
+              <a:t>SAIR (Q)</a:t>
+            </a:r>
+          </a:p>
+        </p:txBody>
+      </p:sp>
+      <p:sp>
+        <p:nvSpPr>
+          <p:cNvPr id="25" name="Retângulo 24">
+            <a:extLst>
+              <a:ext uri="{FF2B5EF4-FFF2-40B4-BE49-F238E27FC236}">
+                <a16:creationId xmlns:a16="http://schemas.microsoft.com/office/drawing/2014/main" id="{5E99E2C8-27A1-4A10-808A-E050A00417B8}"/>
+              </a:ext>
+            </a:extLst>
+          </p:cNvPr>
+          <p:cNvSpPr/>
+          <p:nvPr/>
+        </p:nvSpPr>
+        <p:spPr>
+          <a:xfrm>
+            <a:off x="4063414" y="4784992"/>
+            <a:ext cx="3884398" cy="923330"/>
+          </a:xfrm>
+          <a:prstGeom prst="rect">
+            <a:avLst/>
+          </a:prstGeom>
+          <a:noFill/>
+        </p:spPr>
+        <p:txBody>
+          <a:bodyPr wrap="square" lIns="91440" tIns="45720" rIns="91440" bIns="45720">
+            <a:spAutoFit/>
+            <a:scene3d>
+              <a:camera prst="orthographicFront">
+                <a:rot lat="10800000" lon="0" rev="0"/>
+              </a:camera>
+              <a:lightRig rig="threePt" dir="t"/>
+            </a:scene3d>
+          </a:bodyPr>
+          <a:lstStyle/>
+          <a:p>
+            <a:pPr algn="ctr"/>
+            <a:r>
+              <a:rPr lang="pt-BR" sz="5400" b="1" cap="none" spc="0" dirty="0">
+                <a:ln w="12700">
+                  <a:solidFill>
+                    <a:schemeClr val="tx2">
+                      <a:lumMod val="75000"/>
+                    </a:schemeClr>
+                  </a:solidFill>
+                  <a:prstDash val="solid"/>
+                </a:ln>
+                <a:pattFill prst="dkUpDiag">
+                  <a:fgClr>
+                    <a:schemeClr val="tx2"/>
+                  </a:fgClr>
+                  <a:bgClr>
+                    <a:schemeClr val="tx2">
+                      <a:lumMod val="20000"/>
+                      <a:lumOff val="80000"/>
+                    </a:schemeClr>
+                  </a:bgClr>
+                </a:pattFill>
+                <a:effectLst>
+                  <a:outerShdw dist="38100" dir="2640000" algn="bl" rotWithShape="0">
+                    <a:schemeClr val="tx2">
+                      <a:lumMod val="75000"/>
+                    </a:schemeClr>
+                  </a:outerShdw>
+                </a:effectLst>
+              </a:rPr>
+              <a:t>CALIBRAÇÃO</a:t>
+            </a:r>
+          </a:p>
+        </p:txBody>
+      </p:sp>
+      <p:sp>
+        <p:nvSpPr>
+          <p:cNvPr id="29" name="Triângulo Retângulo 28">
+            <a:extLst>
+              <a:ext uri="{FF2B5EF4-FFF2-40B4-BE49-F238E27FC236}">
+                <a16:creationId xmlns:a16="http://schemas.microsoft.com/office/drawing/2014/main" id="{CE043363-3EB4-4A8C-BE5E-5F0D4D616DA4}"/>
+              </a:ext>
+            </a:extLst>
+          </p:cNvPr>
+          <p:cNvSpPr/>
+          <p:nvPr/>
+        </p:nvSpPr>
+        <p:spPr>
+          <a:xfrm rot="5400000">
+            <a:off x="2171664" y="206956"/>
+            <a:ext cx="1443556" cy="1443556"/>
+          </a:xfrm>
+          <a:prstGeom prst="rtTriangle">
+            <a:avLst/>
+          </a:prstGeom>
+        </p:spPr>
+        <p:style>
+          <a:lnRef idx="2">
+            <a:schemeClr val="accent1">
+              <a:shade val="50000"/>
+            </a:schemeClr>
+          </a:lnRef>
+          <a:fillRef idx="1">
+            <a:schemeClr val="accent1"/>
+          </a:fillRef>
+          <a:effectRef idx="0">
+            <a:schemeClr val="accent1"/>
+          </a:effectRef>
+          <a:fontRef idx="minor">
+            <a:schemeClr val="lt1"/>
+          </a:fontRef>
+        </p:style>
+        <p:txBody>
+          <a:bodyPr rtlCol="0" anchor="ctr"/>
+          <a:lstStyle/>
+          <a:p>
+            <a:pPr algn="ctr"/>
+            <a:endParaRPr lang="pt-BR" dirty="0"/>
+          </a:p>
+        </p:txBody>
+      </p:sp>
+      <p:sp>
+        <p:nvSpPr>
+          <p:cNvPr id="30" name="Triângulo Retângulo 29">
+            <a:extLst>
+              <a:ext uri="{FF2B5EF4-FFF2-40B4-BE49-F238E27FC236}">
+                <a16:creationId xmlns:a16="http://schemas.microsoft.com/office/drawing/2014/main" id="{035B7DFC-D5FC-47CE-BF3F-0C2A6B21BF57}"/>
+              </a:ext>
+            </a:extLst>
+          </p:cNvPr>
+          <p:cNvSpPr/>
+          <p:nvPr/>
+        </p:nvSpPr>
+        <p:spPr>
+          <a:xfrm rot="10800000">
+            <a:off x="8425228" y="206956"/>
+            <a:ext cx="1443556" cy="1443556"/>
+          </a:xfrm>
+          <a:prstGeom prst="rtTriangle">
+            <a:avLst/>
+          </a:prstGeom>
+        </p:spPr>
+        <p:style>
+          <a:lnRef idx="2">
+            <a:schemeClr val="accent1">
+              <a:shade val="50000"/>
+            </a:schemeClr>
+          </a:lnRef>
+          <a:fillRef idx="1">
+            <a:schemeClr val="accent1"/>
+          </a:fillRef>
+          <a:effectRef idx="0">
+            <a:schemeClr val="accent1"/>
+          </a:effectRef>
+          <a:fontRef idx="minor">
+            <a:schemeClr val="lt1"/>
+          </a:fontRef>
+        </p:style>
+        <p:txBody>
+          <a:bodyPr rtlCol="0" anchor="ctr"/>
+          <a:lstStyle/>
+          <a:p>
+            <a:pPr algn="ctr"/>
+            <a:endParaRPr lang="pt-BR" dirty="0"/>
+          </a:p>
+        </p:txBody>
+      </p:sp>
+      <p:sp>
+        <p:nvSpPr>
+          <p:cNvPr id="31" name="Triângulo Retângulo 30">
+            <a:extLst>
+              <a:ext uri="{FF2B5EF4-FFF2-40B4-BE49-F238E27FC236}">
+                <a16:creationId xmlns:a16="http://schemas.microsoft.com/office/drawing/2014/main" id="{5E547690-1230-474E-8781-DE51713D1CD3}"/>
+              </a:ext>
+            </a:extLst>
+          </p:cNvPr>
+          <p:cNvSpPr/>
+          <p:nvPr/>
+        </p:nvSpPr>
+        <p:spPr>
+          <a:xfrm>
+            <a:off x="2171663" y="4510483"/>
+            <a:ext cx="1443555" cy="1443555"/>
+          </a:xfrm>
+          <a:prstGeom prst="rtTriangle">
+            <a:avLst/>
+          </a:prstGeom>
+        </p:spPr>
+        <p:style>
+          <a:lnRef idx="2">
+            <a:schemeClr val="accent1">
+              <a:shade val="50000"/>
+            </a:schemeClr>
+          </a:lnRef>
+          <a:fillRef idx="1">
+            <a:schemeClr val="accent1"/>
+          </a:fillRef>
+          <a:effectRef idx="0">
+            <a:schemeClr val="accent1"/>
+          </a:effectRef>
+          <a:fontRef idx="minor">
+            <a:schemeClr val="lt1"/>
+          </a:fontRef>
+        </p:style>
+        <p:txBody>
+          <a:bodyPr rtlCol="0" anchor="ctr"/>
+          <a:lstStyle/>
+          <a:p>
+            <a:pPr algn="ctr"/>
+            <a:endParaRPr lang="pt-BR" dirty="0"/>
+          </a:p>
+        </p:txBody>
+      </p:sp>
+      <p:sp>
+        <p:nvSpPr>
+          <p:cNvPr id="32" name="Triângulo Retângulo 31">
+            <a:extLst>
+              <a:ext uri="{FF2B5EF4-FFF2-40B4-BE49-F238E27FC236}">
+                <a16:creationId xmlns:a16="http://schemas.microsoft.com/office/drawing/2014/main" id="{90735404-A3C0-47BE-81AC-57B55AE16691}"/>
+              </a:ext>
+            </a:extLst>
+          </p:cNvPr>
+          <p:cNvSpPr/>
+          <p:nvPr/>
+        </p:nvSpPr>
+        <p:spPr>
+          <a:xfrm rot="16200000">
+            <a:off x="8425229" y="4510483"/>
+            <a:ext cx="1443555" cy="1443555"/>
+          </a:xfrm>
+          <a:prstGeom prst="rtTriangle">
+            <a:avLst/>
+          </a:prstGeom>
+        </p:spPr>
+        <p:style>
+          <a:lnRef idx="2">
+            <a:schemeClr val="accent1">
+              <a:shade val="50000"/>
+            </a:schemeClr>
+          </a:lnRef>
+          <a:fillRef idx="1">
+            <a:schemeClr val="accent1"/>
+          </a:fillRef>
+          <a:effectRef idx="0">
+            <a:schemeClr val="accent1"/>
+          </a:effectRef>
+          <a:fontRef idx="minor">
+            <a:schemeClr val="lt1"/>
+          </a:fontRef>
+        </p:style>
+        <p:txBody>
+          <a:bodyPr rtlCol="0" anchor="ctr"/>
+          <a:lstStyle/>
+          <a:p>
+            <a:pPr algn="ctr"/>
+            <a:endParaRPr lang="pt-BR" dirty="0"/>
+          </a:p>
+        </p:txBody>
+      </p:sp>
+      <p:pic>
+        <p:nvPicPr>
+          <p:cNvPr id="9" name="Imagem 8">
+            <a:extLst>
+              <a:ext uri="{FF2B5EF4-FFF2-40B4-BE49-F238E27FC236}">
+                <a16:creationId xmlns:a16="http://schemas.microsoft.com/office/drawing/2014/main" id="{567986C8-4EA7-49CD-BD70-C9FAA0E49EFB}"/>
+              </a:ext>
+            </a:extLst>
+          </p:cNvPr>
+          <p:cNvPicPr>
+            <a:picLocks noChangeAspect="1"/>
+          </p:cNvPicPr>
+          <p:nvPr/>
+        </p:nvPicPr>
+        <p:blipFill>
+          <a:blip r:embed="rId3"/>
+          <a:stretch>
+            <a:fillRect/>
+          </a:stretch>
+        </p:blipFill>
+        <p:spPr>
+          <a:xfrm rot="10800000">
+            <a:off x="4324102" y="1491220"/>
+            <a:ext cx="3543795" cy="3305636"/>
+          </a:xfrm>
+          <a:prstGeom prst="rect">
+            <a:avLst/>
+          </a:prstGeom>
+        </p:spPr>
+      </p:pic>
+    </p:spTree>
+    <p:extLst>
+      <p:ext uri="{BB962C8B-B14F-4D97-AF65-F5344CB8AC3E}">
+        <p14:creationId xmlns:p14="http://schemas.microsoft.com/office/powerpoint/2010/main" val="431778012"/>
+      </p:ext>
+    </p:extLst>
+  </p:cSld>
+  <p:clrMapOvr>
+    <a:masterClrMapping/>
+  </p:clrMapOvr>
+</p:sld>
+</file>
+
+<file path=ppt/slides/slide6.xml><?xml version="1.0" encoding="utf-8"?>
+<p:sld xmlns:a="http://schemas.openxmlformats.org/drawingml/2006/main" xmlns:r="http://schemas.openxmlformats.org/officeDocument/2006/relationships" xmlns:p="http://schemas.openxmlformats.org/presentationml/2006/main">
+  <p:cSld>
+    <p:spTree>
+      <p:nvGrpSpPr>
+        <p:cNvPr id="1" name=""/>
+        <p:cNvGrpSpPr/>
+        <p:nvPr/>
+      </p:nvGrpSpPr>
+      <p:grpSpPr>
+        <a:xfrm>
+          <a:off x="0" y="0"/>
+          <a:ext cx="0" cy="0"/>
+          <a:chOff x="0" y="0"/>
+          <a:chExt cx="0" cy="0"/>
+        </a:xfrm>
+      </p:grpSpPr>
+      <p:sp>
+        <p:nvSpPr>
           <p:cNvPr id="4" name="Retângulo 3">
             <a:extLst>
               <a:ext uri="{FF2B5EF4-FFF2-40B4-BE49-F238E27FC236}">
@@ -11203,7 +12340,7 @@
 </p:sld>
 </file>
 
-<file path=ppt/slides/slide6.xml><?xml version="1.0" encoding="utf-8"?>
+<file path=ppt/slides/slide7.xml><?xml version="1.0" encoding="utf-8"?>
 <p:sld xmlns:a="http://schemas.openxmlformats.org/drawingml/2006/main" xmlns:r="http://schemas.openxmlformats.org/officeDocument/2006/relationships" xmlns:p="http://schemas.openxmlformats.org/presentationml/2006/main">
   <p:cSld>
     <p:spTree>
@@ -12185,7 +13322,7 @@
 </p:sld>
 </file>
 
-<file path=ppt/slides/slide7.xml><?xml version="1.0" encoding="utf-8"?>
+<file path=ppt/slides/slide8.xml><?xml version="1.0" encoding="utf-8"?>
 <p:sld xmlns:a="http://schemas.openxmlformats.org/drawingml/2006/main" xmlns:r="http://schemas.openxmlformats.org/officeDocument/2006/relationships" xmlns:p="http://schemas.openxmlformats.org/presentationml/2006/main">
   <p:cSld>
     <p:spTree>
@@ -12500,7 +13637,7 @@
 </p:sld>
 </file>
 
-<file path=ppt/slides/slide8.xml><?xml version="1.0" encoding="utf-8"?>
+<file path=ppt/slides/slide9.xml><?xml version="1.0" encoding="utf-8"?>
 <p:sld xmlns:a="http://schemas.openxmlformats.org/drawingml/2006/main" xmlns:r="http://schemas.openxmlformats.org/officeDocument/2006/relationships" xmlns:p="http://schemas.openxmlformats.org/presentationml/2006/main">
   <p:cSld>
     <p:spTree>
@@ -12865,508 +14002,6 @@
     <p:extLst>
       <p:ext uri="{BB962C8B-B14F-4D97-AF65-F5344CB8AC3E}">
         <p14:creationId xmlns:p14="http://schemas.microsoft.com/office/powerpoint/2010/main" val="3888679180"/>
-      </p:ext>
-    </p:extLst>
-  </p:cSld>
-  <p:clrMapOvr>
-    <a:masterClrMapping/>
-  </p:clrMapOvr>
-</p:sld>
-</file>
-
-<file path=ppt/slides/slide9.xml><?xml version="1.0" encoding="utf-8"?>
-<p:sld xmlns:a="http://schemas.openxmlformats.org/drawingml/2006/main" xmlns:r="http://schemas.openxmlformats.org/officeDocument/2006/relationships" xmlns:p="http://schemas.openxmlformats.org/presentationml/2006/main">
-  <p:cSld>
-    <p:spTree>
-      <p:nvGrpSpPr>
-        <p:cNvPr id="1" name=""/>
-        <p:cNvGrpSpPr/>
-        <p:nvPr/>
-      </p:nvGrpSpPr>
-      <p:grpSpPr>
-        <a:xfrm>
-          <a:off x="0" y="0"/>
-          <a:ext cx="0" cy="0"/>
-          <a:chOff x="0" y="0"/>
-          <a:chExt cx="0" cy="0"/>
-        </a:xfrm>
-      </p:grpSpPr>
-      <p:sp>
-        <p:nvSpPr>
-          <p:cNvPr id="11" name="CaixaDeTexto 10">
-            <a:extLst>
-              <a:ext uri="{FF2B5EF4-FFF2-40B4-BE49-F238E27FC236}">
-                <a16:creationId xmlns:a16="http://schemas.microsoft.com/office/drawing/2014/main" id="{04882994-2E24-4060-9428-4813448CD91B}"/>
-              </a:ext>
-            </a:extLst>
-          </p:cNvPr>
-          <p:cNvSpPr txBox="1"/>
-          <p:nvPr/>
-        </p:nvSpPr>
-        <p:spPr>
-          <a:xfrm>
-            <a:off x="2025610" y="1149791"/>
-            <a:ext cx="4006225" cy="2585323"/>
-          </a:xfrm>
-          <a:prstGeom prst="rect">
-            <a:avLst/>
-          </a:prstGeom>
-          <a:noFill/>
-        </p:spPr>
-        <p:txBody>
-          <a:bodyPr wrap="none" rtlCol="0">
-            <a:spAutoFit/>
-          </a:bodyPr>
-          <a:lstStyle/>
-          <a:p>
-            <a:pPr algn="ctr"/>
-            <a:r>
-              <a:rPr lang="pt-BR" sz="3600" dirty="0">
-                <a:solidFill>
-                  <a:srgbClr val="FFFF00"/>
-                </a:solidFill>
-                <a:latin typeface="Arial Black" panose="020B0A04020102020204" pitchFamily="34" charset="0"/>
-              </a:rPr>
-              <a:t>P</a:t>
-            </a:r>
-            <a:r>
-              <a:rPr lang="pt-BR" sz="3600" dirty="0">
-                <a:solidFill>
-                  <a:srgbClr val="FF0000"/>
-                </a:solidFill>
-                <a:latin typeface="Arial Black" panose="020B0A04020102020204" pitchFamily="34" charset="0"/>
-              </a:rPr>
-              <a:t>A</a:t>
-            </a:r>
-            <a:r>
-              <a:rPr lang="pt-BR" sz="3600" dirty="0">
-                <a:solidFill>
-                  <a:srgbClr val="0070C0"/>
-                </a:solidFill>
-                <a:latin typeface="Arial Black" panose="020B0A04020102020204" pitchFamily="34" charset="0"/>
-              </a:rPr>
-              <a:t>I</a:t>
-            </a:r>
-            <a:r>
-              <a:rPr lang="pt-BR" sz="3600" dirty="0">
-                <a:solidFill>
-                  <a:srgbClr val="92D050"/>
-                </a:solidFill>
-                <a:latin typeface="Arial Black" panose="020B0A04020102020204" pitchFamily="34" charset="0"/>
-              </a:rPr>
-              <a:t>N</a:t>
-            </a:r>
-            <a:r>
-              <a:rPr lang="pt-BR" sz="3600" dirty="0">
-                <a:solidFill>
-                  <a:srgbClr val="FFFF00"/>
-                </a:solidFill>
-                <a:latin typeface="Arial Black" panose="020B0A04020102020204" pitchFamily="34" charset="0"/>
-              </a:rPr>
-              <a:t>E</a:t>
-            </a:r>
-            <a:r>
-              <a:rPr lang="pt-BR" sz="3600" dirty="0">
-                <a:solidFill>
-                  <a:srgbClr val="FF0000"/>
-                </a:solidFill>
-                <a:latin typeface="Arial Black" panose="020B0A04020102020204" pitchFamily="34" charset="0"/>
-              </a:rPr>
-              <a:t>L</a:t>
-            </a:r>
-            <a:r>
-              <a:rPr lang="pt-BR" sz="3600" dirty="0">
-                <a:solidFill>
-                  <a:srgbClr val="0070C0"/>
-                </a:solidFill>
-                <a:latin typeface="Arial Black" panose="020B0A04020102020204" pitchFamily="34" charset="0"/>
-              </a:rPr>
-              <a:t> </a:t>
-            </a:r>
-            <a:r>
-              <a:rPr lang="pt-BR" sz="3600" dirty="0">
-                <a:solidFill>
-                  <a:srgbClr val="92D050"/>
-                </a:solidFill>
-                <a:latin typeface="Arial Black" panose="020B0A04020102020204" pitchFamily="34" charset="0"/>
-              </a:rPr>
-              <a:t>D</a:t>
-            </a:r>
-            <a:r>
-              <a:rPr lang="pt-BR" sz="3600" dirty="0">
-                <a:solidFill>
-                  <a:srgbClr val="FFFF00"/>
-                </a:solidFill>
-                <a:latin typeface="Arial Black" panose="020B0A04020102020204" pitchFamily="34" charset="0"/>
-              </a:rPr>
-              <a:t>E </a:t>
-            </a:r>
-          </a:p>
-          <a:p>
-            <a:pPr algn="ctr"/>
-            <a:r>
-              <a:rPr lang="pt-BR" sz="3600" dirty="0">
-                <a:solidFill>
-                  <a:srgbClr val="FFFF00"/>
-                </a:solidFill>
-                <a:latin typeface="Arial Black" panose="020B0A04020102020204" pitchFamily="34" charset="0"/>
-              </a:rPr>
-              <a:t>I</a:t>
-            </a:r>
-            <a:r>
-              <a:rPr lang="pt-BR" sz="3600" dirty="0">
-                <a:solidFill>
-                  <a:srgbClr val="FF0000"/>
-                </a:solidFill>
-                <a:latin typeface="Arial Black" panose="020B0A04020102020204" pitchFamily="34" charset="0"/>
-              </a:rPr>
-              <a:t>N</a:t>
-            </a:r>
-            <a:r>
-              <a:rPr lang="pt-BR" sz="3600" dirty="0">
-                <a:solidFill>
-                  <a:srgbClr val="0070C0"/>
-                </a:solidFill>
-                <a:latin typeface="Arial Black" panose="020B0A04020102020204" pitchFamily="34" charset="0"/>
-              </a:rPr>
-              <a:t>F</a:t>
-            </a:r>
-            <a:r>
-              <a:rPr lang="pt-BR" sz="3600" dirty="0">
-                <a:solidFill>
-                  <a:srgbClr val="92D050"/>
-                </a:solidFill>
-                <a:latin typeface="Arial Black" panose="020B0A04020102020204" pitchFamily="34" charset="0"/>
-              </a:rPr>
-              <a:t>O</a:t>
-            </a:r>
-            <a:r>
-              <a:rPr lang="pt-BR" sz="3600" dirty="0">
-                <a:solidFill>
-                  <a:srgbClr val="FFFF00"/>
-                </a:solidFill>
-                <a:latin typeface="Arial Black" panose="020B0A04020102020204" pitchFamily="34" charset="0"/>
-              </a:rPr>
-              <a:t>R</a:t>
-            </a:r>
-            <a:r>
-              <a:rPr lang="pt-BR" sz="3600" dirty="0">
-                <a:solidFill>
-                  <a:srgbClr val="FF0000"/>
-                </a:solidFill>
-                <a:latin typeface="Arial Black" panose="020B0A04020102020204" pitchFamily="34" charset="0"/>
-              </a:rPr>
-              <a:t>M</a:t>
-            </a:r>
-            <a:r>
-              <a:rPr lang="pt-BR" sz="3600" dirty="0">
-                <a:solidFill>
-                  <a:srgbClr val="0070C0"/>
-                </a:solidFill>
-                <a:latin typeface="Arial Black" panose="020B0A04020102020204" pitchFamily="34" charset="0"/>
-              </a:rPr>
-              <a:t>A</a:t>
-            </a:r>
-            <a:r>
-              <a:rPr lang="pt-BR" sz="3600" dirty="0">
-                <a:solidFill>
-                  <a:srgbClr val="92D050"/>
-                </a:solidFill>
-                <a:latin typeface="Arial Black" panose="020B0A04020102020204" pitchFamily="34" charset="0"/>
-              </a:rPr>
-              <a:t>Ç</a:t>
-            </a:r>
-            <a:r>
-              <a:rPr lang="pt-BR" sz="3600" dirty="0">
-                <a:solidFill>
-                  <a:srgbClr val="FFFF00"/>
-                </a:solidFill>
-                <a:latin typeface="Arial Black" panose="020B0A04020102020204" pitchFamily="34" charset="0"/>
-              </a:rPr>
-              <a:t>Õ</a:t>
-            </a:r>
-            <a:r>
-              <a:rPr lang="pt-BR" sz="3600" dirty="0">
-                <a:solidFill>
-                  <a:srgbClr val="FF0000"/>
-                </a:solidFill>
-                <a:latin typeface="Arial Black" panose="020B0A04020102020204" pitchFamily="34" charset="0"/>
-              </a:rPr>
-              <a:t>E</a:t>
-            </a:r>
-            <a:r>
-              <a:rPr lang="pt-BR" sz="3600" dirty="0">
-                <a:solidFill>
-                  <a:srgbClr val="0070C0"/>
-                </a:solidFill>
-                <a:latin typeface="Arial Black" panose="020B0A04020102020204" pitchFamily="34" charset="0"/>
-              </a:rPr>
-              <a:t>S</a:t>
-            </a:r>
-          </a:p>
-          <a:p>
-            <a:pPr algn="ctr"/>
-            <a:endParaRPr lang="pt-BR" sz="3600" dirty="0">
-              <a:solidFill>
-                <a:srgbClr val="92D050"/>
-              </a:solidFill>
-              <a:latin typeface="Arial Black" panose="020B0A04020102020204" pitchFamily="34" charset="0"/>
-            </a:endParaRPr>
-          </a:p>
-          <a:p>
-            <a:pPr algn="ctr"/>
-            <a:r>
-              <a:rPr lang="pt-BR" sz="4800" dirty="0">
-                <a:solidFill>
-                  <a:schemeClr val="bg2"/>
-                </a:solidFill>
-                <a:latin typeface="Arial Black" panose="020B0A04020102020204" pitchFamily="34" charset="0"/>
-              </a:rPr>
-              <a:t>LIGADO</a:t>
-            </a:r>
-          </a:p>
-        </p:txBody>
-      </p:sp>
-      <p:sp>
-        <p:nvSpPr>
-          <p:cNvPr id="9" name="CaixaDeTexto 8">
-            <a:extLst>
-              <a:ext uri="{FF2B5EF4-FFF2-40B4-BE49-F238E27FC236}">
-                <a16:creationId xmlns:a16="http://schemas.microsoft.com/office/drawing/2014/main" id="{2C2B32A4-9106-4C8B-9D3A-8CFE100E9320}"/>
-              </a:ext>
-            </a:extLst>
-          </p:cNvPr>
-          <p:cNvSpPr txBox="1"/>
-          <p:nvPr/>
-        </p:nvSpPr>
-        <p:spPr>
-          <a:xfrm>
-            <a:off x="6545942" y="1238691"/>
-            <a:ext cx="4185761" cy="2492990"/>
-          </a:xfrm>
-          <a:prstGeom prst="rect">
-            <a:avLst/>
-          </a:prstGeom>
-          <a:noFill/>
-        </p:spPr>
-        <p:txBody>
-          <a:bodyPr wrap="none" rtlCol="0">
-            <a:spAutoFit/>
-          </a:bodyPr>
-          <a:lstStyle/>
-          <a:p>
-            <a:pPr algn="ctr"/>
-            <a:r>
-              <a:rPr lang="pt-BR" sz="3600" u="sng" dirty="0">
-                <a:solidFill>
-                  <a:srgbClr val="FFFF00"/>
-                </a:solidFill>
-                <a:latin typeface="Arial Black" panose="020B0A04020102020204" pitchFamily="34" charset="0"/>
-              </a:rPr>
-              <a:t>P</a:t>
-            </a:r>
-            <a:r>
-              <a:rPr lang="pt-BR" sz="3600" u="sng" dirty="0">
-                <a:solidFill>
-                  <a:srgbClr val="FF0000"/>
-                </a:solidFill>
-                <a:latin typeface="Arial Black" panose="020B0A04020102020204" pitchFamily="34" charset="0"/>
-              </a:rPr>
-              <a:t>A</a:t>
-            </a:r>
-            <a:r>
-              <a:rPr lang="pt-BR" sz="3600" u="sng" dirty="0">
-                <a:solidFill>
-                  <a:srgbClr val="0070C0"/>
-                </a:solidFill>
-                <a:latin typeface="Arial Black" panose="020B0A04020102020204" pitchFamily="34" charset="0"/>
-              </a:rPr>
-              <a:t>I</a:t>
-            </a:r>
-            <a:r>
-              <a:rPr lang="pt-BR" sz="3600" u="sng" dirty="0">
-                <a:solidFill>
-                  <a:srgbClr val="92D050"/>
-                </a:solidFill>
-                <a:latin typeface="Arial Black" panose="020B0A04020102020204" pitchFamily="34" charset="0"/>
-              </a:rPr>
-              <a:t>N</a:t>
-            </a:r>
-            <a:r>
-              <a:rPr lang="pt-BR" sz="3600" u="sng" dirty="0">
-                <a:solidFill>
-                  <a:srgbClr val="FFFF00"/>
-                </a:solidFill>
-                <a:latin typeface="Arial Black" panose="020B0A04020102020204" pitchFamily="34" charset="0"/>
-              </a:rPr>
-              <a:t>E</a:t>
-            </a:r>
-            <a:r>
-              <a:rPr lang="pt-BR" sz="3600" u="sng" dirty="0">
-                <a:solidFill>
-                  <a:srgbClr val="FF0000"/>
-                </a:solidFill>
-                <a:latin typeface="Arial Black" panose="020B0A04020102020204" pitchFamily="34" charset="0"/>
-              </a:rPr>
-              <a:t>L</a:t>
-            </a:r>
-            <a:r>
-              <a:rPr lang="pt-BR" sz="3600" u="sng" dirty="0">
-                <a:solidFill>
-                  <a:srgbClr val="0070C0"/>
-                </a:solidFill>
-                <a:latin typeface="Arial Black" panose="020B0A04020102020204" pitchFamily="34" charset="0"/>
-              </a:rPr>
-              <a:t> </a:t>
-            </a:r>
-            <a:r>
-              <a:rPr lang="pt-BR" sz="3600" u="sng" dirty="0">
-                <a:solidFill>
-                  <a:srgbClr val="92D050"/>
-                </a:solidFill>
-                <a:latin typeface="Arial Black" panose="020B0A04020102020204" pitchFamily="34" charset="0"/>
-              </a:rPr>
-              <a:t>D</a:t>
-            </a:r>
-            <a:r>
-              <a:rPr lang="pt-BR" sz="3600" u="sng" dirty="0">
-                <a:solidFill>
-                  <a:srgbClr val="FFFF00"/>
-                </a:solidFill>
-                <a:latin typeface="Arial Black" panose="020B0A04020102020204" pitchFamily="34" charset="0"/>
-              </a:rPr>
-              <a:t>E </a:t>
-            </a:r>
-          </a:p>
-          <a:p>
-            <a:pPr algn="ctr"/>
-            <a:r>
-              <a:rPr lang="pt-BR" sz="3600" u="sng" dirty="0">
-                <a:solidFill>
-                  <a:srgbClr val="FFFF00"/>
-                </a:solidFill>
-                <a:latin typeface="Arial Black" panose="020B0A04020102020204" pitchFamily="34" charset="0"/>
-              </a:rPr>
-              <a:t>I</a:t>
-            </a:r>
-            <a:r>
-              <a:rPr lang="pt-BR" sz="3600" u="sng" dirty="0">
-                <a:solidFill>
-                  <a:srgbClr val="FF0000"/>
-                </a:solidFill>
-                <a:latin typeface="Arial Black" panose="020B0A04020102020204" pitchFamily="34" charset="0"/>
-              </a:rPr>
-              <a:t>N</a:t>
-            </a:r>
-            <a:r>
-              <a:rPr lang="pt-BR" sz="3600" u="sng" dirty="0">
-                <a:solidFill>
-                  <a:srgbClr val="0070C0"/>
-                </a:solidFill>
-                <a:latin typeface="Arial Black" panose="020B0A04020102020204" pitchFamily="34" charset="0"/>
-              </a:rPr>
-              <a:t>F</a:t>
-            </a:r>
-            <a:r>
-              <a:rPr lang="pt-BR" sz="3600" u="sng" dirty="0">
-                <a:solidFill>
-                  <a:srgbClr val="92D050"/>
-                </a:solidFill>
-                <a:latin typeface="Arial Black" panose="020B0A04020102020204" pitchFamily="34" charset="0"/>
-              </a:rPr>
-              <a:t>O</a:t>
-            </a:r>
-            <a:r>
-              <a:rPr lang="pt-BR" sz="3600" u="sng" dirty="0">
-                <a:solidFill>
-                  <a:srgbClr val="FFFF00"/>
-                </a:solidFill>
-                <a:latin typeface="Arial Black" panose="020B0A04020102020204" pitchFamily="34" charset="0"/>
-              </a:rPr>
-              <a:t>R</a:t>
-            </a:r>
-            <a:r>
-              <a:rPr lang="pt-BR" sz="3600" u="sng" dirty="0">
-                <a:solidFill>
-                  <a:srgbClr val="FF0000"/>
-                </a:solidFill>
-                <a:latin typeface="Arial Black" panose="020B0A04020102020204" pitchFamily="34" charset="0"/>
-              </a:rPr>
-              <a:t>M</a:t>
-            </a:r>
-            <a:r>
-              <a:rPr lang="pt-BR" sz="3600" u="sng" dirty="0">
-                <a:solidFill>
-                  <a:srgbClr val="0070C0"/>
-                </a:solidFill>
-                <a:latin typeface="Arial Black" panose="020B0A04020102020204" pitchFamily="34" charset="0"/>
-              </a:rPr>
-              <a:t>A</a:t>
-            </a:r>
-            <a:r>
-              <a:rPr lang="pt-BR" sz="3600" u="sng" dirty="0">
-                <a:solidFill>
-                  <a:srgbClr val="92D050"/>
-                </a:solidFill>
-                <a:latin typeface="Arial Black" panose="020B0A04020102020204" pitchFamily="34" charset="0"/>
-              </a:rPr>
-              <a:t>Ç</a:t>
-            </a:r>
-            <a:r>
-              <a:rPr lang="pt-BR" sz="3600" u="sng" dirty="0">
-                <a:solidFill>
-                  <a:srgbClr val="FFFF00"/>
-                </a:solidFill>
-                <a:latin typeface="Arial Black" panose="020B0A04020102020204" pitchFamily="34" charset="0"/>
-              </a:rPr>
-              <a:t>Õ</a:t>
-            </a:r>
-            <a:r>
-              <a:rPr lang="pt-BR" sz="3600" u="sng" dirty="0">
-                <a:solidFill>
-                  <a:srgbClr val="FF0000"/>
-                </a:solidFill>
-                <a:latin typeface="Arial Black" panose="020B0A04020102020204" pitchFamily="34" charset="0"/>
-              </a:rPr>
-              <a:t>E</a:t>
-            </a:r>
-            <a:r>
-              <a:rPr lang="pt-BR" sz="3600" u="sng" dirty="0">
-                <a:solidFill>
-                  <a:srgbClr val="0070C0"/>
-                </a:solidFill>
-                <a:latin typeface="Arial Black" panose="020B0A04020102020204" pitchFamily="34" charset="0"/>
-              </a:rPr>
-              <a:t>S</a:t>
-            </a:r>
-          </a:p>
-          <a:p>
-            <a:pPr algn="ctr"/>
-            <a:endParaRPr lang="pt-BR" sz="3600" u="sng" dirty="0">
-              <a:solidFill>
-                <a:srgbClr val="92D050"/>
-              </a:solidFill>
-              <a:latin typeface="Arial Black" panose="020B0A04020102020204" pitchFamily="34" charset="0"/>
-            </a:endParaRPr>
-          </a:p>
-          <a:p>
-            <a:pPr algn="ctr"/>
-            <a:r>
-              <a:rPr lang="pt-BR" sz="4800" u="sng" dirty="0">
-                <a:solidFill>
-                  <a:schemeClr val="bg2"/>
-                </a:solidFill>
-                <a:latin typeface="Arial Black" panose="020B0A04020102020204" pitchFamily="34" charset="0"/>
-              </a:rPr>
-              <a:t>DESLIGADO</a:t>
-            </a:r>
-          </a:p>
-        </p:txBody>
-      </p:sp>
-    </p:spTree>
-    <p:extLst>
-      <p:ext uri="{BB962C8B-B14F-4D97-AF65-F5344CB8AC3E}">
-        <p14:creationId xmlns:p14="http://schemas.microsoft.com/office/powerpoint/2010/main" val="1785793872"/>
       </p:ext>
     </p:extLst>
   </p:cSld>

</xml_diff>